<commit_message>
feat(table): clone nested gridCols
</commit_message>
<xml_diff>
--- a/__tests__/pptx-templates/NestedTables.pptx
+++ b/__tests__/pptx-templates/NestedTables.pptx
@@ -259,7 +259,7 @@
           <a:p>
             <a:fld id="{8FB60A0F-5ED1-45ED-A5D5-DB038E6B70D9}" type="datetimeFigureOut">
               <a:rPr lang="de-DE" smtClean="0"/>
-              <a:t>05.08.2024</a:t>
+              <a:t>06.08.2024</a:t>
             </a:fld>
             <a:endParaRPr lang="de-DE"/>
           </a:p>
@@ -457,7 +457,7 @@
           <a:p>
             <a:fld id="{8FB60A0F-5ED1-45ED-A5D5-DB038E6B70D9}" type="datetimeFigureOut">
               <a:rPr lang="de-DE" smtClean="0"/>
-              <a:t>05.08.2024</a:t>
+              <a:t>06.08.2024</a:t>
             </a:fld>
             <a:endParaRPr lang="de-DE"/>
           </a:p>
@@ -665,7 +665,7 @@
           <a:p>
             <a:fld id="{8FB60A0F-5ED1-45ED-A5D5-DB038E6B70D9}" type="datetimeFigureOut">
               <a:rPr lang="de-DE" smtClean="0"/>
-              <a:t>05.08.2024</a:t>
+              <a:t>06.08.2024</a:t>
             </a:fld>
             <a:endParaRPr lang="de-DE"/>
           </a:p>
@@ -863,7 +863,7 @@
           <a:p>
             <a:fld id="{8FB60A0F-5ED1-45ED-A5D5-DB038E6B70D9}" type="datetimeFigureOut">
               <a:rPr lang="de-DE" smtClean="0"/>
-              <a:t>05.08.2024</a:t>
+              <a:t>06.08.2024</a:t>
             </a:fld>
             <a:endParaRPr lang="de-DE"/>
           </a:p>
@@ -1138,7 +1138,7 @@
           <a:p>
             <a:fld id="{8FB60A0F-5ED1-45ED-A5D5-DB038E6B70D9}" type="datetimeFigureOut">
               <a:rPr lang="de-DE" smtClean="0"/>
-              <a:t>05.08.2024</a:t>
+              <a:t>06.08.2024</a:t>
             </a:fld>
             <a:endParaRPr lang="de-DE"/>
           </a:p>
@@ -1403,7 +1403,7 @@
           <a:p>
             <a:fld id="{8FB60A0F-5ED1-45ED-A5D5-DB038E6B70D9}" type="datetimeFigureOut">
               <a:rPr lang="de-DE" smtClean="0"/>
-              <a:t>05.08.2024</a:t>
+              <a:t>06.08.2024</a:t>
             </a:fld>
             <a:endParaRPr lang="de-DE"/>
           </a:p>
@@ -1815,7 +1815,7 @@
           <a:p>
             <a:fld id="{8FB60A0F-5ED1-45ED-A5D5-DB038E6B70D9}" type="datetimeFigureOut">
               <a:rPr lang="de-DE" smtClean="0"/>
-              <a:t>05.08.2024</a:t>
+              <a:t>06.08.2024</a:t>
             </a:fld>
             <a:endParaRPr lang="de-DE"/>
           </a:p>
@@ -1956,7 +1956,7 @@
           <a:p>
             <a:fld id="{8FB60A0F-5ED1-45ED-A5D5-DB038E6B70D9}" type="datetimeFigureOut">
               <a:rPr lang="de-DE" smtClean="0"/>
-              <a:t>05.08.2024</a:t>
+              <a:t>06.08.2024</a:t>
             </a:fld>
             <a:endParaRPr lang="de-DE"/>
           </a:p>
@@ -2069,7 +2069,7 @@
           <a:p>
             <a:fld id="{8FB60A0F-5ED1-45ED-A5D5-DB038E6B70D9}" type="datetimeFigureOut">
               <a:rPr lang="de-DE" smtClean="0"/>
-              <a:t>05.08.2024</a:t>
+              <a:t>06.08.2024</a:t>
             </a:fld>
             <a:endParaRPr lang="de-DE"/>
           </a:p>
@@ -2380,7 +2380,7 @@
           <a:p>
             <a:fld id="{8FB60A0F-5ED1-45ED-A5D5-DB038E6B70D9}" type="datetimeFigureOut">
               <a:rPr lang="de-DE" smtClean="0"/>
-              <a:t>05.08.2024</a:t>
+              <a:t>06.08.2024</a:t>
             </a:fld>
             <a:endParaRPr lang="de-DE"/>
           </a:p>
@@ -2668,7 +2668,7 @@
           <a:p>
             <a:fld id="{8FB60A0F-5ED1-45ED-A5D5-DB038E6B70D9}" type="datetimeFigureOut">
               <a:rPr lang="de-DE" smtClean="0"/>
-              <a:t>05.08.2024</a:t>
+              <a:t>06.08.2024</a:t>
             </a:fld>
             <a:endParaRPr lang="de-DE"/>
           </a:p>
@@ -2909,7 +2909,7 @@
           <a:p>
             <a:fld id="{8FB60A0F-5ED1-45ED-A5D5-DB038E6B70D9}" type="datetimeFigureOut">
               <a:rPr lang="de-DE" smtClean="0"/>
-              <a:t>05.08.2024</a:t>
+              <a:t>06.08.2024</a:t>
             </a:fld>
             <a:endParaRPr lang="de-DE"/>
           </a:p>
@@ -4028,7 +4028,7 @@
       </p:sp>
       <p:graphicFrame>
         <p:nvGraphicFramePr>
-          <p:cNvPr id="6" name="NestedTable1">
+          <p:cNvPr id="6" name="NestedTable2">
             <a:extLst>
               <a:ext uri="{FF2B5EF4-FFF2-40B4-BE49-F238E27FC236}">
                 <a16:creationId xmlns:a16="http://schemas.microsoft.com/office/drawing/2014/main" id="{637C470B-B27A-42D4-9939-A22EF5F2ED12}"/>
@@ -4041,7 +4041,7 @@
           <p:nvPr>
             <p:extLst>
               <p:ext uri="{D42A27DB-BD31-4B8C-83A1-F6EECF244321}">
-                <p14:modId xmlns:p14="http://schemas.microsoft.com/office/powerpoint/2010/main" val="2712543048"/>
+                <p14:modId xmlns:p14="http://schemas.microsoft.com/office/powerpoint/2010/main" val="1072176842"/>
               </p:ext>
             </p:extLst>
           </p:nvPr>

</xml_diff>

<commit_message>
feat(table): use tags to expand rows or (nested) columns
</commit_message>
<xml_diff>
--- a/__tests__/pptx-templates/NestedTables.pptx
+++ b/__tests__/pptx-templates/NestedTables.pptx
@@ -6,6 +6,9 @@
   </p:sldMasterIdLst>
   <p:sldIdLst>
     <p:sldId id="257" r:id="rId2"/>
+    <p:sldId id="258" r:id="rId3"/>
+    <p:sldId id="259" r:id="rId4"/>
+    <p:sldId id="260" r:id="rId5"/>
   </p:sldIdLst>
   <p:sldSz cx="12192000" cy="6858000"/>
   <p:notesSz cx="6858000" cy="9144000"/>
@@ -3341,13 +3344,13 @@
           <p:nvPr>
             <p:extLst>
               <p:ext uri="{D42A27DB-BD31-4B8C-83A1-F6EECF244321}">
-                <p14:modId xmlns:p14="http://schemas.microsoft.com/office/powerpoint/2010/main" val="322864657"/>
+                <p14:modId xmlns:p14="http://schemas.microsoft.com/office/powerpoint/2010/main" val="2427074560"/>
               </p:ext>
             </p:extLst>
           </p:nvPr>
         </p:nvGraphicFramePr>
         <p:xfrm>
-          <a:off x="858822" y="1523668"/>
+          <a:off x="858822" y="627375"/>
           <a:ext cx="6231524" cy="1112520"/>
         </p:xfrm>
         <a:graphic>
@@ -4041,14 +4044,14 @@
           <p:nvPr>
             <p:extLst>
               <p:ext uri="{D42A27DB-BD31-4B8C-83A1-F6EECF244321}">
-                <p14:modId xmlns:p14="http://schemas.microsoft.com/office/powerpoint/2010/main" val="1072176842"/>
+                <p14:modId xmlns:p14="http://schemas.microsoft.com/office/powerpoint/2010/main" val="3967086749"/>
               </p:ext>
             </p:extLst>
           </p:nvPr>
         </p:nvGraphicFramePr>
         <p:xfrm>
-          <a:off x="858822" y="3429000"/>
-          <a:ext cx="7385768" cy="1508760"/>
+          <a:off x="858821" y="2080034"/>
+          <a:ext cx="4075316" cy="1483360"/>
         </p:xfrm>
         <a:graphic>
           <a:graphicData uri="http://schemas.openxmlformats.org/drawingml/2006/table">
@@ -4057,28 +4060,28 @@
                 <a:tableStyleId>{2D5ABB26-0587-4C30-8999-92F81FD0307C}</a:tableStyleId>
               </a:tblPr>
               <a:tblGrid>
-                <a:gridCol w="1846442">
+                <a:gridCol w="1018829">
                   <a:extLst>
                     <a:ext uri="{9D8B030D-6E8A-4147-A177-3AD203B41FA5}">
                       <a16:colId xmlns:a16="http://schemas.microsoft.com/office/drawing/2014/main" val="2081046437"/>
                     </a:ext>
                   </a:extLst>
                 </a:gridCol>
-                <a:gridCol w="1846442">
+                <a:gridCol w="1018829">
                   <a:extLst>
                     <a:ext uri="{9D8B030D-6E8A-4147-A177-3AD203B41FA5}">
                       <a16:colId xmlns:a16="http://schemas.microsoft.com/office/drawing/2014/main" val="3700495073"/>
                     </a:ext>
                   </a:extLst>
                 </a:gridCol>
-                <a:gridCol w="1846442">
+                <a:gridCol w="1018829">
                   <a:extLst>
                     <a:ext uri="{9D8B030D-6E8A-4147-A177-3AD203B41FA5}">
                       <a16:colId xmlns:a16="http://schemas.microsoft.com/office/drawing/2014/main" val="4155264383"/>
                     </a:ext>
                   </a:extLst>
                 </a:gridCol>
-                <a:gridCol w="1846442">
+                <a:gridCol w="1018829">
                   <a:extLst>
                     <a:ext uri="{9D8B030D-6E8A-4147-A177-3AD203B41FA5}">
                       <a16:colId xmlns:a16="http://schemas.microsoft.com/office/drawing/2014/main" val="113879652"/>
@@ -4471,9 +4474,23 @@
                     <a:p>
                       <a:pPr algn="ctr"/>
                       <a:r>
-                        <a:rPr lang="de-DE" sz="1000"/>
-                        <a:t>{{[year: 0, sub, row: 0]}}</a:t>
+                        <a:rPr kumimoji="0" lang="de-DE" sz="1000" b="0" i="0" u="none" strike="noStrike" kern="1200" cap="none" spc="0" normalizeH="0" baseline="0" noProof="0">
+                          <a:ln>
+                            <a:noFill/>
+                          </a:ln>
+                          <a:solidFill>
+                            <a:prstClr val="black"/>
+                          </a:solidFill>
+                          <a:effectLst/>
+                          <a:uLnTx/>
+                          <a:uFillTx/>
+                          <a:latin typeface="Calibri" panose="020F0502020204030204"/>
+                          <a:ea typeface="+mn-ea"/>
+                          <a:cs typeface="+mn-cs"/>
+                        </a:rPr>
+                        <a:t>H-1</a:t>
                       </a:r>
+                      <a:endParaRPr lang="de-DE" sz="1000"/>
                     </a:p>
                   </a:txBody>
                   <a:tcPr>
@@ -4530,9 +4547,23 @@
                     <a:p>
                       <a:pPr algn="ctr"/>
                       <a:r>
-                        <a:rPr lang="de-DE" sz="1000"/>
-                        <a:t>{{[year: 1, sub, row: 0]}}</a:t>
+                        <a:rPr kumimoji="0" lang="de-DE" sz="1000" b="0" i="0" u="none" strike="noStrike" kern="1200" cap="none" spc="0" normalizeH="0" baseline="0" noProof="0">
+                          <a:ln>
+                            <a:noFill/>
+                          </a:ln>
+                          <a:solidFill>
+                            <a:prstClr val="black"/>
+                          </a:solidFill>
+                          <a:effectLst/>
+                          <a:uLnTx/>
+                          <a:uFillTx/>
+                          <a:latin typeface="Calibri" panose="020F0502020204030204"/>
+                          <a:ea typeface="+mn-ea"/>
+                          <a:cs typeface="+mn-cs"/>
+                        </a:rPr>
+                        <a:t>H-2</a:t>
                       </a:r>
+                      <a:endParaRPr lang="de-DE" sz="1000"/>
                     </a:p>
                   </a:txBody>
                   <a:tcPr>
@@ -4605,9 +4636,23 @@
                         <a:defRPr/>
                       </a:pPr>
                       <a:r>
-                        <a:rPr lang="de-DE" sz="1000"/>
-                        <a:t>{{[year: 0, sub, row: 0]}} vs {{[year: 1, sub, row: 0]}}</a:t>
+                        <a:rPr kumimoji="0" lang="de-DE" sz="1000" b="0" i="0" u="none" strike="noStrike" kern="1200" cap="none" spc="0" normalizeH="0" baseline="0" noProof="0">
+                          <a:ln>
+                            <a:noFill/>
+                          </a:ln>
+                          <a:solidFill>
+                            <a:prstClr val="black"/>
+                          </a:solidFill>
+                          <a:effectLst/>
+                          <a:uLnTx/>
+                          <a:uFillTx/>
+                          <a:latin typeface="Calibri" panose="020F0502020204030204"/>
+                          <a:ea typeface="+mn-ea"/>
+                          <a:cs typeface="+mn-cs"/>
+                        </a:rPr>
+                        <a:t>H-Diff</a:t>
                       </a:r>
+                      <a:endParaRPr lang="de-DE" sz="1000"/>
                     </a:p>
                   </a:txBody>
                   <a:tcPr>
@@ -4746,9 +4791,23 @@
                     <a:p>
                       <a:pPr algn="ctr"/>
                       <a:r>
-                        <a:rPr lang="de-DE" sz="1000"/>
-                        <a:t>{{[year: 0, sub, row]}}</a:t>
+                        <a:rPr kumimoji="0" lang="de-DE" sz="1000" b="0" i="0" u="none" strike="noStrike" kern="1200" cap="none" spc="0" normalizeH="0" baseline="0" noProof="0">
+                          <a:ln>
+                            <a:noFill/>
+                          </a:ln>
+                          <a:solidFill>
+                            <a:prstClr val="black"/>
+                          </a:solidFill>
+                          <a:effectLst/>
+                          <a:uLnTx/>
+                          <a:uFillTx/>
+                          <a:latin typeface="Calibri" panose="020F0502020204030204"/>
+                          <a:ea typeface="+mn-ea"/>
+                          <a:cs typeface="+mn-cs"/>
+                        </a:rPr>
+                        <a:t>Val-1</a:t>
                       </a:r>
+                      <a:endParaRPr lang="de-DE" sz="1000"/>
                     </a:p>
                   </a:txBody>
                   <a:tcPr>
@@ -4805,9 +4864,23 @@
                     <a:p>
                       <a:pPr algn="ctr"/>
                       <a:r>
-                        <a:rPr lang="de-DE" sz="1000"/>
-                        <a:t>{{[year: 1, sub, row]}}</a:t>
+                        <a:rPr kumimoji="0" lang="de-DE" sz="1000" b="0" i="0" u="none" strike="noStrike" kern="1200" cap="none" spc="0" normalizeH="0" baseline="0" noProof="0">
+                          <a:ln>
+                            <a:noFill/>
+                          </a:ln>
+                          <a:solidFill>
+                            <a:prstClr val="black"/>
+                          </a:solidFill>
+                          <a:effectLst/>
+                          <a:uLnTx/>
+                          <a:uFillTx/>
+                          <a:latin typeface="Calibri" panose="020F0502020204030204"/>
+                          <a:ea typeface="+mn-ea"/>
+                          <a:cs typeface="+mn-cs"/>
+                        </a:rPr>
+                        <a:t>Val-2</a:t>
                       </a:r>
+                      <a:endParaRPr lang="de-DE" sz="1000"/>
                     </a:p>
                   </a:txBody>
                   <a:tcPr>
@@ -4864,9 +4937,23 @@
                     <a:p>
                       <a:pPr algn="ctr"/>
                       <a:r>
-                        <a:rPr lang="de-DE" sz="1000"/>
-                        <a:t>{{[year: diff, sub, row]}}</a:t>
+                        <a:rPr kumimoji="0" lang="de-DE" sz="1000" b="0" i="0" u="none" strike="noStrike" kern="1200" cap="none" spc="0" normalizeH="0" baseline="0" noProof="0">
+                          <a:ln>
+                            <a:noFill/>
+                          </a:ln>
+                          <a:solidFill>
+                            <a:prstClr val="black"/>
+                          </a:solidFill>
+                          <a:effectLst/>
+                          <a:uLnTx/>
+                          <a:uFillTx/>
+                          <a:latin typeface="Calibri" panose="020F0502020204030204"/>
+                          <a:ea typeface="+mn-ea"/>
+                          <a:cs typeface="+mn-cs"/>
+                        </a:rPr>
+                        <a:t>Val-Diff</a:t>
                       </a:r>
+                      <a:endParaRPr lang="de-DE" sz="1000"/>
                     </a:p>
                   </a:txBody>
                   <a:tcPr>
@@ -4930,6 +5017,4492 @@
     <p:extLst>
       <p:ext uri="{BB962C8B-B14F-4D97-AF65-F5344CB8AC3E}">
         <p14:creationId xmlns:p14="http://schemas.microsoft.com/office/powerpoint/2010/main" val="1950777067"/>
+      </p:ext>
+    </p:extLst>
+  </p:cSld>
+  <p:clrMapOvr>
+    <a:masterClrMapping/>
+  </p:clrMapOvr>
+</p:sld>
+</file>
+
+<file path=ppt/slides/slide2.xml><?xml version="1.0" encoding="utf-8"?>
+<p:sld xmlns:a="http://schemas.openxmlformats.org/drawingml/2006/main" xmlns:r="http://schemas.openxmlformats.org/officeDocument/2006/relationships" xmlns:p="http://schemas.openxmlformats.org/presentationml/2006/main">
+  <p:cSld>
+    <p:spTree>
+      <p:nvGrpSpPr>
+        <p:cNvPr id="1" name=""/>
+        <p:cNvGrpSpPr/>
+        <p:nvPr/>
+      </p:nvGrpSpPr>
+      <p:grpSpPr>
+        <a:xfrm>
+          <a:off x="0" y="0"/>
+          <a:ext cx="0" cy="0"/>
+          <a:chOff x="0" y="0"/>
+          <a:chExt cx="0" cy="0"/>
+        </a:xfrm>
+      </p:grpSpPr>
+      <p:sp>
+        <p:nvSpPr>
+          <p:cNvPr id="5" name="Titel 4">
+            <a:extLst>
+              <a:ext uri="{FF2B5EF4-FFF2-40B4-BE49-F238E27FC236}">
+                <a16:creationId xmlns:a16="http://schemas.microsoft.com/office/drawing/2014/main" id="{B8BB8EC6-C7DA-4E2F-86DF-BDE9856B03BD}"/>
+              </a:ext>
+            </a:extLst>
+          </p:cNvPr>
+          <p:cNvSpPr>
+            <a:spLocks noGrp="1"/>
+          </p:cNvSpPr>
+          <p:nvPr>
+            <p:ph type="title"/>
+          </p:nvPr>
+        </p:nvSpPr>
+        <p:spPr>
+          <a:xfrm>
+            <a:off x="0" y="24653"/>
+            <a:ext cx="10515600" cy="446405"/>
+          </a:xfrm>
+        </p:spPr>
+        <p:txBody>
+          <a:bodyPr>
+            <a:normAutofit/>
+          </a:bodyPr>
+          <a:lstStyle/>
+          <a:p>
+            <a:r>
+              <a:rPr lang="de-DE" sz="1400" b="1"/>
+              <a:t>NestedTable3</a:t>
+            </a:r>
+          </a:p>
+        </p:txBody>
+      </p:sp>
+      <p:graphicFrame>
+        <p:nvGraphicFramePr>
+          <p:cNvPr id="7" name="NestedTable3">
+            <a:extLst>
+              <a:ext uri="{FF2B5EF4-FFF2-40B4-BE49-F238E27FC236}">
+                <a16:creationId xmlns:a16="http://schemas.microsoft.com/office/drawing/2014/main" id="{C4847EC1-F174-4533-9A6B-8A897174AFE7}"/>
+              </a:ext>
+            </a:extLst>
+          </p:cNvPr>
+          <p:cNvGraphicFramePr>
+            <a:graphicFrameLocks noGrp="1"/>
+          </p:cNvGraphicFramePr>
+          <p:nvPr>
+            <p:extLst>
+              <p:ext uri="{D42A27DB-BD31-4B8C-83A1-F6EECF244321}">
+                <p14:modId xmlns:p14="http://schemas.microsoft.com/office/powerpoint/2010/main" val="2649242970"/>
+              </p:ext>
+            </p:extLst>
+          </p:nvPr>
+        </p:nvGraphicFramePr>
+        <p:xfrm>
+          <a:off x="556672" y="1926125"/>
+          <a:ext cx="3951956" cy="1940560"/>
+        </p:xfrm>
+        <a:graphic>
+          <a:graphicData uri="http://schemas.openxmlformats.org/drawingml/2006/table">
+            <a:tbl>
+              <a:tblPr bandRow="1">
+                <a:tableStyleId>{2D5ABB26-0587-4C30-8999-92F81FD0307C}</a:tableStyleId>
+              </a:tblPr>
+              <a:tblGrid>
+                <a:gridCol w="987989">
+                  <a:extLst>
+                    <a:ext uri="{9D8B030D-6E8A-4147-A177-3AD203B41FA5}">
+                      <a16:colId xmlns:a16="http://schemas.microsoft.com/office/drawing/2014/main" val="2081046437"/>
+                    </a:ext>
+                  </a:extLst>
+                </a:gridCol>
+                <a:gridCol w="987989">
+                  <a:extLst>
+                    <a:ext uri="{9D8B030D-6E8A-4147-A177-3AD203B41FA5}">
+                      <a16:colId xmlns:a16="http://schemas.microsoft.com/office/drawing/2014/main" val="3700495073"/>
+                    </a:ext>
+                  </a:extLst>
+                </a:gridCol>
+                <a:gridCol w="987989">
+                  <a:extLst>
+                    <a:ext uri="{9D8B030D-6E8A-4147-A177-3AD203B41FA5}">
+                      <a16:colId xmlns:a16="http://schemas.microsoft.com/office/drawing/2014/main" val="113879652"/>
+                    </a:ext>
+                  </a:extLst>
+                </a:gridCol>
+                <a:gridCol w="987989">
+                  <a:extLst>
+                    <a:ext uri="{9D8B030D-6E8A-4147-A177-3AD203B41FA5}">
+                      <a16:colId xmlns:a16="http://schemas.microsoft.com/office/drawing/2014/main" val="1384176072"/>
+                    </a:ext>
+                  </a:extLst>
+                </a:gridCol>
+              </a:tblGrid>
+              <a:tr h="370840">
+                <a:tc rowSpan="2">
+                  <a:txBody>
+                    <a:bodyPr/>
+                    <a:lstStyle/>
+                    <a:p>
+                      <a:pPr algn="ctr"/>
+                      <a:r>
+                        <a:rPr kumimoji="0" lang="de-DE" sz="1200" u="none" strike="noStrike" kern="1200" cap="none" spc="0" normalizeH="0" baseline="0" noProof="0">
+                          <a:ln>
+                            <a:noFill/>
+                          </a:ln>
+                          <a:effectLst/>
+                          <a:uLnTx/>
+                          <a:uFillTx/>
+                        </a:rPr>
+                        <a:t>A1-A2</a:t>
+                      </a:r>
+                      <a:endParaRPr lang="de-DE" sz="1200"/>
+                    </a:p>
+                  </a:txBody>
+                  <a:tcPr anchor="ctr">
+                    <a:lnL w="12700" cap="flat" cmpd="sng" algn="ctr">
+                      <a:solidFill>
+                        <a:schemeClr val="bg2">
+                          <a:lumMod val="75000"/>
+                        </a:schemeClr>
+                      </a:solidFill>
+                      <a:prstDash val="solid"/>
+                      <a:round/>
+                      <a:headEnd type="none" w="med" len="med"/>
+                      <a:tailEnd type="none" w="med" len="med"/>
+                    </a:lnL>
+                    <a:lnR w="38100" cap="flat" cmpd="sng" algn="ctr">
+                      <a:solidFill>
+                        <a:schemeClr val="bg1">
+                          <a:lumMod val="85000"/>
+                        </a:schemeClr>
+                      </a:solidFill>
+                      <a:prstDash val="solid"/>
+                      <a:round/>
+                      <a:headEnd type="none" w="med" len="med"/>
+                      <a:tailEnd type="none" w="med" len="med"/>
+                    </a:lnR>
+                    <a:lnT w="12700" cap="flat" cmpd="sng" algn="ctr">
+                      <a:solidFill>
+                        <a:schemeClr val="bg2">
+                          <a:lumMod val="75000"/>
+                        </a:schemeClr>
+                      </a:solidFill>
+                      <a:prstDash val="solid"/>
+                      <a:round/>
+                      <a:headEnd type="none" w="med" len="med"/>
+                      <a:tailEnd type="none" w="med" len="med"/>
+                    </a:lnT>
+                    <a:lnB w="12700" cap="flat" cmpd="sng" algn="ctr">
+                      <a:solidFill>
+                        <a:schemeClr val="bg2">
+                          <a:lumMod val="75000"/>
+                        </a:schemeClr>
+                      </a:solidFill>
+                      <a:prstDash val="solid"/>
+                      <a:round/>
+                      <a:headEnd type="none" w="med" len="med"/>
+                      <a:tailEnd type="none" w="med" len="med"/>
+                    </a:lnB>
+                  </a:tcPr>
+                </a:tc>
+                <a:tc gridSpan="2">
+                  <a:txBody>
+                    <a:bodyPr/>
+                    <a:lstStyle/>
+                    <a:p>
+                      <a:pPr algn="ctr"/>
+                      <a:r>
+                        <a:rPr lang="de-DE" sz="1200"/>
+                        <a:t>{{each:sub}}</a:t>
+                      </a:r>
+                    </a:p>
+                  </a:txBody>
+                  <a:tcPr anchor="ctr">
+                    <a:lnL w="38100" cap="flat" cmpd="sng" algn="ctr">
+                      <a:solidFill>
+                        <a:schemeClr val="bg1">
+                          <a:lumMod val="85000"/>
+                        </a:schemeClr>
+                      </a:solidFill>
+                      <a:prstDash val="solid"/>
+                      <a:round/>
+                      <a:headEnd type="none" w="med" len="med"/>
+                      <a:tailEnd type="none" w="med" len="med"/>
+                    </a:lnL>
+                    <a:lnR w="38100" cap="flat" cmpd="sng" algn="ctr">
+                      <a:solidFill>
+                        <a:schemeClr val="bg1">
+                          <a:lumMod val="85000"/>
+                        </a:schemeClr>
+                      </a:solidFill>
+                      <a:prstDash val="solid"/>
+                      <a:round/>
+                      <a:headEnd type="none" w="med" len="med"/>
+                      <a:tailEnd type="none" w="med" len="med"/>
+                    </a:lnR>
+                    <a:lnT w="12700" cap="flat" cmpd="sng" algn="ctr">
+                      <a:solidFill>
+                        <a:schemeClr val="bg2">
+                          <a:lumMod val="75000"/>
+                        </a:schemeClr>
+                      </a:solidFill>
+                      <a:prstDash val="solid"/>
+                      <a:round/>
+                      <a:headEnd type="none" w="med" len="med"/>
+                      <a:tailEnd type="none" w="med" len="med"/>
+                    </a:lnT>
+                    <a:lnB w="12700" cap="flat" cmpd="sng" algn="ctr">
+                      <a:solidFill>
+                        <a:schemeClr val="bg2">
+                          <a:lumMod val="75000"/>
+                        </a:schemeClr>
+                      </a:solidFill>
+                      <a:prstDash val="solid"/>
+                      <a:round/>
+                      <a:headEnd type="none" w="med" len="med"/>
+                      <a:tailEnd type="none" w="med" len="med"/>
+                    </a:lnB>
+                  </a:tcPr>
+                </a:tc>
+                <a:tc hMerge="1">
+                  <a:txBody>
+                    <a:bodyPr/>
+                    <a:lstStyle/>
+                    <a:p>
+                      <a:pPr algn="ctr"/>
+                      <a:endParaRPr lang="de-DE" sz="1400"/>
+                    </a:p>
+                  </a:txBody>
+                  <a:tcPr>
+                    <a:lnL w="12700" cap="flat" cmpd="sng" algn="ctr">
+                      <a:solidFill>
+                        <a:schemeClr val="bg2">
+                          <a:lumMod val="75000"/>
+                        </a:schemeClr>
+                      </a:solidFill>
+                      <a:prstDash val="solid"/>
+                      <a:round/>
+                      <a:headEnd type="none" w="med" len="med"/>
+                      <a:tailEnd type="none" w="med" len="med"/>
+                    </a:lnL>
+                  </a:tcPr>
+                </a:tc>
+                <a:tc rowSpan="2">
+                  <a:txBody>
+                    <a:bodyPr/>
+                    <a:lstStyle/>
+                    <a:p>
+                      <a:pPr algn="ctr"/>
+                      <a:r>
+                        <a:rPr lang="de-DE" sz="1200"/>
+                        <a:t>Last</a:t>
+                      </a:r>
+                    </a:p>
+                  </a:txBody>
+                  <a:tcPr anchor="ctr">
+                    <a:lnL w="38100" cap="flat" cmpd="sng" algn="ctr">
+                      <a:solidFill>
+                        <a:schemeClr val="bg1">
+                          <a:lumMod val="85000"/>
+                        </a:schemeClr>
+                      </a:solidFill>
+                      <a:prstDash val="solid"/>
+                      <a:round/>
+                      <a:headEnd type="none" w="med" len="med"/>
+                      <a:tailEnd type="none" w="med" len="med"/>
+                    </a:lnL>
+                    <a:lnR w="12700" cap="flat" cmpd="sng" algn="ctr">
+                      <a:solidFill>
+                        <a:schemeClr val="bg2">
+                          <a:lumMod val="75000"/>
+                        </a:schemeClr>
+                      </a:solidFill>
+                      <a:prstDash val="solid"/>
+                      <a:round/>
+                      <a:headEnd type="none" w="med" len="med"/>
+                      <a:tailEnd type="none" w="med" len="med"/>
+                    </a:lnR>
+                    <a:lnT w="12700" cap="flat" cmpd="sng" algn="ctr">
+                      <a:solidFill>
+                        <a:schemeClr val="bg2">
+                          <a:lumMod val="75000"/>
+                        </a:schemeClr>
+                      </a:solidFill>
+                      <a:prstDash val="solid"/>
+                      <a:round/>
+                      <a:headEnd type="none" w="med" len="med"/>
+                      <a:tailEnd type="none" w="med" len="med"/>
+                    </a:lnT>
+                    <a:lnB w="12700" cap="flat" cmpd="sng" algn="ctr">
+                      <a:solidFill>
+                        <a:schemeClr val="bg2">
+                          <a:lumMod val="75000"/>
+                        </a:schemeClr>
+                      </a:solidFill>
+                      <a:prstDash val="solid"/>
+                      <a:round/>
+                      <a:headEnd type="none" w="med" len="med"/>
+                      <a:tailEnd type="none" w="med" len="med"/>
+                    </a:lnB>
+                  </a:tcPr>
+                </a:tc>
+                <a:extLst>
+                  <a:ext uri="{0D108BD9-81ED-4DB2-BD59-A6C34878D82A}">
+                    <a16:rowId xmlns:a16="http://schemas.microsoft.com/office/drawing/2014/main" val="1523742880"/>
+                  </a:ext>
+                </a:extLst>
+              </a:tr>
+              <a:tr h="370840">
+                <a:tc vMerge="1">
+                  <a:txBody>
+                    <a:bodyPr/>
+                    <a:lstStyle/>
+                    <a:p>
+                      <a:pPr algn="ctr"/>
+                      <a:endParaRPr lang="de-DE" sz="1400"/>
+                    </a:p>
+                  </a:txBody>
+                  <a:tcPr/>
+                </a:tc>
+                <a:tc>
+                  <a:txBody>
+                    <a:bodyPr/>
+                    <a:lstStyle/>
+                    <a:p>
+                      <a:pPr marL="0" marR="0" lvl="0" indent="0" algn="ctr" defTabSz="914400" rtl="0" eaLnBrk="1" fontAlgn="auto" latinLnBrk="0" hangingPunct="1">
+                        <a:lnSpc>
+                          <a:spcPct val="100000"/>
+                        </a:lnSpc>
+                        <a:spcBef>
+                          <a:spcPts val="0"/>
+                        </a:spcBef>
+                        <a:spcAft>
+                          <a:spcPts val="0"/>
+                        </a:spcAft>
+                        <a:buClrTx/>
+                        <a:buSzTx/>
+                        <a:buFontTx/>
+                        <a:buNone/>
+                        <a:tabLst/>
+                        <a:defRPr/>
+                      </a:pPr>
+                      <a:r>
+                        <a:rPr lang="de-DE" sz="1200"/>
+                        <a:t>{{each:subSub}}</a:t>
+                      </a:r>
+                    </a:p>
+                  </a:txBody>
+                  <a:tcPr anchor="b">
+                    <a:lnL w="38100" cap="flat" cmpd="sng" algn="ctr">
+                      <a:solidFill>
+                        <a:schemeClr val="bg1">
+                          <a:lumMod val="85000"/>
+                        </a:schemeClr>
+                      </a:solidFill>
+                      <a:prstDash val="solid"/>
+                      <a:round/>
+                      <a:headEnd type="none" w="med" len="med"/>
+                      <a:tailEnd type="none" w="med" len="med"/>
+                    </a:lnL>
+                    <a:lnR w="12700" cap="flat" cmpd="sng" algn="ctr">
+                      <a:solidFill>
+                        <a:schemeClr val="bg2">
+                          <a:lumMod val="75000"/>
+                        </a:schemeClr>
+                      </a:solidFill>
+                      <a:prstDash val="solid"/>
+                      <a:round/>
+                      <a:headEnd type="none" w="med" len="med"/>
+                      <a:tailEnd type="none" w="med" len="med"/>
+                    </a:lnR>
+                    <a:lnT w="12700" cap="flat" cmpd="sng" algn="ctr">
+                      <a:solidFill>
+                        <a:schemeClr val="bg2">
+                          <a:lumMod val="75000"/>
+                        </a:schemeClr>
+                      </a:solidFill>
+                      <a:prstDash val="solid"/>
+                      <a:round/>
+                      <a:headEnd type="none" w="med" len="med"/>
+                      <a:tailEnd type="none" w="med" len="med"/>
+                    </a:lnT>
+                    <a:lnB w="12700" cap="flat" cmpd="sng" algn="ctr">
+                      <a:solidFill>
+                        <a:schemeClr val="bg2">
+                          <a:lumMod val="75000"/>
+                        </a:schemeClr>
+                      </a:solidFill>
+                      <a:prstDash val="solid"/>
+                      <a:round/>
+                      <a:headEnd type="none" w="med" len="med"/>
+                      <a:tailEnd type="none" w="med" len="med"/>
+                    </a:lnB>
+                  </a:tcPr>
+                </a:tc>
+                <a:tc>
+                  <a:txBody>
+                    <a:bodyPr/>
+                    <a:lstStyle/>
+                    <a:p>
+                      <a:pPr algn="ctr"/>
+                      <a:r>
+                        <a:rPr kumimoji="0" lang="de-DE" sz="1200" u="none" strike="noStrike" kern="1200" cap="none" spc="0" normalizeH="0" baseline="0" noProof="0">
+                          <a:ln>
+                            <a:noFill/>
+                          </a:ln>
+                          <a:effectLst/>
+                          <a:uLnTx/>
+                          <a:uFillTx/>
+                        </a:rPr>
+                        <a:t>Diff</a:t>
+                      </a:r>
+                      <a:endParaRPr lang="de-DE" sz="1200"/>
+                    </a:p>
+                  </a:txBody>
+                  <a:tcPr anchor="b">
+                    <a:lnL w="12700" cap="flat" cmpd="sng" algn="ctr">
+                      <a:solidFill>
+                        <a:schemeClr val="bg2">
+                          <a:lumMod val="75000"/>
+                        </a:schemeClr>
+                      </a:solidFill>
+                      <a:prstDash val="solid"/>
+                      <a:round/>
+                      <a:headEnd type="none" w="med" len="med"/>
+                      <a:tailEnd type="none" w="med" len="med"/>
+                    </a:lnL>
+                    <a:lnR w="38100" cap="flat" cmpd="sng" algn="ctr">
+                      <a:solidFill>
+                        <a:schemeClr val="bg1">
+                          <a:lumMod val="85000"/>
+                        </a:schemeClr>
+                      </a:solidFill>
+                      <a:prstDash val="solid"/>
+                      <a:round/>
+                      <a:headEnd type="none" w="med" len="med"/>
+                      <a:tailEnd type="none" w="med" len="med"/>
+                    </a:lnR>
+                    <a:lnT w="12700" cap="flat" cmpd="sng" algn="ctr">
+                      <a:solidFill>
+                        <a:schemeClr val="bg2">
+                          <a:lumMod val="75000"/>
+                        </a:schemeClr>
+                      </a:solidFill>
+                      <a:prstDash val="solid"/>
+                      <a:round/>
+                      <a:headEnd type="none" w="med" len="med"/>
+                      <a:tailEnd type="none" w="med" len="med"/>
+                    </a:lnT>
+                    <a:lnB w="12700" cap="flat" cmpd="sng" algn="ctr">
+                      <a:solidFill>
+                        <a:schemeClr val="bg2">
+                          <a:lumMod val="75000"/>
+                        </a:schemeClr>
+                      </a:solidFill>
+                      <a:prstDash val="solid"/>
+                      <a:round/>
+                      <a:headEnd type="none" w="med" len="med"/>
+                      <a:tailEnd type="none" w="med" len="med"/>
+                    </a:lnB>
+                  </a:tcPr>
+                </a:tc>
+                <a:tc vMerge="1">
+                  <a:txBody>
+                    <a:bodyPr/>
+                    <a:lstStyle/>
+                    <a:p>
+                      <a:pPr algn="ctr"/>
+                      <a:endParaRPr lang="de-DE" sz="1200"/>
+                    </a:p>
+                  </a:txBody>
+                  <a:tcPr anchor="b">
+                    <a:lnL w="12700" cap="flat" cmpd="sng" algn="ctr">
+                      <a:solidFill>
+                        <a:schemeClr val="bg2">
+                          <a:lumMod val="75000"/>
+                        </a:schemeClr>
+                      </a:solidFill>
+                      <a:prstDash val="solid"/>
+                      <a:round/>
+                      <a:headEnd type="none" w="med" len="med"/>
+                      <a:tailEnd type="none" w="med" len="med"/>
+                    </a:lnL>
+                    <a:lnR w="12700" cap="flat" cmpd="sng" algn="ctr">
+                      <a:solidFill>
+                        <a:schemeClr val="bg2">
+                          <a:lumMod val="75000"/>
+                        </a:schemeClr>
+                      </a:solidFill>
+                      <a:prstDash val="solid"/>
+                      <a:round/>
+                      <a:headEnd type="none" w="med" len="med"/>
+                      <a:tailEnd type="none" w="med" len="med"/>
+                    </a:lnR>
+                    <a:lnT w="12700" cap="flat" cmpd="sng" algn="ctr">
+                      <a:solidFill>
+                        <a:schemeClr val="bg2">
+                          <a:lumMod val="75000"/>
+                        </a:schemeClr>
+                      </a:solidFill>
+                      <a:prstDash val="solid"/>
+                      <a:round/>
+                      <a:headEnd type="none" w="med" len="med"/>
+                      <a:tailEnd type="none" w="med" len="med"/>
+                    </a:lnT>
+                    <a:lnB w="12700" cap="flat" cmpd="sng" algn="ctr">
+                      <a:solidFill>
+                        <a:schemeClr val="bg2">
+                          <a:lumMod val="75000"/>
+                        </a:schemeClr>
+                      </a:solidFill>
+                      <a:prstDash val="solid"/>
+                      <a:round/>
+                      <a:headEnd type="none" w="med" len="med"/>
+                      <a:tailEnd type="none" w="med" len="med"/>
+                    </a:lnB>
+                  </a:tcPr>
+                </a:tc>
+                <a:extLst>
+                  <a:ext uri="{0D108BD9-81ED-4DB2-BD59-A6C34878D82A}">
+                    <a16:rowId xmlns:a16="http://schemas.microsoft.com/office/drawing/2014/main" val="3580438174"/>
+                  </a:ext>
+                </a:extLst>
+              </a:tr>
+              <a:tr h="370840">
+                <a:tc>
+                  <a:txBody>
+                    <a:bodyPr/>
+                    <a:lstStyle/>
+                    <a:p>
+                      <a:pPr algn="r"/>
+                      <a:r>
+                        <a:rPr lang="de-DE" sz="1200"/>
+                        <a:t>Header</a:t>
+                      </a:r>
+                    </a:p>
+                  </a:txBody>
+                  <a:tcPr anchor="ctr">
+                    <a:lnL w="12700" cap="flat" cmpd="sng" algn="ctr">
+                      <a:solidFill>
+                        <a:schemeClr val="bg2">
+                          <a:lumMod val="75000"/>
+                        </a:schemeClr>
+                      </a:solidFill>
+                      <a:prstDash val="solid"/>
+                      <a:round/>
+                      <a:headEnd type="none" w="med" len="med"/>
+                      <a:tailEnd type="none" w="med" len="med"/>
+                    </a:lnL>
+                    <a:lnR w="38100" cap="flat" cmpd="sng" algn="ctr">
+                      <a:solidFill>
+                        <a:schemeClr val="bg1">
+                          <a:lumMod val="85000"/>
+                        </a:schemeClr>
+                      </a:solidFill>
+                      <a:prstDash val="solid"/>
+                      <a:round/>
+                      <a:headEnd type="none" w="med" len="med"/>
+                      <a:tailEnd type="none" w="med" len="med"/>
+                    </a:lnR>
+                    <a:lnT w="12700" cap="flat" cmpd="sng" algn="ctr">
+                      <a:solidFill>
+                        <a:schemeClr val="bg2">
+                          <a:lumMod val="75000"/>
+                        </a:schemeClr>
+                      </a:solidFill>
+                      <a:prstDash val="solid"/>
+                      <a:round/>
+                      <a:headEnd type="none" w="med" len="med"/>
+                      <a:tailEnd type="none" w="med" len="med"/>
+                    </a:lnT>
+                    <a:lnB w="12700" cap="flat" cmpd="sng" algn="ctr">
+                      <a:solidFill>
+                        <a:schemeClr val="bg2">
+                          <a:lumMod val="75000"/>
+                        </a:schemeClr>
+                      </a:solidFill>
+                      <a:prstDash val="solid"/>
+                      <a:round/>
+                      <a:headEnd type="none" w="med" len="med"/>
+                      <a:tailEnd type="none" w="med" len="med"/>
+                    </a:lnB>
+                  </a:tcPr>
+                </a:tc>
+                <a:tc>
+                  <a:txBody>
+                    <a:bodyPr/>
+                    <a:lstStyle/>
+                    <a:p>
+                      <a:pPr algn="ctr"/>
+                      <a:r>
+                        <a:rPr kumimoji="0" lang="de-DE" sz="1000" b="0" i="0" u="none" strike="noStrike" kern="1200" cap="none" spc="0" normalizeH="0" baseline="0" noProof="0">
+                          <a:ln>
+                            <a:noFill/>
+                          </a:ln>
+                          <a:solidFill>
+                            <a:prstClr val="black"/>
+                          </a:solidFill>
+                          <a:effectLst/>
+                          <a:uLnTx/>
+                          <a:uFillTx/>
+                          <a:latin typeface="Calibri" panose="020F0502020204030204"/>
+                          <a:ea typeface="+mn-ea"/>
+                          <a:cs typeface="+mn-cs"/>
+                        </a:rPr>
+                        <a:t>-</a:t>
+                      </a:r>
+                      <a:endParaRPr lang="de-DE" sz="1000"/>
+                    </a:p>
+                  </a:txBody>
+                  <a:tcPr anchor="ctr">
+                    <a:lnL w="38100" cap="flat" cmpd="sng" algn="ctr">
+                      <a:solidFill>
+                        <a:schemeClr val="bg1">
+                          <a:lumMod val="85000"/>
+                        </a:schemeClr>
+                      </a:solidFill>
+                      <a:prstDash val="solid"/>
+                      <a:round/>
+                      <a:headEnd type="none" w="med" len="med"/>
+                      <a:tailEnd type="none" w="med" len="med"/>
+                    </a:lnL>
+                    <a:lnR w="12700" cap="flat" cmpd="sng" algn="ctr">
+                      <a:solidFill>
+                        <a:schemeClr val="bg2">
+                          <a:lumMod val="75000"/>
+                        </a:schemeClr>
+                      </a:solidFill>
+                      <a:prstDash val="solid"/>
+                      <a:round/>
+                      <a:headEnd type="none" w="med" len="med"/>
+                      <a:tailEnd type="none" w="med" len="med"/>
+                    </a:lnR>
+                    <a:lnT w="12700" cap="flat" cmpd="sng" algn="ctr">
+                      <a:solidFill>
+                        <a:schemeClr val="bg2">
+                          <a:lumMod val="75000"/>
+                        </a:schemeClr>
+                      </a:solidFill>
+                      <a:prstDash val="solid"/>
+                      <a:round/>
+                      <a:headEnd type="none" w="med" len="med"/>
+                      <a:tailEnd type="none" w="med" len="med"/>
+                    </a:lnT>
+                    <a:lnB w="12700" cap="flat" cmpd="sng" algn="ctr">
+                      <a:solidFill>
+                        <a:schemeClr val="bg2">
+                          <a:lumMod val="75000"/>
+                        </a:schemeClr>
+                      </a:solidFill>
+                      <a:prstDash val="solid"/>
+                      <a:round/>
+                      <a:headEnd type="none" w="med" len="med"/>
+                      <a:tailEnd type="none" w="med" len="med"/>
+                    </a:lnB>
+                  </a:tcPr>
+                </a:tc>
+                <a:tc>
+                  <a:txBody>
+                    <a:bodyPr/>
+                    <a:lstStyle/>
+                    <a:p>
+                      <a:pPr marL="0" marR="0" lvl="0" indent="0" algn="ctr" defTabSz="914400" rtl="0" eaLnBrk="1" fontAlgn="auto" latinLnBrk="0" hangingPunct="1">
+                        <a:lnSpc>
+                          <a:spcPct val="100000"/>
+                        </a:lnSpc>
+                        <a:spcBef>
+                          <a:spcPts val="0"/>
+                        </a:spcBef>
+                        <a:spcAft>
+                          <a:spcPts val="0"/>
+                        </a:spcAft>
+                        <a:buClrTx/>
+                        <a:buSzTx/>
+                        <a:buFontTx/>
+                        <a:buNone/>
+                        <a:tabLst/>
+                        <a:defRPr/>
+                      </a:pPr>
+                      <a:r>
+                        <a:rPr kumimoji="0" lang="de-DE" sz="1000" b="0" i="0" u="none" strike="noStrike" kern="1200" cap="none" spc="0" normalizeH="0" baseline="0" noProof="0">
+                          <a:ln>
+                            <a:noFill/>
+                          </a:ln>
+                          <a:solidFill>
+                            <a:prstClr val="black"/>
+                          </a:solidFill>
+                          <a:effectLst/>
+                          <a:uLnTx/>
+                          <a:uFillTx/>
+                          <a:latin typeface="Calibri" panose="020F0502020204030204"/>
+                          <a:ea typeface="+mn-ea"/>
+                          <a:cs typeface="+mn-cs"/>
+                        </a:rPr>
+                        <a:t>-</a:t>
+                      </a:r>
+                      <a:endParaRPr lang="de-DE" sz="1000"/>
+                    </a:p>
+                  </a:txBody>
+                  <a:tcPr anchor="ctr">
+                    <a:lnL w="12700" cap="flat" cmpd="sng" algn="ctr">
+                      <a:solidFill>
+                        <a:schemeClr val="bg2">
+                          <a:lumMod val="75000"/>
+                        </a:schemeClr>
+                      </a:solidFill>
+                      <a:prstDash val="solid"/>
+                      <a:round/>
+                      <a:headEnd type="none" w="med" len="med"/>
+                      <a:tailEnd type="none" w="med" len="med"/>
+                    </a:lnL>
+                    <a:lnR w="38100" cap="flat" cmpd="sng" algn="ctr">
+                      <a:solidFill>
+                        <a:schemeClr val="bg1">
+                          <a:lumMod val="85000"/>
+                        </a:schemeClr>
+                      </a:solidFill>
+                      <a:prstDash val="solid"/>
+                      <a:round/>
+                      <a:headEnd type="none" w="med" len="med"/>
+                      <a:tailEnd type="none" w="med" len="med"/>
+                    </a:lnR>
+                    <a:lnT w="12700" cap="flat" cmpd="sng" algn="ctr">
+                      <a:solidFill>
+                        <a:schemeClr val="bg2">
+                          <a:lumMod val="75000"/>
+                        </a:schemeClr>
+                      </a:solidFill>
+                      <a:prstDash val="solid"/>
+                      <a:round/>
+                      <a:headEnd type="none" w="med" len="med"/>
+                      <a:tailEnd type="none" w="med" len="med"/>
+                    </a:lnT>
+                    <a:lnB w="12700" cap="flat" cmpd="sng" algn="ctr">
+                      <a:solidFill>
+                        <a:schemeClr val="bg2">
+                          <a:lumMod val="75000"/>
+                        </a:schemeClr>
+                      </a:solidFill>
+                      <a:prstDash val="solid"/>
+                      <a:round/>
+                      <a:headEnd type="none" w="med" len="med"/>
+                      <a:tailEnd type="none" w="med" len="med"/>
+                    </a:lnB>
+                  </a:tcPr>
+                </a:tc>
+                <a:tc>
+                  <a:txBody>
+                    <a:bodyPr/>
+                    <a:lstStyle/>
+                    <a:p>
+                      <a:pPr marL="0" marR="0" lvl="0" indent="0" algn="ctr" defTabSz="914400" rtl="0" eaLnBrk="1" fontAlgn="auto" latinLnBrk="0" hangingPunct="1">
+                        <a:lnSpc>
+                          <a:spcPct val="100000"/>
+                        </a:lnSpc>
+                        <a:spcBef>
+                          <a:spcPts val="0"/>
+                        </a:spcBef>
+                        <a:spcAft>
+                          <a:spcPts val="0"/>
+                        </a:spcAft>
+                        <a:buClrTx/>
+                        <a:buSzTx/>
+                        <a:buFontTx/>
+                        <a:buNone/>
+                        <a:tabLst/>
+                        <a:defRPr/>
+                      </a:pPr>
+                      <a:r>
+                        <a:rPr kumimoji="0" lang="de-DE" sz="1000" b="0" i="0" u="none" strike="noStrike" kern="1200" cap="none" spc="0" normalizeH="0" baseline="0" noProof="0">
+                          <a:ln>
+                            <a:noFill/>
+                          </a:ln>
+                          <a:solidFill>
+                            <a:prstClr val="black"/>
+                          </a:solidFill>
+                          <a:effectLst/>
+                          <a:uLnTx/>
+                          <a:uFillTx/>
+                          <a:latin typeface="Calibri" panose="020F0502020204030204"/>
+                          <a:ea typeface="+mn-ea"/>
+                          <a:cs typeface="+mn-cs"/>
+                        </a:rPr>
+                        <a:t>-</a:t>
+                      </a:r>
+                      <a:endParaRPr lang="de-DE" sz="1000"/>
+                    </a:p>
+                  </a:txBody>
+                  <a:tcPr anchor="ctr">
+                    <a:lnL w="38100" cap="flat" cmpd="sng" algn="ctr">
+                      <a:solidFill>
+                        <a:schemeClr val="bg1">
+                          <a:lumMod val="85000"/>
+                        </a:schemeClr>
+                      </a:solidFill>
+                      <a:prstDash val="solid"/>
+                      <a:round/>
+                      <a:headEnd type="none" w="med" len="med"/>
+                      <a:tailEnd type="none" w="med" len="med"/>
+                    </a:lnL>
+                    <a:lnR w="12700" cap="flat" cmpd="sng" algn="ctr">
+                      <a:solidFill>
+                        <a:schemeClr val="bg2">
+                          <a:lumMod val="75000"/>
+                        </a:schemeClr>
+                      </a:solidFill>
+                      <a:prstDash val="solid"/>
+                      <a:round/>
+                      <a:headEnd type="none" w="med" len="med"/>
+                      <a:tailEnd type="none" w="med" len="med"/>
+                    </a:lnR>
+                    <a:lnT w="12700" cap="flat" cmpd="sng" algn="ctr">
+                      <a:solidFill>
+                        <a:schemeClr val="bg2">
+                          <a:lumMod val="75000"/>
+                        </a:schemeClr>
+                      </a:solidFill>
+                      <a:prstDash val="solid"/>
+                      <a:round/>
+                      <a:headEnd type="none" w="med" len="med"/>
+                      <a:tailEnd type="none" w="med" len="med"/>
+                    </a:lnT>
+                    <a:lnB w="12700" cap="flat" cmpd="sng" algn="ctr">
+                      <a:solidFill>
+                        <a:schemeClr val="bg2">
+                          <a:lumMod val="75000"/>
+                        </a:schemeClr>
+                      </a:solidFill>
+                      <a:prstDash val="solid"/>
+                      <a:round/>
+                      <a:headEnd type="none" w="med" len="med"/>
+                      <a:tailEnd type="none" w="med" len="med"/>
+                    </a:lnB>
+                  </a:tcPr>
+                </a:tc>
+                <a:extLst>
+                  <a:ext uri="{0D108BD9-81ED-4DB2-BD59-A6C34878D82A}">
+                    <a16:rowId xmlns:a16="http://schemas.microsoft.com/office/drawing/2014/main" val="625084061"/>
+                  </a:ext>
+                </a:extLst>
+              </a:tr>
+              <a:tr h="370840">
+                <a:tc>
+                  <a:txBody>
+                    <a:bodyPr/>
+                    <a:lstStyle/>
+                    <a:p>
+                      <a:pPr marL="0" marR="0" lvl="0" indent="0" algn="r" defTabSz="914400" rtl="0" eaLnBrk="1" fontAlgn="auto" latinLnBrk="0" hangingPunct="1">
+                        <a:lnSpc>
+                          <a:spcPct val="100000"/>
+                        </a:lnSpc>
+                        <a:spcBef>
+                          <a:spcPts val="0"/>
+                        </a:spcBef>
+                        <a:spcAft>
+                          <a:spcPts val="0"/>
+                        </a:spcAft>
+                        <a:buClrTx/>
+                        <a:buSzTx/>
+                        <a:buFontTx/>
+                        <a:buNone/>
+                        <a:tabLst/>
+                        <a:defRPr/>
+                      </a:pPr>
+                      <a:r>
+                        <a:rPr lang="de-DE" sz="1200"/>
+                        <a:t>{{each:row}}</a:t>
+                      </a:r>
+                    </a:p>
+                  </a:txBody>
+                  <a:tcPr anchor="ctr">
+                    <a:lnL w="12700" cap="flat" cmpd="sng" algn="ctr">
+                      <a:solidFill>
+                        <a:schemeClr val="bg2">
+                          <a:lumMod val="75000"/>
+                        </a:schemeClr>
+                      </a:solidFill>
+                      <a:prstDash val="solid"/>
+                      <a:round/>
+                      <a:headEnd type="none" w="med" len="med"/>
+                      <a:tailEnd type="none" w="med" len="med"/>
+                    </a:lnL>
+                    <a:lnR w="38100" cap="flat" cmpd="sng" algn="ctr">
+                      <a:solidFill>
+                        <a:schemeClr val="bg1">
+                          <a:lumMod val="85000"/>
+                        </a:schemeClr>
+                      </a:solidFill>
+                      <a:prstDash val="solid"/>
+                      <a:round/>
+                      <a:headEnd type="none" w="med" len="med"/>
+                      <a:tailEnd type="none" w="med" len="med"/>
+                    </a:lnR>
+                    <a:lnT w="12700" cap="flat" cmpd="sng" algn="ctr">
+                      <a:solidFill>
+                        <a:schemeClr val="bg2">
+                          <a:lumMod val="75000"/>
+                        </a:schemeClr>
+                      </a:solidFill>
+                      <a:prstDash val="solid"/>
+                      <a:round/>
+                      <a:headEnd type="none" w="med" len="med"/>
+                      <a:tailEnd type="none" w="med" len="med"/>
+                    </a:lnT>
+                    <a:lnB w="12700" cap="flat" cmpd="sng" algn="ctr">
+                      <a:solidFill>
+                        <a:schemeClr val="bg2">
+                          <a:lumMod val="75000"/>
+                        </a:schemeClr>
+                      </a:solidFill>
+                      <a:prstDash val="solid"/>
+                      <a:round/>
+                      <a:headEnd type="none" w="med" len="med"/>
+                      <a:tailEnd type="none" w="med" len="med"/>
+                    </a:lnB>
+                  </a:tcPr>
+                </a:tc>
+                <a:tc>
+                  <a:txBody>
+                    <a:bodyPr/>
+                    <a:lstStyle/>
+                    <a:p>
+                      <a:pPr algn="ctr"/>
+                      <a:r>
+                        <a:rPr kumimoji="0" lang="de-DE" sz="1000" b="0" i="0" u="none" strike="noStrike" kern="1200" cap="none" spc="0" normalizeH="0" baseline="0" noProof="0">
+                          <a:ln>
+                            <a:noFill/>
+                          </a:ln>
+                          <a:solidFill>
+                            <a:prstClr val="black"/>
+                          </a:solidFill>
+                          <a:effectLst/>
+                          <a:uLnTx/>
+                          <a:uFillTx/>
+                          <a:latin typeface="Calibri" panose="020F0502020204030204"/>
+                          <a:ea typeface="+mn-ea"/>
+                          <a:cs typeface="+mn-cs"/>
+                        </a:rPr>
+                        <a:t>-</a:t>
+                      </a:r>
+                      <a:endParaRPr lang="de-DE" sz="1000"/>
+                    </a:p>
+                  </a:txBody>
+                  <a:tcPr anchor="ctr">
+                    <a:lnL w="38100" cap="flat" cmpd="sng" algn="ctr">
+                      <a:solidFill>
+                        <a:schemeClr val="bg1">
+                          <a:lumMod val="85000"/>
+                        </a:schemeClr>
+                      </a:solidFill>
+                      <a:prstDash val="solid"/>
+                      <a:round/>
+                      <a:headEnd type="none" w="med" len="med"/>
+                      <a:tailEnd type="none" w="med" len="med"/>
+                    </a:lnL>
+                    <a:lnR w="12700" cap="flat" cmpd="sng" algn="ctr">
+                      <a:solidFill>
+                        <a:schemeClr val="bg2">
+                          <a:lumMod val="75000"/>
+                        </a:schemeClr>
+                      </a:solidFill>
+                      <a:prstDash val="solid"/>
+                      <a:round/>
+                      <a:headEnd type="none" w="med" len="med"/>
+                      <a:tailEnd type="none" w="med" len="med"/>
+                    </a:lnR>
+                    <a:lnT w="12700" cap="flat" cmpd="sng" algn="ctr">
+                      <a:solidFill>
+                        <a:schemeClr val="bg2">
+                          <a:lumMod val="75000"/>
+                        </a:schemeClr>
+                      </a:solidFill>
+                      <a:prstDash val="solid"/>
+                      <a:round/>
+                      <a:headEnd type="none" w="med" len="med"/>
+                      <a:tailEnd type="none" w="med" len="med"/>
+                    </a:lnT>
+                    <a:lnB w="12700" cap="flat" cmpd="sng" algn="ctr">
+                      <a:solidFill>
+                        <a:schemeClr val="bg2">
+                          <a:lumMod val="75000"/>
+                        </a:schemeClr>
+                      </a:solidFill>
+                      <a:prstDash val="solid"/>
+                      <a:round/>
+                      <a:headEnd type="none" w="med" len="med"/>
+                      <a:tailEnd type="none" w="med" len="med"/>
+                    </a:lnB>
+                  </a:tcPr>
+                </a:tc>
+                <a:tc>
+                  <a:txBody>
+                    <a:bodyPr/>
+                    <a:lstStyle/>
+                    <a:p>
+                      <a:pPr algn="ctr"/>
+                      <a:r>
+                        <a:rPr kumimoji="0" lang="de-DE" sz="1000" b="0" i="0" u="none" strike="noStrike" kern="1200" cap="none" spc="0" normalizeH="0" baseline="0" noProof="0">
+                          <a:ln>
+                            <a:noFill/>
+                          </a:ln>
+                          <a:solidFill>
+                            <a:prstClr val="black"/>
+                          </a:solidFill>
+                          <a:effectLst/>
+                          <a:uLnTx/>
+                          <a:uFillTx/>
+                          <a:latin typeface="Calibri" panose="020F0502020204030204"/>
+                          <a:ea typeface="+mn-ea"/>
+                          <a:cs typeface="+mn-cs"/>
+                        </a:rPr>
+                        <a:t>-</a:t>
+                      </a:r>
+                      <a:endParaRPr lang="de-DE" sz="1000"/>
+                    </a:p>
+                  </a:txBody>
+                  <a:tcPr anchor="ctr">
+                    <a:lnL w="12700" cap="flat" cmpd="sng" algn="ctr">
+                      <a:solidFill>
+                        <a:schemeClr val="bg2">
+                          <a:lumMod val="75000"/>
+                        </a:schemeClr>
+                      </a:solidFill>
+                      <a:prstDash val="solid"/>
+                      <a:round/>
+                      <a:headEnd type="none" w="med" len="med"/>
+                      <a:tailEnd type="none" w="med" len="med"/>
+                    </a:lnL>
+                    <a:lnR w="38100" cap="flat" cmpd="sng" algn="ctr">
+                      <a:solidFill>
+                        <a:schemeClr val="bg1">
+                          <a:lumMod val="85000"/>
+                        </a:schemeClr>
+                      </a:solidFill>
+                      <a:prstDash val="solid"/>
+                      <a:round/>
+                      <a:headEnd type="none" w="med" len="med"/>
+                      <a:tailEnd type="none" w="med" len="med"/>
+                    </a:lnR>
+                    <a:lnT w="12700" cap="flat" cmpd="sng" algn="ctr">
+                      <a:solidFill>
+                        <a:schemeClr val="bg2">
+                          <a:lumMod val="75000"/>
+                        </a:schemeClr>
+                      </a:solidFill>
+                      <a:prstDash val="solid"/>
+                      <a:round/>
+                      <a:headEnd type="none" w="med" len="med"/>
+                      <a:tailEnd type="none" w="med" len="med"/>
+                    </a:lnT>
+                    <a:lnB w="12700" cap="flat" cmpd="sng" algn="ctr">
+                      <a:solidFill>
+                        <a:schemeClr val="bg2">
+                          <a:lumMod val="75000"/>
+                        </a:schemeClr>
+                      </a:solidFill>
+                      <a:prstDash val="solid"/>
+                      <a:round/>
+                      <a:headEnd type="none" w="med" len="med"/>
+                      <a:tailEnd type="none" w="med" len="med"/>
+                    </a:lnB>
+                  </a:tcPr>
+                </a:tc>
+                <a:tc>
+                  <a:txBody>
+                    <a:bodyPr/>
+                    <a:lstStyle/>
+                    <a:p>
+                      <a:pPr algn="ctr"/>
+                      <a:r>
+                        <a:rPr kumimoji="0" lang="de-DE" sz="1000" b="0" i="0" u="none" strike="noStrike" kern="1200" cap="none" spc="0" normalizeH="0" baseline="0" noProof="0">
+                          <a:ln>
+                            <a:noFill/>
+                          </a:ln>
+                          <a:solidFill>
+                            <a:prstClr val="black"/>
+                          </a:solidFill>
+                          <a:effectLst/>
+                          <a:uLnTx/>
+                          <a:uFillTx/>
+                          <a:latin typeface="Calibri" panose="020F0502020204030204"/>
+                          <a:ea typeface="+mn-ea"/>
+                          <a:cs typeface="+mn-cs"/>
+                        </a:rPr>
+                        <a:t>-</a:t>
+                      </a:r>
+                      <a:endParaRPr lang="de-DE" sz="1000"/>
+                    </a:p>
+                  </a:txBody>
+                  <a:tcPr anchor="ctr">
+                    <a:lnL w="38100" cap="flat" cmpd="sng" algn="ctr">
+                      <a:solidFill>
+                        <a:schemeClr val="bg1">
+                          <a:lumMod val="85000"/>
+                        </a:schemeClr>
+                      </a:solidFill>
+                      <a:prstDash val="solid"/>
+                      <a:round/>
+                      <a:headEnd type="none" w="med" len="med"/>
+                      <a:tailEnd type="none" w="med" len="med"/>
+                    </a:lnL>
+                    <a:lnR w="12700" cap="flat" cmpd="sng" algn="ctr">
+                      <a:solidFill>
+                        <a:schemeClr val="bg2">
+                          <a:lumMod val="75000"/>
+                        </a:schemeClr>
+                      </a:solidFill>
+                      <a:prstDash val="solid"/>
+                      <a:round/>
+                      <a:headEnd type="none" w="med" len="med"/>
+                      <a:tailEnd type="none" w="med" len="med"/>
+                    </a:lnR>
+                    <a:lnT w="12700" cap="flat" cmpd="sng" algn="ctr">
+                      <a:solidFill>
+                        <a:schemeClr val="bg2">
+                          <a:lumMod val="75000"/>
+                        </a:schemeClr>
+                      </a:solidFill>
+                      <a:prstDash val="solid"/>
+                      <a:round/>
+                      <a:headEnd type="none" w="med" len="med"/>
+                      <a:tailEnd type="none" w="med" len="med"/>
+                    </a:lnT>
+                    <a:lnB w="12700" cap="flat" cmpd="sng" algn="ctr">
+                      <a:solidFill>
+                        <a:schemeClr val="bg2">
+                          <a:lumMod val="75000"/>
+                        </a:schemeClr>
+                      </a:solidFill>
+                      <a:prstDash val="solid"/>
+                      <a:round/>
+                      <a:headEnd type="none" w="med" len="med"/>
+                      <a:tailEnd type="none" w="med" len="med"/>
+                    </a:lnB>
+                  </a:tcPr>
+                </a:tc>
+                <a:extLst>
+                  <a:ext uri="{0D108BD9-81ED-4DB2-BD59-A6C34878D82A}">
+                    <a16:rowId xmlns:a16="http://schemas.microsoft.com/office/drawing/2014/main" val="3257207914"/>
+                  </a:ext>
+                </a:extLst>
+              </a:tr>
+              <a:tr h="370840">
+                <a:tc>
+                  <a:txBody>
+                    <a:bodyPr/>
+                    <a:lstStyle/>
+                    <a:p>
+                      <a:pPr marL="0" marR="0" lvl="0" indent="0" algn="r" defTabSz="914400" rtl="0" eaLnBrk="1" fontAlgn="auto" latinLnBrk="0" hangingPunct="1">
+                        <a:lnSpc>
+                          <a:spcPct val="100000"/>
+                        </a:lnSpc>
+                        <a:spcBef>
+                          <a:spcPts val="0"/>
+                        </a:spcBef>
+                        <a:spcAft>
+                          <a:spcPts val="0"/>
+                        </a:spcAft>
+                        <a:buClrTx/>
+                        <a:buSzTx/>
+                        <a:buFontTx/>
+                        <a:buNone/>
+                        <a:tabLst/>
+                        <a:defRPr/>
+                      </a:pPr>
+                      <a:r>
+                        <a:rPr lang="de-DE" sz="1200"/>
+                        <a:t>Footer</a:t>
+                      </a:r>
+                    </a:p>
+                  </a:txBody>
+                  <a:tcPr anchor="ctr">
+                    <a:lnL w="12700" cap="flat" cmpd="sng" algn="ctr">
+                      <a:solidFill>
+                        <a:schemeClr val="bg2">
+                          <a:lumMod val="75000"/>
+                        </a:schemeClr>
+                      </a:solidFill>
+                      <a:prstDash val="solid"/>
+                      <a:round/>
+                      <a:headEnd type="none" w="med" len="med"/>
+                      <a:tailEnd type="none" w="med" len="med"/>
+                    </a:lnL>
+                    <a:lnR w="38100" cap="flat" cmpd="sng" algn="ctr">
+                      <a:solidFill>
+                        <a:schemeClr val="bg1">
+                          <a:lumMod val="85000"/>
+                        </a:schemeClr>
+                      </a:solidFill>
+                      <a:prstDash val="solid"/>
+                      <a:round/>
+                      <a:headEnd type="none" w="med" len="med"/>
+                      <a:tailEnd type="none" w="med" len="med"/>
+                    </a:lnR>
+                    <a:lnT w="12700" cap="flat" cmpd="sng" algn="ctr">
+                      <a:solidFill>
+                        <a:schemeClr val="bg2">
+                          <a:lumMod val="75000"/>
+                        </a:schemeClr>
+                      </a:solidFill>
+                      <a:prstDash val="solid"/>
+                      <a:round/>
+                      <a:headEnd type="none" w="med" len="med"/>
+                      <a:tailEnd type="none" w="med" len="med"/>
+                    </a:lnT>
+                    <a:lnB w="12700" cap="flat" cmpd="sng" algn="ctr">
+                      <a:solidFill>
+                        <a:schemeClr val="bg2">
+                          <a:lumMod val="75000"/>
+                        </a:schemeClr>
+                      </a:solidFill>
+                      <a:prstDash val="solid"/>
+                      <a:round/>
+                      <a:headEnd type="none" w="med" len="med"/>
+                      <a:tailEnd type="none" w="med" len="med"/>
+                    </a:lnB>
+                  </a:tcPr>
+                </a:tc>
+                <a:tc>
+                  <a:txBody>
+                    <a:bodyPr/>
+                    <a:lstStyle/>
+                    <a:p>
+                      <a:pPr marL="0" marR="0" lvl="0" indent="0" algn="ctr" defTabSz="914400" rtl="0" eaLnBrk="1" fontAlgn="auto" latinLnBrk="0" hangingPunct="1">
+                        <a:lnSpc>
+                          <a:spcPct val="100000"/>
+                        </a:lnSpc>
+                        <a:spcBef>
+                          <a:spcPts val="0"/>
+                        </a:spcBef>
+                        <a:spcAft>
+                          <a:spcPts val="0"/>
+                        </a:spcAft>
+                        <a:buClrTx/>
+                        <a:buSzTx/>
+                        <a:buFontTx/>
+                        <a:buNone/>
+                        <a:tabLst/>
+                        <a:defRPr/>
+                      </a:pPr>
+                      <a:r>
+                        <a:rPr kumimoji="0" lang="de-DE" sz="1000" b="0" i="0" u="none" strike="noStrike" kern="1200" cap="none" spc="0" normalizeH="0" baseline="0" noProof="0">
+                          <a:ln>
+                            <a:noFill/>
+                          </a:ln>
+                          <a:solidFill>
+                            <a:prstClr val="black"/>
+                          </a:solidFill>
+                          <a:effectLst/>
+                          <a:uLnTx/>
+                          <a:uFillTx/>
+                          <a:latin typeface="Calibri" panose="020F0502020204030204"/>
+                          <a:ea typeface="+mn-ea"/>
+                          <a:cs typeface="+mn-cs"/>
+                        </a:rPr>
+                        <a:t>-</a:t>
+                      </a:r>
+                      <a:endParaRPr lang="de-DE" sz="1000"/>
+                    </a:p>
+                  </a:txBody>
+                  <a:tcPr anchor="ctr">
+                    <a:lnL w="38100" cap="flat" cmpd="sng" algn="ctr">
+                      <a:solidFill>
+                        <a:schemeClr val="bg1">
+                          <a:lumMod val="85000"/>
+                        </a:schemeClr>
+                      </a:solidFill>
+                      <a:prstDash val="solid"/>
+                      <a:round/>
+                      <a:headEnd type="none" w="med" len="med"/>
+                      <a:tailEnd type="none" w="med" len="med"/>
+                    </a:lnL>
+                    <a:lnR w="12700" cap="flat" cmpd="sng" algn="ctr">
+                      <a:solidFill>
+                        <a:schemeClr val="bg2">
+                          <a:lumMod val="75000"/>
+                        </a:schemeClr>
+                      </a:solidFill>
+                      <a:prstDash val="solid"/>
+                      <a:round/>
+                      <a:headEnd type="none" w="med" len="med"/>
+                      <a:tailEnd type="none" w="med" len="med"/>
+                    </a:lnR>
+                    <a:lnT w="12700" cap="flat" cmpd="sng" algn="ctr">
+                      <a:solidFill>
+                        <a:schemeClr val="bg2">
+                          <a:lumMod val="75000"/>
+                        </a:schemeClr>
+                      </a:solidFill>
+                      <a:prstDash val="solid"/>
+                      <a:round/>
+                      <a:headEnd type="none" w="med" len="med"/>
+                      <a:tailEnd type="none" w="med" len="med"/>
+                    </a:lnT>
+                    <a:lnB w="12700" cap="flat" cmpd="sng" algn="ctr">
+                      <a:solidFill>
+                        <a:schemeClr val="bg2">
+                          <a:lumMod val="75000"/>
+                        </a:schemeClr>
+                      </a:solidFill>
+                      <a:prstDash val="solid"/>
+                      <a:round/>
+                      <a:headEnd type="none" w="med" len="med"/>
+                      <a:tailEnd type="none" w="med" len="med"/>
+                    </a:lnB>
+                  </a:tcPr>
+                </a:tc>
+                <a:tc>
+                  <a:txBody>
+                    <a:bodyPr/>
+                    <a:lstStyle/>
+                    <a:p>
+                      <a:pPr algn="ctr"/>
+                      <a:r>
+                        <a:rPr kumimoji="0" lang="de-DE" sz="1000" b="0" i="0" u="none" strike="noStrike" kern="1200" cap="none" spc="0" normalizeH="0" baseline="0" noProof="0">
+                          <a:ln>
+                            <a:noFill/>
+                          </a:ln>
+                          <a:solidFill>
+                            <a:prstClr val="black"/>
+                          </a:solidFill>
+                          <a:effectLst/>
+                          <a:uLnTx/>
+                          <a:uFillTx/>
+                          <a:latin typeface="Calibri" panose="020F0502020204030204"/>
+                          <a:ea typeface="+mn-ea"/>
+                          <a:cs typeface="+mn-cs"/>
+                        </a:rPr>
+                        <a:t>-</a:t>
+                      </a:r>
+                      <a:endParaRPr lang="de-DE" sz="1000"/>
+                    </a:p>
+                  </a:txBody>
+                  <a:tcPr anchor="ctr">
+                    <a:lnL w="12700" cap="flat" cmpd="sng" algn="ctr">
+                      <a:solidFill>
+                        <a:schemeClr val="bg2">
+                          <a:lumMod val="75000"/>
+                        </a:schemeClr>
+                      </a:solidFill>
+                      <a:prstDash val="solid"/>
+                      <a:round/>
+                      <a:headEnd type="none" w="med" len="med"/>
+                      <a:tailEnd type="none" w="med" len="med"/>
+                    </a:lnL>
+                    <a:lnR w="38100" cap="flat" cmpd="sng" algn="ctr">
+                      <a:solidFill>
+                        <a:schemeClr val="bg1">
+                          <a:lumMod val="85000"/>
+                        </a:schemeClr>
+                      </a:solidFill>
+                      <a:prstDash val="solid"/>
+                      <a:round/>
+                      <a:headEnd type="none" w="med" len="med"/>
+                      <a:tailEnd type="none" w="med" len="med"/>
+                    </a:lnR>
+                    <a:lnT w="12700" cap="flat" cmpd="sng" algn="ctr">
+                      <a:solidFill>
+                        <a:schemeClr val="bg2">
+                          <a:lumMod val="75000"/>
+                        </a:schemeClr>
+                      </a:solidFill>
+                      <a:prstDash val="solid"/>
+                      <a:round/>
+                      <a:headEnd type="none" w="med" len="med"/>
+                      <a:tailEnd type="none" w="med" len="med"/>
+                    </a:lnT>
+                    <a:lnB w="12700" cap="flat" cmpd="sng" algn="ctr">
+                      <a:solidFill>
+                        <a:schemeClr val="bg2">
+                          <a:lumMod val="75000"/>
+                        </a:schemeClr>
+                      </a:solidFill>
+                      <a:prstDash val="solid"/>
+                      <a:round/>
+                      <a:headEnd type="none" w="med" len="med"/>
+                      <a:tailEnd type="none" w="med" len="med"/>
+                    </a:lnB>
+                  </a:tcPr>
+                </a:tc>
+                <a:tc>
+                  <a:txBody>
+                    <a:bodyPr/>
+                    <a:lstStyle/>
+                    <a:p>
+                      <a:pPr algn="ctr"/>
+                      <a:r>
+                        <a:rPr kumimoji="0" lang="de-DE" sz="1000" b="0" i="0" u="none" strike="noStrike" kern="1200" cap="none" spc="0" normalizeH="0" baseline="0" noProof="0">
+                          <a:ln>
+                            <a:noFill/>
+                          </a:ln>
+                          <a:solidFill>
+                            <a:prstClr val="black"/>
+                          </a:solidFill>
+                          <a:effectLst/>
+                          <a:uLnTx/>
+                          <a:uFillTx/>
+                          <a:latin typeface="Calibri" panose="020F0502020204030204"/>
+                          <a:ea typeface="+mn-ea"/>
+                          <a:cs typeface="+mn-cs"/>
+                        </a:rPr>
+                        <a:t>-</a:t>
+                      </a:r>
+                      <a:endParaRPr lang="de-DE" sz="1000"/>
+                    </a:p>
+                  </a:txBody>
+                  <a:tcPr anchor="ctr">
+                    <a:lnL w="38100" cap="flat" cmpd="sng" algn="ctr">
+                      <a:solidFill>
+                        <a:schemeClr val="bg1">
+                          <a:lumMod val="85000"/>
+                        </a:schemeClr>
+                      </a:solidFill>
+                      <a:prstDash val="solid"/>
+                      <a:round/>
+                      <a:headEnd type="none" w="med" len="med"/>
+                      <a:tailEnd type="none" w="med" len="med"/>
+                    </a:lnL>
+                    <a:lnR w="12700" cap="flat" cmpd="sng" algn="ctr">
+                      <a:solidFill>
+                        <a:schemeClr val="bg2">
+                          <a:lumMod val="75000"/>
+                        </a:schemeClr>
+                      </a:solidFill>
+                      <a:prstDash val="solid"/>
+                      <a:round/>
+                      <a:headEnd type="none" w="med" len="med"/>
+                      <a:tailEnd type="none" w="med" len="med"/>
+                    </a:lnR>
+                    <a:lnT w="12700" cap="flat" cmpd="sng" algn="ctr">
+                      <a:solidFill>
+                        <a:schemeClr val="bg2">
+                          <a:lumMod val="75000"/>
+                        </a:schemeClr>
+                      </a:solidFill>
+                      <a:prstDash val="solid"/>
+                      <a:round/>
+                      <a:headEnd type="none" w="med" len="med"/>
+                      <a:tailEnd type="none" w="med" len="med"/>
+                    </a:lnT>
+                    <a:lnB w="12700" cap="flat" cmpd="sng" algn="ctr">
+                      <a:solidFill>
+                        <a:schemeClr val="bg2">
+                          <a:lumMod val="75000"/>
+                        </a:schemeClr>
+                      </a:solidFill>
+                      <a:prstDash val="solid"/>
+                      <a:round/>
+                      <a:headEnd type="none" w="med" len="med"/>
+                      <a:tailEnd type="none" w="med" len="med"/>
+                    </a:lnB>
+                  </a:tcPr>
+                </a:tc>
+                <a:extLst>
+                  <a:ext uri="{0D108BD9-81ED-4DB2-BD59-A6C34878D82A}">
+                    <a16:rowId xmlns:a16="http://schemas.microsoft.com/office/drawing/2014/main" val="3395256489"/>
+                  </a:ext>
+                </a:extLst>
+              </a:tr>
+            </a:tbl>
+          </a:graphicData>
+        </a:graphic>
+      </p:graphicFrame>
+    </p:spTree>
+    <p:extLst>
+      <p:ext uri="{BB962C8B-B14F-4D97-AF65-F5344CB8AC3E}">
+        <p14:creationId xmlns:p14="http://schemas.microsoft.com/office/powerpoint/2010/main" val="3459604012"/>
+      </p:ext>
+    </p:extLst>
+  </p:cSld>
+  <p:clrMapOvr>
+    <a:masterClrMapping/>
+  </p:clrMapOvr>
+</p:sld>
+</file>
+
+<file path=ppt/slides/slide3.xml><?xml version="1.0" encoding="utf-8"?>
+<p:sld xmlns:a="http://schemas.openxmlformats.org/drawingml/2006/main" xmlns:r="http://schemas.openxmlformats.org/officeDocument/2006/relationships" xmlns:p="http://schemas.openxmlformats.org/presentationml/2006/main">
+  <p:cSld>
+    <p:spTree>
+      <p:nvGrpSpPr>
+        <p:cNvPr id="1" name=""/>
+        <p:cNvGrpSpPr/>
+        <p:nvPr/>
+      </p:nvGrpSpPr>
+      <p:grpSpPr>
+        <a:xfrm>
+          <a:off x="0" y="0"/>
+          <a:ext cx="0" cy="0"/>
+          <a:chOff x="0" y="0"/>
+          <a:chExt cx="0" cy="0"/>
+        </a:xfrm>
+      </p:grpSpPr>
+      <p:sp>
+        <p:nvSpPr>
+          <p:cNvPr id="5" name="Titel 4">
+            <a:extLst>
+              <a:ext uri="{FF2B5EF4-FFF2-40B4-BE49-F238E27FC236}">
+                <a16:creationId xmlns:a16="http://schemas.microsoft.com/office/drawing/2014/main" id="{B8BB8EC6-C7DA-4E2F-86DF-BDE9856B03BD}"/>
+              </a:ext>
+            </a:extLst>
+          </p:cNvPr>
+          <p:cNvSpPr>
+            <a:spLocks noGrp="1"/>
+          </p:cNvSpPr>
+          <p:nvPr>
+            <p:ph type="title"/>
+          </p:nvPr>
+        </p:nvSpPr>
+        <p:spPr>
+          <a:xfrm>
+            <a:off x="0" y="24653"/>
+            <a:ext cx="10515600" cy="446405"/>
+          </a:xfrm>
+        </p:spPr>
+        <p:txBody>
+          <a:bodyPr>
+            <a:normAutofit/>
+          </a:bodyPr>
+          <a:lstStyle/>
+          <a:p>
+            <a:r>
+              <a:rPr lang="de-DE" sz="1400" b="1"/>
+              <a:t>NestedTable3</a:t>
+            </a:r>
+          </a:p>
+        </p:txBody>
+      </p:sp>
+      <p:graphicFrame>
+        <p:nvGraphicFramePr>
+          <p:cNvPr id="7" name="NestedTable3">
+            <a:extLst>
+              <a:ext uri="{FF2B5EF4-FFF2-40B4-BE49-F238E27FC236}">
+                <a16:creationId xmlns:a16="http://schemas.microsoft.com/office/drawing/2014/main" id="{C4847EC1-F174-4533-9A6B-8A897174AFE7}"/>
+              </a:ext>
+            </a:extLst>
+          </p:cNvPr>
+          <p:cNvGraphicFramePr>
+            <a:graphicFrameLocks noGrp="1"/>
+          </p:cNvGraphicFramePr>
+          <p:nvPr>
+            <p:extLst>
+              <p:ext uri="{D42A27DB-BD31-4B8C-83A1-F6EECF244321}">
+                <p14:modId xmlns:p14="http://schemas.microsoft.com/office/powerpoint/2010/main" val="3194612128"/>
+              </p:ext>
+            </p:extLst>
+          </p:nvPr>
+        </p:nvGraphicFramePr>
+        <p:xfrm>
+          <a:off x="638154" y="1880858"/>
+          <a:ext cx="3508333" cy="1940560"/>
+        </p:xfrm>
+        <a:graphic>
+          <a:graphicData uri="http://schemas.openxmlformats.org/drawingml/2006/table">
+            <a:tbl>
+              <a:tblPr bandRow="1">
+                <a:tableStyleId>{2D5ABB26-0587-4C30-8999-92F81FD0307C}</a:tableStyleId>
+              </a:tblPr>
+              <a:tblGrid>
+                <a:gridCol w="987989">
+                  <a:extLst>
+                    <a:ext uri="{9D8B030D-6E8A-4147-A177-3AD203B41FA5}">
+                      <a16:colId xmlns:a16="http://schemas.microsoft.com/office/drawing/2014/main" val="2081046437"/>
+                    </a:ext>
+                  </a:extLst>
+                </a:gridCol>
+                <a:gridCol w="987989">
+                  <a:extLst>
+                    <a:ext uri="{9D8B030D-6E8A-4147-A177-3AD203B41FA5}">
+                      <a16:colId xmlns:a16="http://schemas.microsoft.com/office/drawing/2014/main" val="3700495073"/>
+                    </a:ext>
+                  </a:extLst>
+                </a:gridCol>
+                <a:gridCol w="987989">
+                  <a:extLst>
+                    <a:ext uri="{9D8B030D-6E8A-4147-A177-3AD203B41FA5}">
+                      <a16:colId xmlns:a16="http://schemas.microsoft.com/office/drawing/2014/main" val="113879652"/>
+                    </a:ext>
+                  </a:extLst>
+                </a:gridCol>
+                <a:gridCol w="544366">
+                  <a:extLst>
+                    <a:ext uri="{9D8B030D-6E8A-4147-A177-3AD203B41FA5}">
+                      <a16:colId xmlns:a16="http://schemas.microsoft.com/office/drawing/2014/main" val="1384176072"/>
+                    </a:ext>
+                  </a:extLst>
+                </a:gridCol>
+              </a:tblGrid>
+              <a:tr h="370840">
+                <a:tc rowSpan="2">
+                  <a:txBody>
+                    <a:bodyPr/>
+                    <a:lstStyle/>
+                    <a:p>
+                      <a:pPr algn="ctr"/>
+                      <a:r>
+                        <a:rPr kumimoji="0" lang="de-DE" sz="1200" u="none" strike="noStrike" kern="1200" cap="none" spc="0" normalizeH="0" baseline="0" noProof="0">
+                          <a:ln>
+                            <a:noFill/>
+                          </a:ln>
+                          <a:effectLst/>
+                          <a:uLnTx/>
+                          <a:uFillTx/>
+                        </a:rPr>
+                        <a:t>A1-A2</a:t>
+                      </a:r>
+                      <a:endParaRPr lang="de-DE" sz="1200"/>
+                    </a:p>
+                  </a:txBody>
+                  <a:tcPr anchor="ctr">
+                    <a:lnL w="12700" cap="flat" cmpd="sng" algn="ctr">
+                      <a:solidFill>
+                        <a:schemeClr val="bg2">
+                          <a:lumMod val="75000"/>
+                        </a:schemeClr>
+                      </a:solidFill>
+                      <a:prstDash val="solid"/>
+                      <a:round/>
+                      <a:headEnd type="none" w="med" len="med"/>
+                      <a:tailEnd type="none" w="med" len="med"/>
+                    </a:lnL>
+                    <a:lnR w="38100" cap="flat" cmpd="sng" algn="ctr">
+                      <a:solidFill>
+                        <a:schemeClr val="bg1">
+                          <a:lumMod val="85000"/>
+                        </a:schemeClr>
+                      </a:solidFill>
+                      <a:prstDash val="solid"/>
+                      <a:round/>
+                      <a:headEnd type="none" w="med" len="med"/>
+                      <a:tailEnd type="none" w="med" len="med"/>
+                    </a:lnR>
+                    <a:lnT w="12700" cap="flat" cmpd="sng" algn="ctr">
+                      <a:solidFill>
+                        <a:schemeClr val="bg2">
+                          <a:lumMod val="75000"/>
+                        </a:schemeClr>
+                      </a:solidFill>
+                      <a:prstDash val="solid"/>
+                      <a:round/>
+                      <a:headEnd type="none" w="med" len="med"/>
+                      <a:tailEnd type="none" w="med" len="med"/>
+                    </a:lnT>
+                    <a:lnB w="12700" cap="flat" cmpd="sng" algn="ctr">
+                      <a:solidFill>
+                        <a:schemeClr val="bg2">
+                          <a:lumMod val="75000"/>
+                        </a:schemeClr>
+                      </a:solidFill>
+                      <a:prstDash val="solid"/>
+                      <a:round/>
+                      <a:headEnd type="none" w="med" len="med"/>
+                      <a:tailEnd type="none" w="med" len="med"/>
+                    </a:lnB>
+                  </a:tcPr>
+                </a:tc>
+                <a:tc gridSpan="2">
+                  <a:txBody>
+                    <a:bodyPr/>
+                    <a:lstStyle/>
+                    <a:p>
+                      <a:pPr algn="ctr"/>
+                      <a:r>
+                        <a:rPr lang="de-DE" sz="1200"/>
+                        <a:t>{{each:sub}}</a:t>
+                      </a:r>
+                    </a:p>
+                  </a:txBody>
+                  <a:tcPr anchor="ctr">
+                    <a:lnL w="38100" cap="flat" cmpd="sng" algn="ctr">
+                      <a:solidFill>
+                        <a:schemeClr val="bg1">
+                          <a:lumMod val="85000"/>
+                        </a:schemeClr>
+                      </a:solidFill>
+                      <a:prstDash val="solid"/>
+                      <a:round/>
+                      <a:headEnd type="none" w="med" len="med"/>
+                      <a:tailEnd type="none" w="med" len="med"/>
+                    </a:lnL>
+                    <a:lnR w="38100" cap="flat" cmpd="sng" algn="ctr">
+                      <a:solidFill>
+                        <a:schemeClr val="bg1">
+                          <a:lumMod val="85000"/>
+                        </a:schemeClr>
+                      </a:solidFill>
+                      <a:prstDash val="solid"/>
+                      <a:round/>
+                      <a:headEnd type="none" w="med" len="med"/>
+                      <a:tailEnd type="none" w="med" len="med"/>
+                    </a:lnR>
+                    <a:lnT w="12700" cap="flat" cmpd="sng" algn="ctr">
+                      <a:solidFill>
+                        <a:schemeClr val="bg2">
+                          <a:lumMod val="75000"/>
+                        </a:schemeClr>
+                      </a:solidFill>
+                      <a:prstDash val="solid"/>
+                      <a:round/>
+                      <a:headEnd type="none" w="med" len="med"/>
+                      <a:tailEnd type="none" w="med" len="med"/>
+                    </a:lnT>
+                    <a:lnB w="12700" cap="flat" cmpd="sng" algn="ctr">
+                      <a:solidFill>
+                        <a:schemeClr val="bg2">
+                          <a:lumMod val="75000"/>
+                        </a:schemeClr>
+                      </a:solidFill>
+                      <a:prstDash val="solid"/>
+                      <a:round/>
+                      <a:headEnd type="none" w="med" len="med"/>
+                      <a:tailEnd type="none" w="med" len="med"/>
+                    </a:lnB>
+                  </a:tcPr>
+                </a:tc>
+                <a:tc hMerge="1">
+                  <a:txBody>
+                    <a:bodyPr/>
+                    <a:lstStyle/>
+                    <a:p>
+                      <a:pPr algn="ctr"/>
+                      <a:endParaRPr lang="de-DE" sz="1400"/>
+                    </a:p>
+                  </a:txBody>
+                  <a:tcPr>
+                    <a:lnL w="12700" cap="flat" cmpd="sng" algn="ctr">
+                      <a:solidFill>
+                        <a:schemeClr val="bg2">
+                          <a:lumMod val="75000"/>
+                        </a:schemeClr>
+                      </a:solidFill>
+                      <a:prstDash val="solid"/>
+                      <a:round/>
+                      <a:headEnd type="none" w="med" len="med"/>
+                      <a:tailEnd type="none" w="med" len="med"/>
+                    </a:lnL>
+                  </a:tcPr>
+                </a:tc>
+                <a:tc rowSpan="2">
+                  <a:txBody>
+                    <a:bodyPr/>
+                    <a:lstStyle/>
+                    <a:p>
+                      <a:pPr algn="ctr"/>
+                      <a:r>
+                        <a:rPr lang="de-DE" sz="1200"/>
+                        <a:t>Last</a:t>
+                      </a:r>
+                    </a:p>
+                  </a:txBody>
+                  <a:tcPr anchor="ctr">
+                    <a:lnL w="38100" cap="flat" cmpd="sng" algn="ctr">
+                      <a:solidFill>
+                        <a:schemeClr val="bg1">
+                          <a:lumMod val="85000"/>
+                        </a:schemeClr>
+                      </a:solidFill>
+                      <a:prstDash val="solid"/>
+                      <a:round/>
+                      <a:headEnd type="none" w="med" len="med"/>
+                      <a:tailEnd type="none" w="med" len="med"/>
+                    </a:lnL>
+                    <a:lnR w="12700" cap="flat" cmpd="sng" algn="ctr">
+                      <a:solidFill>
+                        <a:schemeClr val="bg2">
+                          <a:lumMod val="75000"/>
+                        </a:schemeClr>
+                      </a:solidFill>
+                      <a:prstDash val="solid"/>
+                      <a:round/>
+                      <a:headEnd type="none" w="med" len="med"/>
+                      <a:tailEnd type="none" w="med" len="med"/>
+                    </a:lnR>
+                    <a:lnT w="12700" cap="flat" cmpd="sng" algn="ctr">
+                      <a:solidFill>
+                        <a:schemeClr val="bg2">
+                          <a:lumMod val="75000"/>
+                        </a:schemeClr>
+                      </a:solidFill>
+                      <a:prstDash val="solid"/>
+                      <a:round/>
+                      <a:headEnd type="none" w="med" len="med"/>
+                      <a:tailEnd type="none" w="med" len="med"/>
+                    </a:lnT>
+                    <a:lnB w="12700" cap="flat" cmpd="sng" algn="ctr">
+                      <a:solidFill>
+                        <a:schemeClr val="bg2">
+                          <a:lumMod val="75000"/>
+                        </a:schemeClr>
+                      </a:solidFill>
+                      <a:prstDash val="solid"/>
+                      <a:round/>
+                      <a:headEnd type="none" w="med" len="med"/>
+                      <a:tailEnd type="none" w="med" len="med"/>
+                    </a:lnB>
+                  </a:tcPr>
+                </a:tc>
+                <a:extLst>
+                  <a:ext uri="{0D108BD9-81ED-4DB2-BD59-A6C34878D82A}">
+                    <a16:rowId xmlns:a16="http://schemas.microsoft.com/office/drawing/2014/main" val="1523742880"/>
+                  </a:ext>
+                </a:extLst>
+              </a:tr>
+              <a:tr h="370840">
+                <a:tc vMerge="1">
+                  <a:txBody>
+                    <a:bodyPr/>
+                    <a:lstStyle/>
+                    <a:p>
+                      <a:pPr algn="ctr"/>
+                      <a:endParaRPr lang="de-DE" sz="1400"/>
+                    </a:p>
+                  </a:txBody>
+                  <a:tcPr/>
+                </a:tc>
+                <a:tc>
+                  <a:txBody>
+                    <a:bodyPr/>
+                    <a:lstStyle/>
+                    <a:p>
+                      <a:pPr marL="0" marR="0" lvl="0" indent="0" algn="ctr" defTabSz="914400" rtl="0" eaLnBrk="1" fontAlgn="auto" latinLnBrk="0" hangingPunct="1">
+                        <a:lnSpc>
+                          <a:spcPct val="100000"/>
+                        </a:lnSpc>
+                        <a:spcBef>
+                          <a:spcPts val="0"/>
+                        </a:spcBef>
+                        <a:spcAft>
+                          <a:spcPts val="0"/>
+                        </a:spcAft>
+                        <a:buClrTx/>
+                        <a:buSzTx/>
+                        <a:buFontTx/>
+                        <a:buNone/>
+                        <a:tabLst/>
+                        <a:defRPr/>
+                      </a:pPr>
+                      <a:r>
+                        <a:rPr lang="de-DE" sz="1200"/>
+                        <a:t>Col1</a:t>
+                      </a:r>
+                    </a:p>
+                  </a:txBody>
+                  <a:tcPr anchor="b">
+                    <a:lnL w="38100" cap="flat" cmpd="sng" algn="ctr">
+                      <a:solidFill>
+                        <a:schemeClr val="bg1">
+                          <a:lumMod val="85000"/>
+                        </a:schemeClr>
+                      </a:solidFill>
+                      <a:prstDash val="solid"/>
+                      <a:round/>
+                      <a:headEnd type="none" w="med" len="med"/>
+                      <a:tailEnd type="none" w="med" len="med"/>
+                    </a:lnL>
+                    <a:lnR w="12700" cap="flat" cmpd="sng" algn="ctr">
+                      <a:solidFill>
+                        <a:schemeClr val="bg2">
+                          <a:lumMod val="75000"/>
+                        </a:schemeClr>
+                      </a:solidFill>
+                      <a:prstDash val="solid"/>
+                      <a:round/>
+                      <a:headEnd type="none" w="med" len="med"/>
+                      <a:tailEnd type="none" w="med" len="med"/>
+                    </a:lnR>
+                    <a:lnT w="12700" cap="flat" cmpd="sng" algn="ctr">
+                      <a:solidFill>
+                        <a:schemeClr val="bg2">
+                          <a:lumMod val="75000"/>
+                        </a:schemeClr>
+                      </a:solidFill>
+                      <a:prstDash val="solid"/>
+                      <a:round/>
+                      <a:headEnd type="none" w="med" len="med"/>
+                      <a:tailEnd type="none" w="med" len="med"/>
+                    </a:lnT>
+                    <a:lnB w="12700" cap="flat" cmpd="sng" algn="ctr">
+                      <a:solidFill>
+                        <a:schemeClr val="bg2">
+                          <a:lumMod val="75000"/>
+                        </a:schemeClr>
+                      </a:solidFill>
+                      <a:prstDash val="solid"/>
+                      <a:round/>
+                      <a:headEnd type="none" w="med" len="med"/>
+                      <a:tailEnd type="none" w="med" len="med"/>
+                    </a:lnB>
+                  </a:tcPr>
+                </a:tc>
+                <a:tc>
+                  <a:txBody>
+                    <a:bodyPr/>
+                    <a:lstStyle/>
+                    <a:p>
+                      <a:pPr algn="ctr"/>
+                      <a:r>
+                        <a:rPr kumimoji="0" lang="de-DE" sz="1200" u="none" strike="noStrike" kern="1200" cap="none" spc="0" normalizeH="0" baseline="0" noProof="0">
+                          <a:ln>
+                            <a:noFill/>
+                          </a:ln>
+                          <a:effectLst/>
+                          <a:uLnTx/>
+                          <a:uFillTx/>
+                        </a:rPr>
+                        <a:t>Diff</a:t>
+                      </a:r>
+                      <a:endParaRPr lang="de-DE" sz="1200"/>
+                    </a:p>
+                  </a:txBody>
+                  <a:tcPr anchor="b">
+                    <a:lnL w="12700" cap="flat" cmpd="sng" algn="ctr">
+                      <a:solidFill>
+                        <a:schemeClr val="bg2">
+                          <a:lumMod val="75000"/>
+                        </a:schemeClr>
+                      </a:solidFill>
+                      <a:prstDash val="solid"/>
+                      <a:round/>
+                      <a:headEnd type="none" w="med" len="med"/>
+                      <a:tailEnd type="none" w="med" len="med"/>
+                    </a:lnL>
+                    <a:lnR w="38100" cap="flat" cmpd="sng" algn="ctr">
+                      <a:solidFill>
+                        <a:schemeClr val="bg1">
+                          <a:lumMod val="85000"/>
+                        </a:schemeClr>
+                      </a:solidFill>
+                      <a:prstDash val="solid"/>
+                      <a:round/>
+                      <a:headEnd type="none" w="med" len="med"/>
+                      <a:tailEnd type="none" w="med" len="med"/>
+                    </a:lnR>
+                    <a:lnT w="12700" cap="flat" cmpd="sng" algn="ctr">
+                      <a:solidFill>
+                        <a:schemeClr val="bg2">
+                          <a:lumMod val="75000"/>
+                        </a:schemeClr>
+                      </a:solidFill>
+                      <a:prstDash val="solid"/>
+                      <a:round/>
+                      <a:headEnd type="none" w="med" len="med"/>
+                      <a:tailEnd type="none" w="med" len="med"/>
+                    </a:lnT>
+                    <a:lnB w="12700" cap="flat" cmpd="sng" algn="ctr">
+                      <a:solidFill>
+                        <a:schemeClr val="bg2">
+                          <a:lumMod val="75000"/>
+                        </a:schemeClr>
+                      </a:solidFill>
+                      <a:prstDash val="solid"/>
+                      <a:round/>
+                      <a:headEnd type="none" w="med" len="med"/>
+                      <a:tailEnd type="none" w="med" len="med"/>
+                    </a:lnB>
+                  </a:tcPr>
+                </a:tc>
+                <a:tc vMerge="1">
+                  <a:txBody>
+                    <a:bodyPr/>
+                    <a:lstStyle/>
+                    <a:p>
+                      <a:pPr algn="ctr"/>
+                      <a:endParaRPr lang="de-DE" sz="1200"/>
+                    </a:p>
+                  </a:txBody>
+                  <a:tcPr anchor="b">
+                    <a:lnL w="12700" cap="flat" cmpd="sng" algn="ctr">
+                      <a:solidFill>
+                        <a:schemeClr val="bg2">
+                          <a:lumMod val="75000"/>
+                        </a:schemeClr>
+                      </a:solidFill>
+                      <a:prstDash val="solid"/>
+                      <a:round/>
+                      <a:headEnd type="none" w="med" len="med"/>
+                      <a:tailEnd type="none" w="med" len="med"/>
+                    </a:lnL>
+                    <a:lnR w="12700" cap="flat" cmpd="sng" algn="ctr">
+                      <a:solidFill>
+                        <a:schemeClr val="bg2">
+                          <a:lumMod val="75000"/>
+                        </a:schemeClr>
+                      </a:solidFill>
+                      <a:prstDash val="solid"/>
+                      <a:round/>
+                      <a:headEnd type="none" w="med" len="med"/>
+                      <a:tailEnd type="none" w="med" len="med"/>
+                    </a:lnR>
+                    <a:lnT w="12700" cap="flat" cmpd="sng" algn="ctr">
+                      <a:solidFill>
+                        <a:schemeClr val="bg2">
+                          <a:lumMod val="75000"/>
+                        </a:schemeClr>
+                      </a:solidFill>
+                      <a:prstDash val="solid"/>
+                      <a:round/>
+                      <a:headEnd type="none" w="med" len="med"/>
+                      <a:tailEnd type="none" w="med" len="med"/>
+                    </a:lnT>
+                    <a:lnB w="12700" cap="flat" cmpd="sng" algn="ctr">
+                      <a:solidFill>
+                        <a:schemeClr val="bg2">
+                          <a:lumMod val="75000"/>
+                        </a:schemeClr>
+                      </a:solidFill>
+                      <a:prstDash val="solid"/>
+                      <a:round/>
+                      <a:headEnd type="none" w="med" len="med"/>
+                      <a:tailEnd type="none" w="med" len="med"/>
+                    </a:lnB>
+                  </a:tcPr>
+                </a:tc>
+                <a:extLst>
+                  <a:ext uri="{0D108BD9-81ED-4DB2-BD59-A6C34878D82A}">
+                    <a16:rowId xmlns:a16="http://schemas.microsoft.com/office/drawing/2014/main" val="3580438174"/>
+                  </a:ext>
+                </a:extLst>
+              </a:tr>
+              <a:tr h="370840">
+                <a:tc>
+                  <a:txBody>
+                    <a:bodyPr/>
+                    <a:lstStyle/>
+                    <a:p>
+                      <a:pPr algn="r"/>
+                      <a:r>
+                        <a:rPr lang="de-DE" sz="1200"/>
+                        <a:t>Header</a:t>
+                      </a:r>
+                    </a:p>
+                  </a:txBody>
+                  <a:tcPr anchor="ctr">
+                    <a:lnL w="12700" cap="flat" cmpd="sng" algn="ctr">
+                      <a:solidFill>
+                        <a:schemeClr val="bg2">
+                          <a:lumMod val="75000"/>
+                        </a:schemeClr>
+                      </a:solidFill>
+                      <a:prstDash val="solid"/>
+                      <a:round/>
+                      <a:headEnd type="none" w="med" len="med"/>
+                      <a:tailEnd type="none" w="med" len="med"/>
+                    </a:lnL>
+                    <a:lnR w="38100" cap="flat" cmpd="sng" algn="ctr">
+                      <a:solidFill>
+                        <a:schemeClr val="bg1">
+                          <a:lumMod val="85000"/>
+                        </a:schemeClr>
+                      </a:solidFill>
+                      <a:prstDash val="solid"/>
+                      <a:round/>
+                      <a:headEnd type="none" w="med" len="med"/>
+                      <a:tailEnd type="none" w="med" len="med"/>
+                    </a:lnR>
+                    <a:lnT w="12700" cap="flat" cmpd="sng" algn="ctr">
+                      <a:solidFill>
+                        <a:schemeClr val="bg2">
+                          <a:lumMod val="75000"/>
+                        </a:schemeClr>
+                      </a:solidFill>
+                      <a:prstDash val="solid"/>
+                      <a:round/>
+                      <a:headEnd type="none" w="med" len="med"/>
+                      <a:tailEnd type="none" w="med" len="med"/>
+                    </a:lnT>
+                    <a:lnB w="12700" cap="flat" cmpd="sng" algn="ctr">
+                      <a:solidFill>
+                        <a:schemeClr val="bg2">
+                          <a:lumMod val="75000"/>
+                        </a:schemeClr>
+                      </a:solidFill>
+                      <a:prstDash val="solid"/>
+                      <a:round/>
+                      <a:headEnd type="none" w="med" len="med"/>
+                      <a:tailEnd type="none" w="med" len="med"/>
+                    </a:lnB>
+                  </a:tcPr>
+                </a:tc>
+                <a:tc gridSpan="2">
+                  <a:txBody>
+                    <a:bodyPr/>
+                    <a:lstStyle/>
+                    <a:p>
+                      <a:pPr algn="ctr"/>
+                      <a:r>
+                        <a:rPr kumimoji="0" lang="de-DE" sz="1000" b="0" i="0" u="none" strike="noStrike" kern="1200" cap="none" spc="0" normalizeH="0" baseline="0" noProof="0">
+                          <a:ln>
+                            <a:noFill/>
+                          </a:ln>
+                          <a:solidFill>
+                            <a:prstClr val="black"/>
+                          </a:solidFill>
+                          <a:effectLst/>
+                          <a:uLnTx/>
+                          <a:uFillTx/>
+                          <a:latin typeface="Calibri" panose="020F0502020204030204"/>
+                          <a:ea typeface="+mn-ea"/>
+                          <a:cs typeface="+mn-cs"/>
+                        </a:rPr>
+                        <a:t>Merged secondary</a:t>
+                      </a:r>
+                      <a:endParaRPr lang="de-DE" sz="1000"/>
+                    </a:p>
+                  </a:txBody>
+                  <a:tcPr anchor="ctr">
+                    <a:lnL w="38100" cap="flat" cmpd="sng" algn="ctr">
+                      <a:solidFill>
+                        <a:schemeClr val="bg1">
+                          <a:lumMod val="85000"/>
+                        </a:schemeClr>
+                      </a:solidFill>
+                      <a:prstDash val="solid"/>
+                      <a:round/>
+                      <a:headEnd type="none" w="med" len="med"/>
+                      <a:tailEnd type="none" w="med" len="med"/>
+                    </a:lnL>
+                    <a:lnR w="38100" cap="flat" cmpd="sng" algn="ctr">
+                      <a:solidFill>
+                        <a:schemeClr val="bg1">
+                          <a:lumMod val="85000"/>
+                        </a:schemeClr>
+                      </a:solidFill>
+                      <a:prstDash val="solid"/>
+                      <a:round/>
+                      <a:headEnd type="none" w="med" len="med"/>
+                      <a:tailEnd type="none" w="med" len="med"/>
+                    </a:lnR>
+                    <a:lnT w="12700" cap="flat" cmpd="sng" algn="ctr">
+                      <a:solidFill>
+                        <a:schemeClr val="bg2">
+                          <a:lumMod val="75000"/>
+                        </a:schemeClr>
+                      </a:solidFill>
+                      <a:prstDash val="solid"/>
+                      <a:round/>
+                      <a:headEnd type="none" w="med" len="med"/>
+                      <a:tailEnd type="none" w="med" len="med"/>
+                    </a:lnT>
+                    <a:lnB w="12700" cap="flat" cmpd="sng" algn="ctr">
+                      <a:solidFill>
+                        <a:schemeClr val="bg2">
+                          <a:lumMod val="75000"/>
+                        </a:schemeClr>
+                      </a:solidFill>
+                      <a:prstDash val="solid"/>
+                      <a:round/>
+                      <a:headEnd type="none" w="med" len="med"/>
+                      <a:tailEnd type="none" w="med" len="med"/>
+                    </a:lnB>
+                  </a:tcPr>
+                </a:tc>
+                <a:tc hMerge="1">
+                  <a:txBody>
+                    <a:bodyPr/>
+                    <a:lstStyle/>
+                    <a:p>
+                      <a:pPr marL="0" marR="0" lvl="0" indent="0" algn="ctr" defTabSz="914400" rtl="0" eaLnBrk="1" fontAlgn="auto" latinLnBrk="0" hangingPunct="1">
+                        <a:lnSpc>
+                          <a:spcPct val="100000"/>
+                        </a:lnSpc>
+                        <a:spcBef>
+                          <a:spcPts val="0"/>
+                        </a:spcBef>
+                        <a:spcAft>
+                          <a:spcPts val="0"/>
+                        </a:spcAft>
+                        <a:buClrTx/>
+                        <a:buSzTx/>
+                        <a:buFontTx/>
+                        <a:buNone/>
+                        <a:tabLst/>
+                        <a:defRPr/>
+                      </a:pPr>
+                      <a:endParaRPr lang="de-DE" sz="1000"/>
+                    </a:p>
+                  </a:txBody>
+                  <a:tcPr anchor="ctr">
+                    <a:lnL w="12700" cap="flat" cmpd="sng" algn="ctr">
+                      <a:solidFill>
+                        <a:schemeClr val="bg2">
+                          <a:lumMod val="75000"/>
+                        </a:schemeClr>
+                      </a:solidFill>
+                      <a:prstDash val="solid"/>
+                      <a:round/>
+                      <a:headEnd type="none" w="med" len="med"/>
+                      <a:tailEnd type="none" w="med" len="med"/>
+                    </a:lnL>
+                    <a:lnR w="38100" cap="flat" cmpd="sng" algn="ctr">
+                      <a:solidFill>
+                        <a:schemeClr val="bg1">
+                          <a:lumMod val="85000"/>
+                        </a:schemeClr>
+                      </a:solidFill>
+                      <a:prstDash val="solid"/>
+                      <a:round/>
+                      <a:headEnd type="none" w="med" len="med"/>
+                      <a:tailEnd type="none" w="med" len="med"/>
+                    </a:lnR>
+                    <a:lnT w="12700" cap="flat" cmpd="sng" algn="ctr">
+                      <a:solidFill>
+                        <a:schemeClr val="bg2">
+                          <a:lumMod val="75000"/>
+                        </a:schemeClr>
+                      </a:solidFill>
+                      <a:prstDash val="solid"/>
+                      <a:round/>
+                      <a:headEnd type="none" w="med" len="med"/>
+                      <a:tailEnd type="none" w="med" len="med"/>
+                    </a:lnT>
+                    <a:lnB w="12700" cap="flat" cmpd="sng" algn="ctr">
+                      <a:solidFill>
+                        <a:schemeClr val="bg2">
+                          <a:lumMod val="75000"/>
+                        </a:schemeClr>
+                      </a:solidFill>
+                      <a:prstDash val="solid"/>
+                      <a:round/>
+                      <a:headEnd type="none" w="med" len="med"/>
+                      <a:tailEnd type="none" w="med" len="med"/>
+                    </a:lnB>
+                  </a:tcPr>
+                </a:tc>
+                <a:tc>
+                  <a:txBody>
+                    <a:bodyPr/>
+                    <a:lstStyle/>
+                    <a:p>
+                      <a:pPr marL="0" marR="0" lvl="0" indent="0" algn="ctr" defTabSz="914400" rtl="0" eaLnBrk="1" fontAlgn="auto" latinLnBrk="0" hangingPunct="1">
+                        <a:lnSpc>
+                          <a:spcPct val="100000"/>
+                        </a:lnSpc>
+                        <a:spcBef>
+                          <a:spcPts val="0"/>
+                        </a:spcBef>
+                        <a:spcAft>
+                          <a:spcPts val="0"/>
+                        </a:spcAft>
+                        <a:buClrTx/>
+                        <a:buSzTx/>
+                        <a:buFontTx/>
+                        <a:buNone/>
+                        <a:tabLst/>
+                        <a:defRPr/>
+                      </a:pPr>
+                      <a:r>
+                        <a:rPr kumimoji="0" lang="de-DE" sz="1000" b="0" i="0" u="none" strike="noStrike" kern="1200" cap="none" spc="0" normalizeH="0" baseline="0" noProof="0">
+                          <a:ln>
+                            <a:noFill/>
+                          </a:ln>
+                          <a:solidFill>
+                            <a:prstClr val="black"/>
+                          </a:solidFill>
+                          <a:effectLst/>
+                          <a:uLnTx/>
+                          <a:uFillTx/>
+                          <a:latin typeface="Calibri" panose="020F0502020204030204"/>
+                          <a:ea typeface="+mn-ea"/>
+                          <a:cs typeface="+mn-cs"/>
+                        </a:rPr>
+                        <a:t>-</a:t>
+                      </a:r>
+                      <a:endParaRPr lang="de-DE" sz="1000"/>
+                    </a:p>
+                  </a:txBody>
+                  <a:tcPr anchor="ctr">
+                    <a:lnL w="38100" cap="flat" cmpd="sng" algn="ctr">
+                      <a:solidFill>
+                        <a:schemeClr val="bg1">
+                          <a:lumMod val="85000"/>
+                        </a:schemeClr>
+                      </a:solidFill>
+                      <a:prstDash val="solid"/>
+                      <a:round/>
+                      <a:headEnd type="none" w="med" len="med"/>
+                      <a:tailEnd type="none" w="med" len="med"/>
+                    </a:lnL>
+                    <a:lnR w="12700" cap="flat" cmpd="sng" algn="ctr">
+                      <a:solidFill>
+                        <a:schemeClr val="bg2">
+                          <a:lumMod val="75000"/>
+                        </a:schemeClr>
+                      </a:solidFill>
+                      <a:prstDash val="solid"/>
+                      <a:round/>
+                      <a:headEnd type="none" w="med" len="med"/>
+                      <a:tailEnd type="none" w="med" len="med"/>
+                    </a:lnR>
+                    <a:lnT w="12700" cap="flat" cmpd="sng" algn="ctr">
+                      <a:solidFill>
+                        <a:schemeClr val="bg2">
+                          <a:lumMod val="75000"/>
+                        </a:schemeClr>
+                      </a:solidFill>
+                      <a:prstDash val="solid"/>
+                      <a:round/>
+                      <a:headEnd type="none" w="med" len="med"/>
+                      <a:tailEnd type="none" w="med" len="med"/>
+                    </a:lnT>
+                    <a:lnB w="12700" cap="flat" cmpd="sng" algn="ctr">
+                      <a:solidFill>
+                        <a:schemeClr val="bg2">
+                          <a:lumMod val="75000"/>
+                        </a:schemeClr>
+                      </a:solidFill>
+                      <a:prstDash val="solid"/>
+                      <a:round/>
+                      <a:headEnd type="none" w="med" len="med"/>
+                      <a:tailEnd type="none" w="med" len="med"/>
+                    </a:lnB>
+                  </a:tcPr>
+                </a:tc>
+                <a:extLst>
+                  <a:ext uri="{0D108BD9-81ED-4DB2-BD59-A6C34878D82A}">
+                    <a16:rowId xmlns:a16="http://schemas.microsoft.com/office/drawing/2014/main" val="625084061"/>
+                  </a:ext>
+                </a:extLst>
+              </a:tr>
+              <a:tr h="370840">
+                <a:tc>
+                  <a:txBody>
+                    <a:bodyPr/>
+                    <a:lstStyle/>
+                    <a:p>
+                      <a:pPr marL="0" marR="0" lvl="0" indent="0" algn="r" defTabSz="914400" rtl="0" eaLnBrk="1" fontAlgn="auto" latinLnBrk="0" hangingPunct="1">
+                        <a:lnSpc>
+                          <a:spcPct val="100000"/>
+                        </a:lnSpc>
+                        <a:spcBef>
+                          <a:spcPts val="0"/>
+                        </a:spcBef>
+                        <a:spcAft>
+                          <a:spcPts val="0"/>
+                        </a:spcAft>
+                        <a:buClrTx/>
+                        <a:buSzTx/>
+                        <a:buFontTx/>
+                        <a:buNone/>
+                        <a:tabLst/>
+                        <a:defRPr/>
+                      </a:pPr>
+                      <a:r>
+                        <a:rPr lang="de-DE" sz="1200"/>
+                        <a:t>{{each:row}}</a:t>
+                      </a:r>
+                    </a:p>
+                  </a:txBody>
+                  <a:tcPr anchor="ctr">
+                    <a:lnL w="12700" cap="flat" cmpd="sng" algn="ctr">
+                      <a:solidFill>
+                        <a:schemeClr val="bg2">
+                          <a:lumMod val="75000"/>
+                        </a:schemeClr>
+                      </a:solidFill>
+                      <a:prstDash val="solid"/>
+                      <a:round/>
+                      <a:headEnd type="none" w="med" len="med"/>
+                      <a:tailEnd type="none" w="med" len="med"/>
+                    </a:lnL>
+                    <a:lnR w="38100" cap="flat" cmpd="sng" algn="ctr">
+                      <a:solidFill>
+                        <a:schemeClr val="bg1">
+                          <a:lumMod val="85000"/>
+                        </a:schemeClr>
+                      </a:solidFill>
+                      <a:prstDash val="solid"/>
+                      <a:round/>
+                      <a:headEnd type="none" w="med" len="med"/>
+                      <a:tailEnd type="none" w="med" len="med"/>
+                    </a:lnR>
+                    <a:lnT w="12700" cap="flat" cmpd="sng" algn="ctr">
+                      <a:solidFill>
+                        <a:schemeClr val="bg2">
+                          <a:lumMod val="75000"/>
+                        </a:schemeClr>
+                      </a:solidFill>
+                      <a:prstDash val="solid"/>
+                      <a:round/>
+                      <a:headEnd type="none" w="med" len="med"/>
+                      <a:tailEnd type="none" w="med" len="med"/>
+                    </a:lnT>
+                    <a:lnB w="12700" cap="flat" cmpd="sng" algn="ctr">
+                      <a:solidFill>
+                        <a:schemeClr val="bg2">
+                          <a:lumMod val="75000"/>
+                        </a:schemeClr>
+                      </a:solidFill>
+                      <a:prstDash val="solid"/>
+                      <a:round/>
+                      <a:headEnd type="none" w="med" len="med"/>
+                      <a:tailEnd type="none" w="med" len="med"/>
+                    </a:lnB>
+                  </a:tcPr>
+                </a:tc>
+                <a:tc>
+                  <a:txBody>
+                    <a:bodyPr/>
+                    <a:lstStyle/>
+                    <a:p>
+                      <a:pPr algn="ctr"/>
+                      <a:r>
+                        <a:rPr kumimoji="0" lang="de-DE" sz="1000" b="0" i="0" u="none" strike="noStrike" kern="1200" cap="none" spc="0" normalizeH="0" baseline="0" noProof="0">
+                          <a:ln>
+                            <a:noFill/>
+                          </a:ln>
+                          <a:solidFill>
+                            <a:prstClr val="black"/>
+                          </a:solidFill>
+                          <a:effectLst/>
+                          <a:uLnTx/>
+                          <a:uFillTx/>
+                          <a:latin typeface="Calibri" panose="020F0502020204030204"/>
+                          <a:ea typeface="+mn-ea"/>
+                          <a:cs typeface="+mn-cs"/>
+                        </a:rPr>
+                        <a:t>-</a:t>
+                      </a:r>
+                      <a:endParaRPr lang="de-DE" sz="1000"/>
+                    </a:p>
+                  </a:txBody>
+                  <a:tcPr anchor="ctr">
+                    <a:lnL w="38100" cap="flat" cmpd="sng" algn="ctr">
+                      <a:solidFill>
+                        <a:schemeClr val="bg1">
+                          <a:lumMod val="85000"/>
+                        </a:schemeClr>
+                      </a:solidFill>
+                      <a:prstDash val="solid"/>
+                      <a:round/>
+                      <a:headEnd type="none" w="med" len="med"/>
+                      <a:tailEnd type="none" w="med" len="med"/>
+                    </a:lnL>
+                    <a:lnR w="12700" cap="flat" cmpd="sng" algn="ctr">
+                      <a:solidFill>
+                        <a:schemeClr val="bg2">
+                          <a:lumMod val="75000"/>
+                        </a:schemeClr>
+                      </a:solidFill>
+                      <a:prstDash val="solid"/>
+                      <a:round/>
+                      <a:headEnd type="none" w="med" len="med"/>
+                      <a:tailEnd type="none" w="med" len="med"/>
+                    </a:lnR>
+                    <a:lnT w="12700" cap="flat" cmpd="sng" algn="ctr">
+                      <a:solidFill>
+                        <a:schemeClr val="bg2">
+                          <a:lumMod val="75000"/>
+                        </a:schemeClr>
+                      </a:solidFill>
+                      <a:prstDash val="solid"/>
+                      <a:round/>
+                      <a:headEnd type="none" w="med" len="med"/>
+                      <a:tailEnd type="none" w="med" len="med"/>
+                    </a:lnT>
+                    <a:lnB w="12700" cap="flat" cmpd="sng" algn="ctr">
+                      <a:solidFill>
+                        <a:schemeClr val="bg2">
+                          <a:lumMod val="75000"/>
+                        </a:schemeClr>
+                      </a:solidFill>
+                      <a:prstDash val="solid"/>
+                      <a:round/>
+                      <a:headEnd type="none" w="med" len="med"/>
+                      <a:tailEnd type="none" w="med" len="med"/>
+                    </a:lnB>
+                  </a:tcPr>
+                </a:tc>
+                <a:tc>
+                  <a:txBody>
+                    <a:bodyPr/>
+                    <a:lstStyle/>
+                    <a:p>
+                      <a:pPr algn="ctr"/>
+                      <a:r>
+                        <a:rPr kumimoji="0" lang="de-DE" sz="1000" b="0" i="0" u="none" strike="noStrike" kern="1200" cap="none" spc="0" normalizeH="0" baseline="0" noProof="0">
+                          <a:ln>
+                            <a:noFill/>
+                          </a:ln>
+                          <a:solidFill>
+                            <a:prstClr val="black"/>
+                          </a:solidFill>
+                          <a:effectLst/>
+                          <a:uLnTx/>
+                          <a:uFillTx/>
+                          <a:latin typeface="Calibri" panose="020F0502020204030204"/>
+                          <a:ea typeface="+mn-ea"/>
+                          <a:cs typeface="+mn-cs"/>
+                        </a:rPr>
+                        <a:t>-</a:t>
+                      </a:r>
+                      <a:endParaRPr lang="de-DE" sz="1000"/>
+                    </a:p>
+                  </a:txBody>
+                  <a:tcPr anchor="ctr">
+                    <a:lnL w="12700" cap="flat" cmpd="sng" algn="ctr">
+                      <a:solidFill>
+                        <a:schemeClr val="bg2">
+                          <a:lumMod val="75000"/>
+                        </a:schemeClr>
+                      </a:solidFill>
+                      <a:prstDash val="solid"/>
+                      <a:round/>
+                      <a:headEnd type="none" w="med" len="med"/>
+                      <a:tailEnd type="none" w="med" len="med"/>
+                    </a:lnL>
+                    <a:lnR w="38100" cap="flat" cmpd="sng" algn="ctr">
+                      <a:solidFill>
+                        <a:schemeClr val="bg1">
+                          <a:lumMod val="85000"/>
+                        </a:schemeClr>
+                      </a:solidFill>
+                      <a:prstDash val="solid"/>
+                      <a:round/>
+                      <a:headEnd type="none" w="med" len="med"/>
+                      <a:tailEnd type="none" w="med" len="med"/>
+                    </a:lnR>
+                    <a:lnT w="12700" cap="flat" cmpd="sng" algn="ctr">
+                      <a:solidFill>
+                        <a:schemeClr val="bg2">
+                          <a:lumMod val="75000"/>
+                        </a:schemeClr>
+                      </a:solidFill>
+                      <a:prstDash val="solid"/>
+                      <a:round/>
+                      <a:headEnd type="none" w="med" len="med"/>
+                      <a:tailEnd type="none" w="med" len="med"/>
+                    </a:lnT>
+                    <a:lnB w="12700" cap="flat" cmpd="sng" algn="ctr">
+                      <a:solidFill>
+                        <a:schemeClr val="bg2">
+                          <a:lumMod val="75000"/>
+                        </a:schemeClr>
+                      </a:solidFill>
+                      <a:prstDash val="solid"/>
+                      <a:round/>
+                      <a:headEnd type="none" w="med" len="med"/>
+                      <a:tailEnd type="none" w="med" len="med"/>
+                    </a:lnB>
+                  </a:tcPr>
+                </a:tc>
+                <a:tc>
+                  <a:txBody>
+                    <a:bodyPr/>
+                    <a:lstStyle/>
+                    <a:p>
+                      <a:pPr algn="ctr"/>
+                      <a:r>
+                        <a:rPr kumimoji="0" lang="de-DE" sz="1000" b="0" i="0" u="none" strike="noStrike" kern="1200" cap="none" spc="0" normalizeH="0" baseline="0" noProof="0">
+                          <a:ln>
+                            <a:noFill/>
+                          </a:ln>
+                          <a:solidFill>
+                            <a:prstClr val="black"/>
+                          </a:solidFill>
+                          <a:effectLst/>
+                          <a:uLnTx/>
+                          <a:uFillTx/>
+                          <a:latin typeface="Calibri" panose="020F0502020204030204"/>
+                          <a:ea typeface="+mn-ea"/>
+                          <a:cs typeface="+mn-cs"/>
+                        </a:rPr>
+                        <a:t>-</a:t>
+                      </a:r>
+                      <a:endParaRPr lang="de-DE" sz="1000"/>
+                    </a:p>
+                  </a:txBody>
+                  <a:tcPr anchor="ctr">
+                    <a:lnL w="38100" cap="flat" cmpd="sng" algn="ctr">
+                      <a:solidFill>
+                        <a:schemeClr val="bg1">
+                          <a:lumMod val="85000"/>
+                        </a:schemeClr>
+                      </a:solidFill>
+                      <a:prstDash val="solid"/>
+                      <a:round/>
+                      <a:headEnd type="none" w="med" len="med"/>
+                      <a:tailEnd type="none" w="med" len="med"/>
+                    </a:lnL>
+                    <a:lnR w="12700" cap="flat" cmpd="sng" algn="ctr">
+                      <a:solidFill>
+                        <a:schemeClr val="bg2">
+                          <a:lumMod val="75000"/>
+                        </a:schemeClr>
+                      </a:solidFill>
+                      <a:prstDash val="solid"/>
+                      <a:round/>
+                      <a:headEnd type="none" w="med" len="med"/>
+                      <a:tailEnd type="none" w="med" len="med"/>
+                    </a:lnR>
+                    <a:lnT w="12700" cap="flat" cmpd="sng" algn="ctr">
+                      <a:solidFill>
+                        <a:schemeClr val="bg2">
+                          <a:lumMod val="75000"/>
+                        </a:schemeClr>
+                      </a:solidFill>
+                      <a:prstDash val="solid"/>
+                      <a:round/>
+                      <a:headEnd type="none" w="med" len="med"/>
+                      <a:tailEnd type="none" w="med" len="med"/>
+                    </a:lnT>
+                    <a:lnB w="12700" cap="flat" cmpd="sng" algn="ctr">
+                      <a:solidFill>
+                        <a:schemeClr val="bg2">
+                          <a:lumMod val="75000"/>
+                        </a:schemeClr>
+                      </a:solidFill>
+                      <a:prstDash val="solid"/>
+                      <a:round/>
+                      <a:headEnd type="none" w="med" len="med"/>
+                      <a:tailEnd type="none" w="med" len="med"/>
+                    </a:lnB>
+                  </a:tcPr>
+                </a:tc>
+                <a:extLst>
+                  <a:ext uri="{0D108BD9-81ED-4DB2-BD59-A6C34878D82A}">
+                    <a16:rowId xmlns:a16="http://schemas.microsoft.com/office/drawing/2014/main" val="3257207914"/>
+                  </a:ext>
+                </a:extLst>
+              </a:tr>
+              <a:tr h="370840">
+                <a:tc>
+                  <a:txBody>
+                    <a:bodyPr/>
+                    <a:lstStyle/>
+                    <a:p>
+                      <a:pPr marL="0" marR="0" lvl="0" indent="0" algn="r" defTabSz="914400" rtl="0" eaLnBrk="1" fontAlgn="auto" latinLnBrk="0" hangingPunct="1">
+                        <a:lnSpc>
+                          <a:spcPct val="100000"/>
+                        </a:lnSpc>
+                        <a:spcBef>
+                          <a:spcPts val="0"/>
+                        </a:spcBef>
+                        <a:spcAft>
+                          <a:spcPts val="0"/>
+                        </a:spcAft>
+                        <a:buClrTx/>
+                        <a:buSzTx/>
+                        <a:buFontTx/>
+                        <a:buNone/>
+                        <a:tabLst/>
+                        <a:defRPr/>
+                      </a:pPr>
+                      <a:r>
+                        <a:rPr lang="de-DE" sz="1200"/>
+                        <a:t>Footer</a:t>
+                      </a:r>
+                    </a:p>
+                  </a:txBody>
+                  <a:tcPr>
+                    <a:lnL w="12700" cap="flat" cmpd="sng" algn="ctr">
+                      <a:solidFill>
+                        <a:schemeClr val="bg2">
+                          <a:lumMod val="75000"/>
+                        </a:schemeClr>
+                      </a:solidFill>
+                      <a:prstDash val="solid"/>
+                      <a:round/>
+                      <a:headEnd type="none" w="med" len="med"/>
+                      <a:tailEnd type="none" w="med" len="med"/>
+                    </a:lnL>
+                    <a:lnR w="38100" cap="flat" cmpd="sng" algn="ctr">
+                      <a:solidFill>
+                        <a:schemeClr val="bg1">
+                          <a:lumMod val="85000"/>
+                        </a:schemeClr>
+                      </a:solidFill>
+                      <a:prstDash val="solid"/>
+                      <a:round/>
+                      <a:headEnd type="none" w="med" len="med"/>
+                      <a:tailEnd type="none" w="med" len="med"/>
+                    </a:lnR>
+                    <a:lnT w="12700" cap="flat" cmpd="sng" algn="ctr">
+                      <a:solidFill>
+                        <a:schemeClr val="bg2">
+                          <a:lumMod val="75000"/>
+                        </a:schemeClr>
+                      </a:solidFill>
+                      <a:prstDash val="solid"/>
+                      <a:round/>
+                      <a:headEnd type="none" w="med" len="med"/>
+                      <a:tailEnd type="none" w="med" len="med"/>
+                    </a:lnT>
+                    <a:lnB w="12700" cap="flat" cmpd="sng" algn="ctr">
+                      <a:solidFill>
+                        <a:schemeClr val="bg2">
+                          <a:lumMod val="75000"/>
+                        </a:schemeClr>
+                      </a:solidFill>
+                      <a:prstDash val="solid"/>
+                      <a:round/>
+                      <a:headEnd type="none" w="med" len="med"/>
+                      <a:tailEnd type="none" w="med" len="med"/>
+                    </a:lnB>
+                  </a:tcPr>
+                </a:tc>
+                <a:tc>
+                  <a:txBody>
+                    <a:bodyPr/>
+                    <a:lstStyle/>
+                    <a:p>
+                      <a:pPr marL="0" marR="0" lvl="0" indent="0" algn="ctr" defTabSz="914400" rtl="0" eaLnBrk="1" fontAlgn="auto" latinLnBrk="0" hangingPunct="1">
+                        <a:lnSpc>
+                          <a:spcPct val="100000"/>
+                        </a:lnSpc>
+                        <a:spcBef>
+                          <a:spcPts val="0"/>
+                        </a:spcBef>
+                        <a:spcAft>
+                          <a:spcPts val="0"/>
+                        </a:spcAft>
+                        <a:buClrTx/>
+                        <a:buSzTx/>
+                        <a:buFontTx/>
+                        <a:buNone/>
+                        <a:tabLst/>
+                        <a:defRPr/>
+                      </a:pPr>
+                      <a:r>
+                        <a:rPr lang="de-DE" sz="1200"/>
+                        <a:t>{{each:subSub}}</a:t>
+                      </a:r>
+                    </a:p>
+                  </a:txBody>
+                  <a:tcPr>
+                    <a:lnL w="38100" cap="flat" cmpd="sng" algn="ctr">
+                      <a:solidFill>
+                        <a:schemeClr val="bg1">
+                          <a:lumMod val="85000"/>
+                        </a:schemeClr>
+                      </a:solidFill>
+                      <a:prstDash val="solid"/>
+                      <a:round/>
+                      <a:headEnd type="none" w="med" len="med"/>
+                      <a:tailEnd type="none" w="med" len="med"/>
+                    </a:lnL>
+                    <a:lnR w="12700" cap="flat" cmpd="sng" algn="ctr">
+                      <a:solidFill>
+                        <a:schemeClr val="bg2">
+                          <a:lumMod val="75000"/>
+                        </a:schemeClr>
+                      </a:solidFill>
+                      <a:prstDash val="solid"/>
+                      <a:round/>
+                      <a:headEnd type="none" w="med" len="med"/>
+                      <a:tailEnd type="none" w="med" len="med"/>
+                    </a:lnR>
+                    <a:lnT w="12700" cap="flat" cmpd="sng" algn="ctr">
+                      <a:solidFill>
+                        <a:schemeClr val="bg2">
+                          <a:lumMod val="75000"/>
+                        </a:schemeClr>
+                      </a:solidFill>
+                      <a:prstDash val="solid"/>
+                      <a:round/>
+                      <a:headEnd type="none" w="med" len="med"/>
+                      <a:tailEnd type="none" w="med" len="med"/>
+                    </a:lnT>
+                    <a:lnB w="12700" cap="flat" cmpd="sng" algn="ctr">
+                      <a:solidFill>
+                        <a:schemeClr val="bg2">
+                          <a:lumMod val="75000"/>
+                        </a:schemeClr>
+                      </a:solidFill>
+                      <a:prstDash val="solid"/>
+                      <a:round/>
+                      <a:headEnd type="none" w="med" len="med"/>
+                      <a:tailEnd type="none" w="med" len="med"/>
+                    </a:lnB>
+                  </a:tcPr>
+                </a:tc>
+                <a:tc>
+                  <a:txBody>
+                    <a:bodyPr/>
+                    <a:lstStyle/>
+                    <a:p>
+                      <a:pPr marL="0" marR="0" lvl="0" indent="0" algn="ctr" defTabSz="914400" rtl="0" eaLnBrk="1" fontAlgn="auto" latinLnBrk="0" hangingPunct="1">
+                        <a:lnSpc>
+                          <a:spcPct val="100000"/>
+                        </a:lnSpc>
+                        <a:spcBef>
+                          <a:spcPts val="0"/>
+                        </a:spcBef>
+                        <a:spcAft>
+                          <a:spcPts val="0"/>
+                        </a:spcAft>
+                        <a:buClrTx/>
+                        <a:buSzTx/>
+                        <a:buFontTx/>
+                        <a:buNone/>
+                        <a:tabLst/>
+                        <a:defRPr/>
+                      </a:pPr>
+                      <a:r>
+                        <a:rPr lang="de-DE" sz="1200"/>
+                        <a:t>{{each:subSub2}}</a:t>
+                      </a:r>
+                    </a:p>
+                  </a:txBody>
+                  <a:tcPr>
+                    <a:lnL w="12700" cap="flat" cmpd="sng" algn="ctr">
+                      <a:solidFill>
+                        <a:schemeClr val="bg2">
+                          <a:lumMod val="75000"/>
+                        </a:schemeClr>
+                      </a:solidFill>
+                      <a:prstDash val="solid"/>
+                      <a:round/>
+                      <a:headEnd type="none" w="med" len="med"/>
+                      <a:tailEnd type="none" w="med" len="med"/>
+                    </a:lnL>
+                    <a:lnR w="38100" cap="flat" cmpd="sng" algn="ctr">
+                      <a:solidFill>
+                        <a:schemeClr val="bg1">
+                          <a:lumMod val="85000"/>
+                        </a:schemeClr>
+                      </a:solidFill>
+                      <a:prstDash val="solid"/>
+                      <a:round/>
+                      <a:headEnd type="none" w="med" len="med"/>
+                      <a:tailEnd type="none" w="med" len="med"/>
+                    </a:lnR>
+                    <a:lnT w="12700" cap="flat" cmpd="sng" algn="ctr">
+                      <a:solidFill>
+                        <a:schemeClr val="bg2">
+                          <a:lumMod val="75000"/>
+                        </a:schemeClr>
+                      </a:solidFill>
+                      <a:prstDash val="solid"/>
+                      <a:round/>
+                      <a:headEnd type="none" w="med" len="med"/>
+                      <a:tailEnd type="none" w="med" len="med"/>
+                    </a:lnT>
+                    <a:lnB w="12700" cap="flat" cmpd="sng" algn="ctr">
+                      <a:solidFill>
+                        <a:schemeClr val="bg2">
+                          <a:lumMod val="75000"/>
+                        </a:schemeClr>
+                      </a:solidFill>
+                      <a:prstDash val="solid"/>
+                      <a:round/>
+                      <a:headEnd type="none" w="med" len="med"/>
+                      <a:tailEnd type="none" w="med" len="med"/>
+                    </a:lnB>
+                  </a:tcPr>
+                </a:tc>
+                <a:tc>
+                  <a:txBody>
+                    <a:bodyPr/>
+                    <a:lstStyle/>
+                    <a:p>
+                      <a:pPr algn="ctr"/>
+                      <a:r>
+                        <a:rPr kumimoji="0" lang="de-DE" sz="1000" b="0" i="0" u="none" strike="noStrike" kern="1200" cap="none" spc="0" normalizeH="0" baseline="0" noProof="0">
+                          <a:ln>
+                            <a:noFill/>
+                          </a:ln>
+                          <a:solidFill>
+                            <a:prstClr val="black"/>
+                          </a:solidFill>
+                          <a:effectLst/>
+                          <a:uLnTx/>
+                          <a:uFillTx/>
+                          <a:latin typeface="Calibri" panose="020F0502020204030204"/>
+                          <a:ea typeface="+mn-ea"/>
+                          <a:cs typeface="+mn-cs"/>
+                        </a:rPr>
+                        <a:t>-</a:t>
+                      </a:r>
+                      <a:endParaRPr lang="de-DE" sz="1000"/>
+                    </a:p>
+                  </a:txBody>
+                  <a:tcPr>
+                    <a:lnL w="38100" cap="flat" cmpd="sng" algn="ctr">
+                      <a:solidFill>
+                        <a:schemeClr val="bg1">
+                          <a:lumMod val="85000"/>
+                        </a:schemeClr>
+                      </a:solidFill>
+                      <a:prstDash val="solid"/>
+                      <a:round/>
+                      <a:headEnd type="none" w="med" len="med"/>
+                      <a:tailEnd type="none" w="med" len="med"/>
+                    </a:lnL>
+                    <a:lnR w="12700" cap="flat" cmpd="sng" algn="ctr">
+                      <a:solidFill>
+                        <a:schemeClr val="bg2">
+                          <a:lumMod val="75000"/>
+                        </a:schemeClr>
+                      </a:solidFill>
+                      <a:prstDash val="solid"/>
+                      <a:round/>
+                      <a:headEnd type="none" w="med" len="med"/>
+                      <a:tailEnd type="none" w="med" len="med"/>
+                    </a:lnR>
+                    <a:lnT w="12700" cap="flat" cmpd="sng" algn="ctr">
+                      <a:solidFill>
+                        <a:schemeClr val="bg2">
+                          <a:lumMod val="75000"/>
+                        </a:schemeClr>
+                      </a:solidFill>
+                      <a:prstDash val="solid"/>
+                      <a:round/>
+                      <a:headEnd type="none" w="med" len="med"/>
+                      <a:tailEnd type="none" w="med" len="med"/>
+                    </a:lnT>
+                    <a:lnB w="12700" cap="flat" cmpd="sng" algn="ctr">
+                      <a:solidFill>
+                        <a:schemeClr val="bg2">
+                          <a:lumMod val="75000"/>
+                        </a:schemeClr>
+                      </a:solidFill>
+                      <a:prstDash val="solid"/>
+                      <a:round/>
+                      <a:headEnd type="none" w="med" len="med"/>
+                      <a:tailEnd type="none" w="med" len="med"/>
+                    </a:lnB>
+                  </a:tcPr>
+                </a:tc>
+                <a:extLst>
+                  <a:ext uri="{0D108BD9-81ED-4DB2-BD59-A6C34878D82A}">
+                    <a16:rowId xmlns:a16="http://schemas.microsoft.com/office/drawing/2014/main" val="3395256489"/>
+                  </a:ext>
+                </a:extLst>
+              </a:tr>
+            </a:tbl>
+          </a:graphicData>
+        </a:graphic>
+      </p:graphicFrame>
+    </p:spTree>
+    <p:extLst>
+      <p:ext uri="{BB962C8B-B14F-4D97-AF65-F5344CB8AC3E}">
+        <p14:creationId xmlns:p14="http://schemas.microsoft.com/office/powerpoint/2010/main" val="2840956534"/>
+      </p:ext>
+    </p:extLst>
+  </p:cSld>
+  <p:clrMapOvr>
+    <a:masterClrMapping/>
+  </p:clrMapOvr>
+</p:sld>
+</file>
+
+<file path=ppt/slides/slide4.xml><?xml version="1.0" encoding="utf-8"?>
+<p:sld xmlns:a="http://schemas.openxmlformats.org/drawingml/2006/main" xmlns:r="http://schemas.openxmlformats.org/officeDocument/2006/relationships" xmlns:p="http://schemas.openxmlformats.org/presentationml/2006/main">
+  <p:cSld>
+    <p:spTree>
+      <p:nvGrpSpPr>
+        <p:cNvPr id="1" name=""/>
+        <p:cNvGrpSpPr/>
+        <p:nvPr/>
+      </p:nvGrpSpPr>
+      <p:grpSpPr>
+        <a:xfrm>
+          <a:off x="0" y="0"/>
+          <a:ext cx="0" cy="0"/>
+          <a:chOff x="0" y="0"/>
+          <a:chExt cx="0" cy="0"/>
+        </a:xfrm>
+      </p:grpSpPr>
+      <p:sp>
+        <p:nvSpPr>
+          <p:cNvPr id="5" name="Titel 4">
+            <a:extLst>
+              <a:ext uri="{FF2B5EF4-FFF2-40B4-BE49-F238E27FC236}">
+                <a16:creationId xmlns:a16="http://schemas.microsoft.com/office/drawing/2014/main" id="{B8BB8EC6-C7DA-4E2F-86DF-BDE9856B03BD}"/>
+              </a:ext>
+            </a:extLst>
+          </p:cNvPr>
+          <p:cNvSpPr>
+            <a:spLocks noGrp="1"/>
+          </p:cNvSpPr>
+          <p:nvPr>
+            <p:ph type="title"/>
+          </p:nvPr>
+        </p:nvSpPr>
+        <p:spPr>
+          <a:xfrm>
+            <a:off x="0" y="24653"/>
+            <a:ext cx="10515600" cy="446405"/>
+          </a:xfrm>
+        </p:spPr>
+        <p:txBody>
+          <a:bodyPr>
+            <a:normAutofit/>
+          </a:bodyPr>
+          <a:lstStyle/>
+          <a:p>
+            <a:r>
+              <a:rPr lang="de-DE" sz="1400" b="1"/>
+              <a:t>NestedTable3</a:t>
+            </a:r>
+          </a:p>
+        </p:txBody>
+      </p:sp>
+      <p:graphicFrame>
+        <p:nvGraphicFramePr>
+          <p:cNvPr id="7" name="NestedTable3">
+            <a:extLst>
+              <a:ext uri="{FF2B5EF4-FFF2-40B4-BE49-F238E27FC236}">
+                <a16:creationId xmlns:a16="http://schemas.microsoft.com/office/drawing/2014/main" id="{C4847EC1-F174-4533-9A6B-8A897174AFE7}"/>
+              </a:ext>
+            </a:extLst>
+          </p:cNvPr>
+          <p:cNvGraphicFramePr>
+            <a:graphicFrameLocks noGrp="1"/>
+          </p:cNvGraphicFramePr>
+          <p:nvPr>
+            <p:extLst>
+              <p:ext uri="{D42A27DB-BD31-4B8C-83A1-F6EECF244321}">
+                <p14:modId xmlns:p14="http://schemas.microsoft.com/office/powerpoint/2010/main" val="1957343397"/>
+              </p:ext>
+            </p:extLst>
+          </p:nvPr>
+        </p:nvGraphicFramePr>
+        <p:xfrm>
+          <a:off x="638154" y="1880858"/>
+          <a:ext cx="3508335" cy="1656080"/>
+        </p:xfrm>
+        <a:graphic>
+          <a:graphicData uri="http://schemas.openxmlformats.org/drawingml/2006/table">
+            <a:tbl>
+              <a:tblPr bandRow="1">
+                <a:tableStyleId>{2D5ABB26-0587-4C30-8999-92F81FD0307C}</a:tableStyleId>
+              </a:tblPr>
+              <a:tblGrid>
+                <a:gridCol w="770896">
+                  <a:extLst>
+                    <a:ext uri="{9D8B030D-6E8A-4147-A177-3AD203B41FA5}">
+                      <a16:colId xmlns:a16="http://schemas.microsoft.com/office/drawing/2014/main" val="2081046437"/>
+                    </a:ext>
+                  </a:extLst>
+                </a:gridCol>
+                <a:gridCol w="770896">
+                  <a:extLst>
+                    <a:ext uri="{9D8B030D-6E8A-4147-A177-3AD203B41FA5}">
+                      <a16:colId xmlns:a16="http://schemas.microsoft.com/office/drawing/2014/main" val="3700495073"/>
+                    </a:ext>
+                  </a:extLst>
+                </a:gridCol>
+                <a:gridCol w="770896">
+                  <a:extLst>
+                    <a:ext uri="{9D8B030D-6E8A-4147-A177-3AD203B41FA5}">
+                      <a16:colId xmlns:a16="http://schemas.microsoft.com/office/drawing/2014/main" val="113879652"/>
+                    </a:ext>
+                  </a:extLst>
+                </a:gridCol>
+                <a:gridCol w="770896">
+                  <a:extLst>
+                    <a:ext uri="{9D8B030D-6E8A-4147-A177-3AD203B41FA5}">
+                      <a16:colId xmlns:a16="http://schemas.microsoft.com/office/drawing/2014/main" val="793286954"/>
+                    </a:ext>
+                  </a:extLst>
+                </a:gridCol>
+                <a:gridCol w="424751">
+                  <a:extLst>
+                    <a:ext uri="{9D8B030D-6E8A-4147-A177-3AD203B41FA5}">
+                      <a16:colId xmlns:a16="http://schemas.microsoft.com/office/drawing/2014/main" val="1384176072"/>
+                    </a:ext>
+                  </a:extLst>
+                </a:gridCol>
+              </a:tblGrid>
+              <a:tr h="370840">
+                <a:tc rowSpan="2">
+                  <a:txBody>
+                    <a:bodyPr/>
+                    <a:lstStyle/>
+                    <a:p>
+                      <a:pPr algn="ctr"/>
+                      <a:r>
+                        <a:rPr kumimoji="0" lang="de-DE" sz="1200" u="none" strike="noStrike" kern="1200" cap="none" spc="0" normalizeH="0" baseline="0" noProof="0">
+                          <a:ln>
+                            <a:noFill/>
+                          </a:ln>
+                          <a:effectLst/>
+                          <a:uLnTx/>
+                          <a:uFillTx/>
+                        </a:rPr>
+                        <a:t>A1-A2</a:t>
+                      </a:r>
+                      <a:endParaRPr lang="de-DE" sz="1200"/>
+                    </a:p>
+                  </a:txBody>
+                  <a:tcPr anchor="ctr">
+                    <a:lnL w="12700" cap="flat" cmpd="sng" algn="ctr">
+                      <a:solidFill>
+                        <a:schemeClr val="bg2">
+                          <a:lumMod val="75000"/>
+                        </a:schemeClr>
+                      </a:solidFill>
+                      <a:prstDash val="solid"/>
+                      <a:round/>
+                      <a:headEnd type="none" w="med" len="med"/>
+                      <a:tailEnd type="none" w="med" len="med"/>
+                    </a:lnL>
+                    <a:lnR w="38100" cap="flat" cmpd="sng" algn="ctr">
+                      <a:solidFill>
+                        <a:schemeClr val="bg1">
+                          <a:lumMod val="85000"/>
+                        </a:schemeClr>
+                      </a:solidFill>
+                      <a:prstDash val="solid"/>
+                      <a:round/>
+                      <a:headEnd type="none" w="med" len="med"/>
+                      <a:tailEnd type="none" w="med" len="med"/>
+                    </a:lnR>
+                    <a:lnT w="12700" cap="flat" cmpd="sng" algn="ctr">
+                      <a:solidFill>
+                        <a:schemeClr val="bg2">
+                          <a:lumMod val="75000"/>
+                        </a:schemeClr>
+                      </a:solidFill>
+                      <a:prstDash val="solid"/>
+                      <a:round/>
+                      <a:headEnd type="none" w="med" len="med"/>
+                      <a:tailEnd type="none" w="med" len="med"/>
+                    </a:lnT>
+                    <a:lnB w="12700" cap="flat" cmpd="sng" algn="ctr">
+                      <a:solidFill>
+                        <a:schemeClr val="bg2">
+                          <a:lumMod val="75000"/>
+                        </a:schemeClr>
+                      </a:solidFill>
+                      <a:prstDash val="solid"/>
+                      <a:round/>
+                      <a:headEnd type="none" w="med" len="med"/>
+                      <a:tailEnd type="none" w="med" len="med"/>
+                    </a:lnB>
+                  </a:tcPr>
+                </a:tc>
+                <a:tc gridSpan="2">
+                  <a:txBody>
+                    <a:bodyPr/>
+                    <a:lstStyle/>
+                    <a:p>
+                      <a:pPr algn="ctr"/>
+                      <a:r>
+                        <a:rPr lang="de-DE" sz="1200"/>
+                        <a:t>{{each:sub}}</a:t>
+                      </a:r>
+                    </a:p>
+                  </a:txBody>
+                  <a:tcPr anchor="ctr">
+                    <a:lnL w="38100" cap="flat" cmpd="sng" algn="ctr">
+                      <a:solidFill>
+                        <a:schemeClr val="bg1">
+                          <a:lumMod val="85000"/>
+                        </a:schemeClr>
+                      </a:solidFill>
+                      <a:prstDash val="solid"/>
+                      <a:round/>
+                      <a:headEnd type="none" w="med" len="med"/>
+                      <a:tailEnd type="none" w="med" len="med"/>
+                    </a:lnL>
+                    <a:lnR w="38100" cap="flat" cmpd="sng" algn="ctr">
+                      <a:solidFill>
+                        <a:schemeClr val="bg1">
+                          <a:lumMod val="85000"/>
+                        </a:schemeClr>
+                      </a:solidFill>
+                      <a:prstDash val="solid"/>
+                      <a:round/>
+                      <a:headEnd type="none" w="med" len="med"/>
+                      <a:tailEnd type="none" w="med" len="med"/>
+                    </a:lnR>
+                    <a:lnT w="12700" cap="flat" cmpd="sng" algn="ctr">
+                      <a:solidFill>
+                        <a:schemeClr val="bg2">
+                          <a:lumMod val="75000"/>
+                        </a:schemeClr>
+                      </a:solidFill>
+                      <a:prstDash val="solid"/>
+                      <a:round/>
+                      <a:headEnd type="none" w="med" len="med"/>
+                      <a:tailEnd type="none" w="med" len="med"/>
+                    </a:lnT>
+                    <a:lnB w="12700" cap="flat" cmpd="sng" algn="ctr">
+                      <a:solidFill>
+                        <a:schemeClr val="bg2">
+                          <a:lumMod val="75000"/>
+                        </a:schemeClr>
+                      </a:solidFill>
+                      <a:prstDash val="solid"/>
+                      <a:round/>
+                      <a:headEnd type="none" w="med" len="med"/>
+                      <a:tailEnd type="none" w="med" len="med"/>
+                    </a:lnB>
+                  </a:tcPr>
+                </a:tc>
+                <a:tc hMerge="1">
+                  <a:txBody>
+                    <a:bodyPr/>
+                    <a:lstStyle/>
+                    <a:p>
+                      <a:pPr algn="ctr"/>
+                      <a:endParaRPr lang="de-DE" sz="1400"/>
+                    </a:p>
+                  </a:txBody>
+                  <a:tcPr>
+                    <a:lnL w="12700" cap="flat" cmpd="sng" algn="ctr">
+                      <a:solidFill>
+                        <a:schemeClr val="bg2">
+                          <a:lumMod val="75000"/>
+                        </a:schemeClr>
+                      </a:solidFill>
+                      <a:prstDash val="solid"/>
+                      <a:round/>
+                      <a:headEnd type="none" w="med" len="med"/>
+                      <a:tailEnd type="none" w="med" len="med"/>
+                    </a:lnL>
+                  </a:tcPr>
+                </a:tc>
+                <a:tc>
+                  <a:txBody>
+                    <a:bodyPr/>
+                    <a:lstStyle/>
+                    <a:p>
+                      <a:pPr algn="ctr"/>
+                      <a:r>
+                        <a:rPr lang="de-DE" sz="1200"/>
+                        <a:t>Top</a:t>
+                      </a:r>
+                    </a:p>
+                  </a:txBody>
+                  <a:tcPr anchor="ctr">
+                    <a:lnL w="38100" cap="flat" cmpd="sng" algn="ctr">
+                      <a:solidFill>
+                        <a:schemeClr val="bg1">
+                          <a:lumMod val="85000"/>
+                        </a:schemeClr>
+                      </a:solidFill>
+                      <a:prstDash val="solid"/>
+                      <a:round/>
+                      <a:headEnd type="none" w="med" len="med"/>
+                      <a:tailEnd type="none" w="med" len="med"/>
+                    </a:lnL>
+                    <a:lnR w="38100" cap="flat" cmpd="sng" algn="ctr">
+                      <a:solidFill>
+                        <a:schemeClr val="bg1">
+                          <a:lumMod val="85000"/>
+                        </a:schemeClr>
+                      </a:solidFill>
+                      <a:prstDash val="solid"/>
+                      <a:round/>
+                      <a:headEnd type="none" w="med" len="med"/>
+                      <a:tailEnd type="none" w="med" len="med"/>
+                    </a:lnR>
+                    <a:lnT w="12700" cap="flat" cmpd="sng" algn="ctr">
+                      <a:solidFill>
+                        <a:schemeClr val="bg2">
+                          <a:lumMod val="75000"/>
+                        </a:schemeClr>
+                      </a:solidFill>
+                      <a:prstDash val="solid"/>
+                      <a:round/>
+                      <a:headEnd type="none" w="med" len="med"/>
+                      <a:tailEnd type="none" w="med" len="med"/>
+                    </a:lnT>
+                    <a:lnB w="12700" cap="flat" cmpd="sng" algn="ctr">
+                      <a:solidFill>
+                        <a:schemeClr val="bg2">
+                          <a:lumMod val="75000"/>
+                        </a:schemeClr>
+                      </a:solidFill>
+                      <a:prstDash val="solid"/>
+                      <a:round/>
+                      <a:headEnd type="none" w="med" len="med"/>
+                      <a:tailEnd type="none" w="med" len="med"/>
+                    </a:lnB>
+                    <a:solidFill>
+                      <a:schemeClr val="bg1">
+                        <a:lumMod val="95000"/>
+                      </a:schemeClr>
+                    </a:solidFill>
+                  </a:tcPr>
+                </a:tc>
+                <a:tc rowSpan="2">
+                  <a:txBody>
+                    <a:bodyPr/>
+                    <a:lstStyle/>
+                    <a:p>
+                      <a:pPr algn="ctr"/>
+                      <a:r>
+                        <a:rPr lang="de-DE" sz="1200"/>
+                        <a:t>Last</a:t>
+                      </a:r>
+                    </a:p>
+                  </a:txBody>
+                  <a:tcPr anchor="ctr">
+                    <a:lnL w="38100" cap="flat" cmpd="sng" algn="ctr">
+                      <a:solidFill>
+                        <a:schemeClr val="bg1">
+                          <a:lumMod val="85000"/>
+                        </a:schemeClr>
+                      </a:solidFill>
+                      <a:prstDash val="solid"/>
+                      <a:round/>
+                      <a:headEnd type="none" w="med" len="med"/>
+                      <a:tailEnd type="none" w="med" len="med"/>
+                    </a:lnL>
+                    <a:lnR w="12700" cap="flat" cmpd="sng" algn="ctr">
+                      <a:solidFill>
+                        <a:schemeClr val="bg2">
+                          <a:lumMod val="75000"/>
+                        </a:schemeClr>
+                      </a:solidFill>
+                      <a:prstDash val="solid"/>
+                      <a:round/>
+                      <a:headEnd type="none" w="med" len="med"/>
+                      <a:tailEnd type="none" w="med" len="med"/>
+                    </a:lnR>
+                    <a:lnT w="12700" cap="flat" cmpd="sng" algn="ctr">
+                      <a:solidFill>
+                        <a:schemeClr val="bg2">
+                          <a:lumMod val="75000"/>
+                        </a:schemeClr>
+                      </a:solidFill>
+                      <a:prstDash val="solid"/>
+                      <a:round/>
+                      <a:headEnd type="none" w="med" len="med"/>
+                      <a:tailEnd type="none" w="med" len="med"/>
+                    </a:lnT>
+                    <a:lnB w="12700" cap="flat" cmpd="sng" algn="ctr">
+                      <a:solidFill>
+                        <a:schemeClr val="bg2">
+                          <a:lumMod val="75000"/>
+                        </a:schemeClr>
+                      </a:solidFill>
+                      <a:prstDash val="solid"/>
+                      <a:round/>
+                      <a:headEnd type="none" w="med" len="med"/>
+                      <a:tailEnd type="none" w="med" len="med"/>
+                    </a:lnB>
+                  </a:tcPr>
+                </a:tc>
+                <a:extLst>
+                  <a:ext uri="{0D108BD9-81ED-4DB2-BD59-A6C34878D82A}">
+                    <a16:rowId xmlns:a16="http://schemas.microsoft.com/office/drawing/2014/main" val="1523742880"/>
+                  </a:ext>
+                </a:extLst>
+              </a:tr>
+              <a:tr h="370840">
+                <a:tc vMerge="1">
+                  <a:txBody>
+                    <a:bodyPr/>
+                    <a:lstStyle/>
+                    <a:p>
+                      <a:pPr algn="ctr"/>
+                      <a:endParaRPr lang="de-DE" sz="1400"/>
+                    </a:p>
+                  </a:txBody>
+                  <a:tcPr/>
+                </a:tc>
+                <a:tc>
+                  <a:txBody>
+                    <a:bodyPr/>
+                    <a:lstStyle/>
+                    <a:p>
+                      <a:pPr marL="0" marR="0" lvl="0" indent="0" algn="ctr" defTabSz="914400" rtl="0" eaLnBrk="1" fontAlgn="auto" latinLnBrk="0" hangingPunct="1">
+                        <a:lnSpc>
+                          <a:spcPct val="100000"/>
+                        </a:lnSpc>
+                        <a:spcBef>
+                          <a:spcPts val="0"/>
+                        </a:spcBef>
+                        <a:spcAft>
+                          <a:spcPts val="0"/>
+                        </a:spcAft>
+                        <a:buClrTx/>
+                        <a:buSzTx/>
+                        <a:buFontTx/>
+                        <a:buNone/>
+                        <a:tabLst/>
+                        <a:defRPr/>
+                      </a:pPr>
+                      <a:r>
+                        <a:rPr lang="de-DE" sz="1200"/>
+                        <a:t>{{each:subSub}}</a:t>
+                      </a:r>
+                    </a:p>
+                  </a:txBody>
+                  <a:tcPr anchor="b">
+                    <a:lnL w="38100" cap="flat" cmpd="sng" algn="ctr">
+                      <a:solidFill>
+                        <a:schemeClr val="bg1">
+                          <a:lumMod val="85000"/>
+                        </a:schemeClr>
+                      </a:solidFill>
+                      <a:prstDash val="solid"/>
+                      <a:round/>
+                      <a:headEnd type="none" w="med" len="med"/>
+                      <a:tailEnd type="none" w="med" len="med"/>
+                    </a:lnL>
+                    <a:lnR w="12700" cap="flat" cmpd="sng" algn="ctr">
+                      <a:solidFill>
+                        <a:schemeClr val="bg2">
+                          <a:lumMod val="75000"/>
+                        </a:schemeClr>
+                      </a:solidFill>
+                      <a:prstDash val="solid"/>
+                      <a:round/>
+                      <a:headEnd type="none" w="med" len="med"/>
+                      <a:tailEnd type="none" w="med" len="med"/>
+                    </a:lnR>
+                    <a:lnT w="12700" cap="flat" cmpd="sng" algn="ctr">
+                      <a:solidFill>
+                        <a:schemeClr val="bg2">
+                          <a:lumMod val="75000"/>
+                        </a:schemeClr>
+                      </a:solidFill>
+                      <a:prstDash val="solid"/>
+                      <a:round/>
+                      <a:headEnd type="none" w="med" len="med"/>
+                      <a:tailEnd type="none" w="med" len="med"/>
+                    </a:lnT>
+                    <a:lnB w="12700" cap="flat" cmpd="sng" algn="ctr">
+                      <a:solidFill>
+                        <a:schemeClr val="bg2">
+                          <a:lumMod val="75000"/>
+                        </a:schemeClr>
+                      </a:solidFill>
+                      <a:prstDash val="solid"/>
+                      <a:round/>
+                      <a:headEnd type="none" w="med" len="med"/>
+                      <a:tailEnd type="none" w="med" len="med"/>
+                    </a:lnB>
+                  </a:tcPr>
+                </a:tc>
+                <a:tc>
+                  <a:txBody>
+                    <a:bodyPr/>
+                    <a:lstStyle/>
+                    <a:p>
+                      <a:pPr marL="0" marR="0" lvl="0" indent="0" algn="ctr" defTabSz="914400" rtl="0" eaLnBrk="1" fontAlgn="auto" latinLnBrk="0" hangingPunct="1">
+                        <a:lnSpc>
+                          <a:spcPct val="100000"/>
+                        </a:lnSpc>
+                        <a:spcBef>
+                          <a:spcPts val="0"/>
+                        </a:spcBef>
+                        <a:spcAft>
+                          <a:spcPts val="0"/>
+                        </a:spcAft>
+                        <a:buClrTx/>
+                        <a:buSzTx/>
+                        <a:buFontTx/>
+                        <a:buNone/>
+                        <a:tabLst/>
+                        <a:defRPr/>
+                      </a:pPr>
+                      <a:r>
+                        <a:rPr lang="de-DE" sz="1200"/>
+                        <a:t>{{each:subSub2}}</a:t>
+                      </a:r>
+                    </a:p>
+                  </a:txBody>
+                  <a:tcPr anchor="b">
+                    <a:lnL w="12700" cap="flat" cmpd="sng" algn="ctr">
+                      <a:solidFill>
+                        <a:schemeClr val="bg2">
+                          <a:lumMod val="75000"/>
+                        </a:schemeClr>
+                      </a:solidFill>
+                      <a:prstDash val="solid"/>
+                      <a:round/>
+                      <a:headEnd type="none" w="med" len="med"/>
+                      <a:tailEnd type="none" w="med" len="med"/>
+                    </a:lnL>
+                    <a:lnR w="38100" cap="flat" cmpd="sng" algn="ctr">
+                      <a:solidFill>
+                        <a:schemeClr val="bg1">
+                          <a:lumMod val="85000"/>
+                        </a:schemeClr>
+                      </a:solidFill>
+                      <a:prstDash val="solid"/>
+                      <a:round/>
+                      <a:headEnd type="none" w="med" len="med"/>
+                      <a:tailEnd type="none" w="med" len="med"/>
+                    </a:lnR>
+                    <a:lnT w="12700" cap="flat" cmpd="sng" algn="ctr">
+                      <a:solidFill>
+                        <a:schemeClr val="bg2">
+                          <a:lumMod val="75000"/>
+                        </a:schemeClr>
+                      </a:solidFill>
+                      <a:prstDash val="solid"/>
+                      <a:round/>
+                      <a:headEnd type="none" w="med" len="med"/>
+                      <a:tailEnd type="none" w="med" len="med"/>
+                    </a:lnT>
+                    <a:lnB w="12700" cap="flat" cmpd="sng" algn="ctr">
+                      <a:solidFill>
+                        <a:schemeClr val="bg2">
+                          <a:lumMod val="75000"/>
+                        </a:schemeClr>
+                      </a:solidFill>
+                      <a:prstDash val="solid"/>
+                      <a:round/>
+                      <a:headEnd type="none" w="med" len="med"/>
+                      <a:tailEnd type="none" w="med" len="med"/>
+                    </a:lnB>
+                  </a:tcPr>
+                </a:tc>
+                <a:tc>
+                  <a:txBody>
+                    <a:bodyPr/>
+                    <a:lstStyle/>
+                    <a:p>
+                      <a:pPr marL="0" marR="0" lvl="0" indent="0" algn="ctr" defTabSz="914400" rtl="0" eaLnBrk="1" fontAlgn="auto" latinLnBrk="0" hangingPunct="1">
+                        <a:lnSpc>
+                          <a:spcPct val="100000"/>
+                        </a:lnSpc>
+                        <a:spcBef>
+                          <a:spcPts val="0"/>
+                        </a:spcBef>
+                        <a:spcAft>
+                          <a:spcPts val="0"/>
+                        </a:spcAft>
+                        <a:buClrTx/>
+                        <a:buSzTx/>
+                        <a:buFontTx/>
+                        <a:buNone/>
+                        <a:tabLst/>
+                        <a:defRPr/>
+                      </a:pPr>
+                      <a:r>
+                        <a:rPr lang="de-DE" sz="1200"/>
+                        <a:t>{{each:subSub3}}</a:t>
+                      </a:r>
+                    </a:p>
+                  </a:txBody>
+                  <a:tcPr anchor="b">
+                    <a:lnL w="38100" cap="flat" cmpd="sng" algn="ctr">
+                      <a:solidFill>
+                        <a:schemeClr val="bg1">
+                          <a:lumMod val="85000"/>
+                        </a:schemeClr>
+                      </a:solidFill>
+                      <a:prstDash val="solid"/>
+                      <a:round/>
+                      <a:headEnd type="none" w="med" len="med"/>
+                      <a:tailEnd type="none" w="med" len="med"/>
+                    </a:lnL>
+                    <a:lnR w="38100" cap="flat" cmpd="sng" algn="ctr">
+                      <a:solidFill>
+                        <a:schemeClr val="bg1">
+                          <a:lumMod val="85000"/>
+                        </a:schemeClr>
+                      </a:solidFill>
+                      <a:prstDash val="solid"/>
+                      <a:round/>
+                      <a:headEnd type="none" w="med" len="med"/>
+                      <a:tailEnd type="none" w="med" len="med"/>
+                    </a:lnR>
+                    <a:lnT w="12700" cap="flat" cmpd="sng" algn="ctr">
+                      <a:solidFill>
+                        <a:schemeClr val="bg2">
+                          <a:lumMod val="75000"/>
+                        </a:schemeClr>
+                      </a:solidFill>
+                      <a:prstDash val="solid"/>
+                      <a:round/>
+                      <a:headEnd type="none" w="med" len="med"/>
+                      <a:tailEnd type="none" w="med" len="med"/>
+                    </a:lnT>
+                    <a:lnB w="12700" cap="flat" cmpd="sng" algn="ctr">
+                      <a:solidFill>
+                        <a:schemeClr val="bg2">
+                          <a:lumMod val="75000"/>
+                        </a:schemeClr>
+                      </a:solidFill>
+                      <a:prstDash val="solid"/>
+                      <a:round/>
+                      <a:headEnd type="none" w="med" len="med"/>
+                      <a:tailEnd type="none" w="med" len="med"/>
+                    </a:lnB>
+                    <a:solidFill>
+                      <a:schemeClr val="bg1">
+                        <a:lumMod val="95000"/>
+                      </a:schemeClr>
+                    </a:solidFill>
+                  </a:tcPr>
+                </a:tc>
+                <a:tc vMerge="1">
+                  <a:txBody>
+                    <a:bodyPr/>
+                    <a:lstStyle/>
+                    <a:p>
+                      <a:pPr algn="ctr"/>
+                      <a:endParaRPr lang="de-DE" sz="1200"/>
+                    </a:p>
+                  </a:txBody>
+                  <a:tcPr anchor="b">
+                    <a:lnL w="12700" cap="flat" cmpd="sng" algn="ctr">
+                      <a:solidFill>
+                        <a:schemeClr val="bg2">
+                          <a:lumMod val="75000"/>
+                        </a:schemeClr>
+                      </a:solidFill>
+                      <a:prstDash val="solid"/>
+                      <a:round/>
+                      <a:headEnd type="none" w="med" len="med"/>
+                      <a:tailEnd type="none" w="med" len="med"/>
+                    </a:lnL>
+                    <a:lnR w="12700" cap="flat" cmpd="sng" algn="ctr">
+                      <a:solidFill>
+                        <a:schemeClr val="bg2">
+                          <a:lumMod val="75000"/>
+                        </a:schemeClr>
+                      </a:solidFill>
+                      <a:prstDash val="solid"/>
+                      <a:round/>
+                      <a:headEnd type="none" w="med" len="med"/>
+                      <a:tailEnd type="none" w="med" len="med"/>
+                    </a:lnR>
+                    <a:lnT w="12700" cap="flat" cmpd="sng" algn="ctr">
+                      <a:solidFill>
+                        <a:schemeClr val="bg2">
+                          <a:lumMod val="75000"/>
+                        </a:schemeClr>
+                      </a:solidFill>
+                      <a:prstDash val="solid"/>
+                      <a:round/>
+                      <a:headEnd type="none" w="med" len="med"/>
+                      <a:tailEnd type="none" w="med" len="med"/>
+                    </a:lnT>
+                    <a:lnB w="12700" cap="flat" cmpd="sng" algn="ctr">
+                      <a:solidFill>
+                        <a:schemeClr val="bg2">
+                          <a:lumMod val="75000"/>
+                        </a:schemeClr>
+                      </a:solidFill>
+                      <a:prstDash val="solid"/>
+                      <a:round/>
+                      <a:headEnd type="none" w="med" len="med"/>
+                      <a:tailEnd type="none" w="med" len="med"/>
+                    </a:lnB>
+                  </a:tcPr>
+                </a:tc>
+                <a:extLst>
+                  <a:ext uri="{0D108BD9-81ED-4DB2-BD59-A6C34878D82A}">
+                    <a16:rowId xmlns:a16="http://schemas.microsoft.com/office/drawing/2014/main" val="3580438174"/>
+                  </a:ext>
+                </a:extLst>
+              </a:tr>
+              <a:tr h="370840">
+                <a:tc>
+                  <a:txBody>
+                    <a:bodyPr/>
+                    <a:lstStyle/>
+                    <a:p>
+                      <a:pPr marL="0" marR="0" lvl="0" indent="0" algn="r" defTabSz="914400" rtl="0" eaLnBrk="1" fontAlgn="auto" latinLnBrk="0" hangingPunct="1">
+                        <a:lnSpc>
+                          <a:spcPct val="100000"/>
+                        </a:lnSpc>
+                        <a:spcBef>
+                          <a:spcPts val="0"/>
+                        </a:spcBef>
+                        <a:spcAft>
+                          <a:spcPts val="0"/>
+                        </a:spcAft>
+                        <a:buClrTx/>
+                        <a:buSzTx/>
+                        <a:buFontTx/>
+                        <a:buNone/>
+                        <a:tabLst/>
+                        <a:defRPr/>
+                      </a:pPr>
+                      <a:r>
+                        <a:rPr lang="de-DE" sz="1200"/>
+                        <a:t>{{each:row}}</a:t>
+                      </a:r>
+                    </a:p>
+                  </a:txBody>
+                  <a:tcPr anchor="ctr">
+                    <a:lnL w="12700" cap="flat" cmpd="sng" algn="ctr">
+                      <a:solidFill>
+                        <a:schemeClr val="bg2">
+                          <a:lumMod val="75000"/>
+                        </a:schemeClr>
+                      </a:solidFill>
+                      <a:prstDash val="solid"/>
+                      <a:round/>
+                      <a:headEnd type="none" w="med" len="med"/>
+                      <a:tailEnd type="none" w="med" len="med"/>
+                    </a:lnL>
+                    <a:lnR w="38100" cap="flat" cmpd="sng" algn="ctr">
+                      <a:solidFill>
+                        <a:schemeClr val="bg1">
+                          <a:lumMod val="85000"/>
+                        </a:schemeClr>
+                      </a:solidFill>
+                      <a:prstDash val="solid"/>
+                      <a:round/>
+                      <a:headEnd type="none" w="med" len="med"/>
+                      <a:tailEnd type="none" w="med" len="med"/>
+                    </a:lnR>
+                    <a:lnT w="12700" cap="flat" cmpd="sng" algn="ctr">
+                      <a:solidFill>
+                        <a:schemeClr val="bg2">
+                          <a:lumMod val="75000"/>
+                        </a:schemeClr>
+                      </a:solidFill>
+                      <a:prstDash val="solid"/>
+                      <a:round/>
+                      <a:headEnd type="none" w="med" len="med"/>
+                      <a:tailEnd type="none" w="med" len="med"/>
+                    </a:lnT>
+                    <a:lnB w="12700" cap="flat" cmpd="sng" algn="ctr">
+                      <a:solidFill>
+                        <a:schemeClr val="bg2">
+                          <a:lumMod val="75000"/>
+                        </a:schemeClr>
+                      </a:solidFill>
+                      <a:prstDash val="solid"/>
+                      <a:round/>
+                      <a:headEnd type="none" w="med" len="med"/>
+                      <a:tailEnd type="none" w="med" len="med"/>
+                    </a:lnB>
+                  </a:tcPr>
+                </a:tc>
+                <a:tc>
+                  <a:txBody>
+                    <a:bodyPr/>
+                    <a:lstStyle/>
+                    <a:p>
+                      <a:pPr algn="ctr"/>
+                      <a:r>
+                        <a:rPr kumimoji="0" lang="de-DE" sz="1000" b="0" i="0" u="none" strike="noStrike" kern="1200" cap="none" spc="0" normalizeH="0" baseline="0" noProof="0">
+                          <a:ln>
+                            <a:noFill/>
+                          </a:ln>
+                          <a:solidFill>
+                            <a:prstClr val="black"/>
+                          </a:solidFill>
+                          <a:effectLst/>
+                          <a:uLnTx/>
+                          <a:uFillTx/>
+                          <a:latin typeface="Calibri" panose="020F0502020204030204"/>
+                          <a:ea typeface="+mn-ea"/>
+                          <a:cs typeface="+mn-cs"/>
+                        </a:rPr>
+                        <a:t>-</a:t>
+                      </a:r>
+                      <a:endParaRPr lang="de-DE" sz="1000"/>
+                    </a:p>
+                  </a:txBody>
+                  <a:tcPr anchor="ctr">
+                    <a:lnL w="38100" cap="flat" cmpd="sng" algn="ctr">
+                      <a:solidFill>
+                        <a:schemeClr val="bg1">
+                          <a:lumMod val="85000"/>
+                        </a:schemeClr>
+                      </a:solidFill>
+                      <a:prstDash val="solid"/>
+                      <a:round/>
+                      <a:headEnd type="none" w="med" len="med"/>
+                      <a:tailEnd type="none" w="med" len="med"/>
+                    </a:lnL>
+                    <a:lnR w="12700" cap="flat" cmpd="sng" algn="ctr">
+                      <a:solidFill>
+                        <a:schemeClr val="bg2">
+                          <a:lumMod val="75000"/>
+                        </a:schemeClr>
+                      </a:solidFill>
+                      <a:prstDash val="solid"/>
+                      <a:round/>
+                      <a:headEnd type="none" w="med" len="med"/>
+                      <a:tailEnd type="none" w="med" len="med"/>
+                    </a:lnR>
+                    <a:lnT w="12700" cap="flat" cmpd="sng" algn="ctr">
+                      <a:solidFill>
+                        <a:schemeClr val="bg2">
+                          <a:lumMod val="75000"/>
+                        </a:schemeClr>
+                      </a:solidFill>
+                      <a:prstDash val="solid"/>
+                      <a:round/>
+                      <a:headEnd type="none" w="med" len="med"/>
+                      <a:tailEnd type="none" w="med" len="med"/>
+                    </a:lnT>
+                    <a:lnB w="12700" cap="flat" cmpd="sng" algn="ctr">
+                      <a:solidFill>
+                        <a:schemeClr val="bg2">
+                          <a:lumMod val="75000"/>
+                        </a:schemeClr>
+                      </a:solidFill>
+                      <a:prstDash val="solid"/>
+                      <a:round/>
+                      <a:headEnd type="none" w="med" len="med"/>
+                      <a:tailEnd type="none" w="med" len="med"/>
+                    </a:lnB>
+                  </a:tcPr>
+                </a:tc>
+                <a:tc>
+                  <a:txBody>
+                    <a:bodyPr/>
+                    <a:lstStyle/>
+                    <a:p>
+                      <a:pPr algn="ctr"/>
+                      <a:r>
+                        <a:rPr kumimoji="0" lang="de-DE" sz="1000" b="0" i="0" u="none" strike="noStrike" kern="1200" cap="none" spc="0" normalizeH="0" baseline="0" noProof="0">
+                          <a:ln>
+                            <a:noFill/>
+                          </a:ln>
+                          <a:solidFill>
+                            <a:prstClr val="black"/>
+                          </a:solidFill>
+                          <a:effectLst/>
+                          <a:uLnTx/>
+                          <a:uFillTx/>
+                          <a:latin typeface="Calibri" panose="020F0502020204030204"/>
+                          <a:ea typeface="+mn-ea"/>
+                          <a:cs typeface="+mn-cs"/>
+                        </a:rPr>
+                        <a:t>-</a:t>
+                      </a:r>
+                      <a:endParaRPr lang="de-DE" sz="1000"/>
+                    </a:p>
+                  </a:txBody>
+                  <a:tcPr anchor="ctr">
+                    <a:lnL w="12700" cap="flat" cmpd="sng" algn="ctr">
+                      <a:solidFill>
+                        <a:schemeClr val="bg2">
+                          <a:lumMod val="75000"/>
+                        </a:schemeClr>
+                      </a:solidFill>
+                      <a:prstDash val="solid"/>
+                      <a:round/>
+                      <a:headEnd type="none" w="med" len="med"/>
+                      <a:tailEnd type="none" w="med" len="med"/>
+                    </a:lnL>
+                    <a:lnR w="38100" cap="flat" cmpd="sng" algn="ctr">
+                      <a:solidFill>
+                        <a:schemeClr val="bg1">
+                          <a:lumMod val="85000"/>
+                        </a:schemeClr>
+                      </a:solidFill>
+                      <a:prstDash val="solid"/>
+                      <a:round/>
+                      <a:headEnd type="none" w="med" len="med"/>
+                      <a:tailEnd type="none" w="med" len="med"/>
+                    </a:lnR>
+                    <a:lnT w="12700" cap="flat" cmpd="sng" algn="ctr">
+                      <a:solidFill>
+                        <a:schemeClr val="bg2">
+                          <a:lumMod val="75000"/>
+                        </a:schemeClr>
+                      </a:solidFill>
+                      <a:prstDash val="solid"/>
+                      <a:round/>
+                      <a:headEnd type="none" w="med" len="med"/>
+                      <a:tailEnd type="none" w="med" len="med"/>
+                    </a:lnT>
+                    <a:lnB w="12700" cap="flat" cmpd="sng" algn="ctr">
+                      <a:solidFill>
+                        <a:schemeClr val="bg2">
+                          <a:lumMod val="75000"/>
+                        </a:schemeClr>
+                      </a:solidFill>
+                      <a:prstDash val="solid"/>
+                      <a:round/>
+                      <a:headEnd type="none" w="med" len="med"/>
+                      <a:tailEnd type="none" w="med" len="med"/>
+                    </a:lnB>
+                  </a:tcPr>
+                </a:tc>
+                <a:tc>
+                  <a:txBody>
+                    <a:bodyPr/>
+                    <a:lstStyle/>
+                    <a:p>
+                      <a:pPr algn="ctr"/>
+                      <a:r>
+                        <a:rPr kumimoji="0" lang="de-DE" sz="1000" b="0" i="0" u="none" strike="noStrike" kern="1200" cap="none" spc="0" normalizeH="0" baseline="0" noProof="0">
+                          <a:ln>
+                            <a:noFill/>
+                          </a:ln>
+                          <a:solidFill>
+                            <a:prstClr val="black"/>
+                          </a:solidFill>
+                          <a:effectLst/>
+                          <a:uLnTx/>
+                          <a:uFillTx/>
+                          <a:latin typeface="Calibri" panose="020F0502020204030204"/>
+                          <a:ea typeface="+mn-ea"/>
+                          <a:cs typeface="+mn-cs"/>
+                        </a:rPr>
+                        <a:t>-</a:t>
+                      </a:r>
+                      <a:endParaRPr lang="de-DE" sz="1000"/>
+                    </a:p>
+                  </a:txBody>
+                  <a:tcPr anchor="ctr">
+                    <a:lnL w="38100" cap="flat" cmpd="sng" algn="ctr">
+                      <a:solidFill>
+                        <a:schemeClr val="bg1">
+                          <a:lumMod val="85000"/>
+                        </a:schemeClr>
+                      </a:solidFill>
+                      <a:prstDash val="solid"/>
+                      <a:round/>
+                      <a:headEnd type="none" w="med" len="med"/>
+                      <a:tailEnd type="none" w="med" len="med"/>
+                    </a:lnL>
+                    <a:lnR w="38100" cap="flat" cmpd="sng" algn="ctr">
+                      <a:solidFill>
+                        <a:schemeClr val="bg1">
+                          <a:lumMod val="85000"/>
+                        </a:schemeClr>
+                      </a:solidFill>
+                      <a:prstDash val="solid"/>
+                      <a:round/>
+                      <a:headEnd type="none" w="med" len="med"/>
+                      <a:tailEnd type="none" w="med" len="med"/>
+                    </a:lnR>
+                    <a:lnT w="12700" cap="flat" cmpd="sng" algn="ctr">
+                      <a:solidFill>
+                        <a:schemeClr val="bg2">
+                          <a:lumMod val="75000"/>
+                        </a:schemeClr>
+                      </a:solidFill>
+                      <a:prstDash val="solid"/>
+                      <a:round/>
+                      <a:headEnd type="none" w="med" len="med"/>
+                      <a:tailEnd type="none" w="med" len="med"/>
+                    </a:lnT>
+                    <a:lnB w="12700" cap="flat" cmpd="sng" algn="ctr">
+                      <a:solidFill>
+                        <a:schemeClr val="bg2">
+                          <a:lumMod val="75000"/>
+                        </a:schemeClr>
+                      </a:solidFill>
+                      <a:prstDash val="solid"/>
+                      <a:round/>
+                      <a:headEnd type="none" w="med" len="med"/>
+                      <a:tailEnd type="none" w="med" len="med"/>
+                    </a:lnB>
+                    <a:solidFill>
+                      <a:schemeClr val="bg1">
+                        <a:lumMod val="95000"/>
+                      </a:schemeClr>
+                    </a:solidFill>
+                  </a:tcPr>
+                </a:tc>
+                <a:tc>
+                  <a:txBody>
+                    <a:bodyPr/>
+                    <a:lstStyle/>
+                    <a:p>
+                      <a:pPr algn="ctr"/>
+                      <a:r>
+                        <a:rPr kumimoji="0" lang="de-DE" sz="1000" b="0" i="0" u="none" strike="noStrike" kern="1200" cap="none" spc="0" normalizeH="0" baseline="0" noProof="0">
+                          <a:ln>
+                            <a:noFill/>
+                          </a:ln>
+                          <a:solidFill>
+                            <a:prstClr val="black"/>
+                          </a:solidFill>
+                          <a:effectLst/>
+                          <a:uLnTx/>
+                          <a:uFillTx/>
+                          <a:latin typeface="Calibri" panose="020F0502020204030204"/>
+                          <a:ea typeface="+mn-ea"/>
+                          <a:cs typeface="+mn-cs"/>
+                        </a:rPr>
+                        <a:t>-</a:t>
+                      </a:r>
+                      <a:endParaRPr lang="de-DE" sz="1000"/>
+                    </a:p>
+                  </a:txBody>
+                  <a:tcPr anchor="ctr">
+                    <a:lnL w="38100" cap="flat" cmpd="sng" algn="ctr">
+                      <a:solidFill>
+                        <a:schemeClr val="bg1">
+                          <a:lumMod val="85000"/>
+                        </a:schemeClr>
+                      </a:solidFill>
+                      <a:prstDash val="solid"/>
+                      <a:round/>
+                      <a:headEnd type="none" w="med" len="med"/>
+                      <a:tailEnd type="none" w="med" len="med"/>
+                    </a:lnL>
+                    <a:lnR w="12700" cap="flat" cmpd="sng" algn="ctr">
+                      <a:solidFill>
+                        <a:schemeClr val="bg2">
+                          <a:lumMod val="75000"/>
+                        </a:schemeClr>
+                      </a:solidFill>
+                      <a:prstDash val="solid"/>
+                      <a:round/>
+                      <a:headEnd type="none" w="med" len="med"/>
+                      <a:tailEnd type="none" w="med" len="med"/>
+                    </a:lnR>
+                    <a:lnT w="12700" cap="flat" cmpd="sng" algn="ctr">
+                      <a:solidFill>
+                        <a:schemeClr val="bg2">
+                          <a:lumMod val="75000"/>
+                        </a:schemeClr>
+                      </a:solidFill>
+                      <a:prstDash val="solid"/>
+                      <a:round/>
+                      <a:headEnd type="none" w="med" len="med"/>
+                      <a:tailEnd type="none" w="med" len="med"/>
+                    </a:lnT>
+                    <a:lnB w="12700" cap="flat" cmpd="sng" algn="ctr">
+                      <a:solidFill>
+                        <a:schemeClr val="bg2">
+                          <a:lumMod val="75000"/>
+                        </a:schemeClr>
+                      </a:solidFill>
+                      <a:prstDash val="solid"/>
+                      <a:round/>
+                      <a:headEnd type="none" w="med" len="med"/>
+                      <a:tailEnd type="none" w="med" len="med"/>
+                    </a:lnB>
+                  </a:tcPr>
+                </a:tc>
+                <a:extLst>
+                  <a:ext uri="{0D108BD9-81ED-4DB2-BD59-A6C34878D82A}">
+                    <a16:rowId xmlns:a16="http://schemas.microsoft.com/office/drawing/2014/main" val="3257207914"/>
+                  </a:ext>
+                </a:extLst>
+              </a:tr>
+              <a:tr h="370840">
+                <a:tc>
+                  <a:txBody>
+                    <a:bodyPr/>
+                    <a:lstStyle/>
+                    <a:p>
+                      <a:pPr marL="0" marR="0" lvl="0" indent="0" algn="r" defTabSz="914400" rtl="0" eaLnBrk="1" fontAlgn="auto" latinLnBrk="0" hangingPunct="1">
+                        <a:lnSpc>
+                          <a:spcPct val="100000"/>
+                        </a:lnSpc>
+                        <a:spcBef>
+                          <a:spcPts val="0"/>
+                        </a:spcBef>
+                        <a:spcAft>
+                          <a:spcPts val="0"/>
+                        </a:spcAft>
+                        <a:buClrTx/>
+                        <a:buSzTx/>
+                        <a:buFontTx/>
+                        <a:buNone/>
+                        <a:tabLst/>
+                        <a:defRPr/>
+                      </a:pPr>
+                      <a:r>
+                        <a:rPr lang="de-DE" sz="1200"/>
+                        <a:t>Footer</a:t>
+                      </a:r>
+                    </a:p>
+                  </a:txBody>
+                  <a:tcPr>
+                    <a:lnL w="12700" cap="flat" cmpd="sng" algn="ctr">
+                      <a:solidFill>
+                        <a:schemeClr val="bg2">
+                          <a:lumMod val="75000"/>
+                        </a:schemeClr>
+                      </a:solidFill>
+                      <a:prstDash val="solid"/>
+                      <a:round/>
+                      <a:headEnd type="none" w="med" len="med"/>
+                      <a:tailEnd type="none" w="med" len="med"/>
+                    </a:lnL>
+                    <a:lnR w="38100" cap="flat" cmpd="sng" algn="ctr">
+                      <a:solidFill>
+                        <a:schemeClr val="bg1">
+                          <a:lumMod val="85000"/>
+                        </a:schemeClr>
+                      </a:solidFill>
+                      <a:prstDash val="solid"/>
+                      <a:round/>
+                      <a:headEnd type="none" w="med" len="med"/>
+                      <a:tailEnd type="none" w="med" len="med"/>
+                    </a:lnR>
+                    <a:lnT w="12700" cap="flat" cmpd="sng" algn="ctr">
+                      <a:solidFill>
+                        <a:schemeClr val="bg2">
+                          <a:lumMod val="75000"/>
+                        </a:schemeClr>
+                      </a:solidFill>
+                      <a:prstDash val="solid"/>
+                      <a:round/>
+                      <a:headEnd type="none" w="med" len="med"/>
+                      <a:tailEnd type="none" w="med" len="med"/>
+                    </a:lnT>
+                    <a:lnB w="12700" cap="flat" cmpd="sng" algn="ctr">
+                      <a:solidFill>
+                        <a:schemeClr val="bg2">
+                          <a:lumMod val="75000"/>
+                        </a:schemeClr>
+                      </a:solidFill>
+                      <a:prstDash val="solid"/>
+                      <a:round/>
+                      <a:headEnd type="none" w="med" len="med"/>
+                      <a:tailEnd type="none" w="med" len="med"/>
+                    </a:lnB>
+                  </a:tcPr>
+                </a:tc>
+                <a:tc>
+                  <a:txBody>
+                    <a:bodyPr/>
+                    <a:lstStyle/>
+                    <a:p>
+                      <a:pPr marL="0" marR="0" lvl="0" indent="0" algn="ctr" defTabSz="914400" rtl="0" eaLnBrk="1" fontAlgn="auto" latinLnBrk="0" hangingPunct="1">
+                        <a:lnSpc>
+                          <a:spcPct val="100000"/>
+                        </a:lnSpc>
+                        <a:spcBef>
+                          <a:spcPts val="0"/>
+                        </a:spcBef>
+                        <a:spcAft>
+                          <a:spcPts val="0"/>
+                        </a:spcAft>
+                        <a:buClrTx/>
+                        <a:buSzTx/>
+                        <a:buFontTx/>
+                        <a:buNone/>
+                        <a:tabLst/>
+                        <a:defRPr/>
+                      </a:pPr>
+                      <a:r>
+                        <a:rPr kumimoji="0" lang="de-DE" sz="1200" b="0" i="0" u="none" strike="noStrike" kern="1200" cap="none" spc="0" normalizeH="0" baseline="0" noProof="0">
+                          <a:ln>
+                            <a:noFill/>
+                          </a:ln>
+                          <a:solidFill>
+                            <a:prstClr val="black"/>
+                          </a:solidFill>
+                          <a:effectLst/>
+                          <a:uLnTx/>
+                          <a:uFillTx/>
+                          <a:latin typeface="Calibri" panose="020F0502020204030204"/>
+                          <a:ea typeface="+mn-ea"/>
+                          <a:cs typeface="+mn-cs"/>
+                        </a:rPr>
+                        <a:t>Footer</a:t>
+                      </a:r>
+                      <a:endParaRPr lang="de-DE" sz="1200"/>
+                    </a:p>
+                  </a:txBody>
+                  <a:tcPr>
+                    <a:lnL w="38100" cap="flat" cmpd="sng" algn="ctr">
+                      <a:solidFill>
+                        <a:schemeClr val="bg1">
+                          <a:lumMod val="85000"/>
+                        </a:schemeClr>
+                      </a:solidFill>
+                      <a:prstDash val="solid"/>
+                      <a:round/>
+                      <a:headEnd type="none" w="med" len="med"/>
+                      <a:tailEnd type="none" w="med" len="med"/>
+                    </a:lnL>
+                    <a:lnR w="12700" cap="flat" cmpd="sng" algn="ctr">
+                      <a:solidFill>
+                        <a:schemeClr val="bg2">
+                          <a:lumMod val="75000"/>
+                        </a:schemeClr>
+                      </a:solidFill>
+                      <a:prstDash val="solid"/>
+                      <a:round/>
+                      <a:headEnd type="none" w="med" len="med"/>
+                      <a:tailEnd type="none" w="med" len="med"/>
+                    </a:lnR>
+                    <a:lnT w="12700" cap="flat" cmpd="sng" algn="ctr">
+                      <a:solidFill>
+                        <a:schemeClr val="bg2">
+                          <a:lumMod val="75000"/>
+                        </a:schemeClr>
+                      </a:solidFill>
+                      <a:prstDash val="solid"/>
+                      <a:round/>
+                      <a:headEnd type="none" w="med" len="med"/>
+                      <a:tailEnd type="none" w="med" len="med"/>
+                    </a:lnT>
+                    <a:lnB w="12700" cap="flat" cmpd="sng" algn="ctr">
+                      <a:solidFill>
+                        <a:schemeClr val="bg2">
+                          <a:lumMod val="75000"/>
+                        </a:schemeClr>
+                      </a:solidFill>
+                      <a:prstDash val="solid"/>
+                      <a:round/>
+                      <a:headEnd type="none" w="med" len="med"/>
+                      <a:tailEnd type="none" w="med" len="med"/>
+                    </a:lnB>
+                  </a:tcPr>
+                </a:tc>
+                <a:tc>
+                  <a:txBody>
+                    <a:bodyPr/>
+                    <a:lstStyle/>
+                    <a:p>
+                      <a:pPr marL="0" marR="0" lvl="0" indent="0" algn="ctr" defTabSz="914400" rtl="0" eaLnBrk="1" fontAlgn="auto" latinLnBrk="0" hangingPunct="1">
+                        <a:lnSpc>
+                          <a:spcPct val="100000"/>
+                        </a:lnSpc>
+                        <a:spcBef>
+                          <a:spcPts val="0"/>
+                        </a:spcBef>
+                        <a:spcAft>
+                          <a:spcPts val="0"/>
+                        </a:spcAft>
+                        <a:buClrTx/>
+                        <a:buSzTx/>
+                        <a:buFontTx/>
+                        <a:buNone/>
+                        <a:tabLst/>
+                        <a:defRPr/>
+                      </a:pPr>
+                      <a:r>
+                        <a:rPr kumimoji="0" lang="de-DE" sz="1200" b="0" i="0" u="none" strike="noStrike" kern="1200" cap="none" spc="0" normalizeH="0" baseline="0" noProof="0">
+                          <a:ln>
+                            <a:noFill/>
+                          </a:ln>
+                          <a:solidFill>
+                            <a:prstClr val="black"/>
+                          </a:solidFill>
+                          <a:effectLst/>
+                          <a:uLnTx/>
+                          <a:uFillTx/>
+                          <a:latin typeface="Calibri" panose="020F0502020204030204"/>
+                          <a:ea typeface="+mn-ea"/>
+                          <a:cs typeface="+mn-cs"/>
+                        </a:rPr>
+                        <a:t>Footer2</a:t>
+                      </a:r>
+                      <a:endParaRPr lang="de-DE" sz="1200"/>
+                    </a:p>
+                  </a:txBody>
+                  <a:tcPr>
+                    <a:lnL w="12700" cap="flat" cmpd="sng" algn="ctr">
+                      <a:solidFill>
+                        <a:schemeClr val="bg2">
+                          <a:lumMod val="75000"/>
+                        </a:schemeClr>
+                      </a:solidFill>
+                      <a:prstDash val="solid"/>
+                      <a:round/>
+                      <a:headEnd type="none" w="med" len="med"/>
+                      <a:tailEnd type="none" w="med" len="med"/>
+                    </a:lnL>
+                    <a:lnR w="38100" cap="flat" cmpd="sng" algn="ctr">
+                      <a:solidFill>
+                        <a:schemeClr val="bg1">
+                          <a:lumMod val="85000"/>
+                        </a:schemeClr>
+                      </a:solidFill>
+                      <a:prstDash val="solid"/>
+                      <a:round/>
+                      <a:headEnd type="none" w="med" len="med"/>
+                      <a:tailEnd type="none" w="med" len="med"/>
+                    </a:lnR>
+                    <a:lnT w="12700" cap="flat" cmpd="sng" algn="ctr">
+                      <a:solidFill>
+                        <a:schemeClr val="bg2">
+                          <a:lumMod val="75000"/>
+                        </a:schemeClr>
+                      </a:solidFill>
+                      <a:prstDash val="solid"/>
+                      <a:round/>
+                      <a:headEnd type="none" w="med" len="med"/>
+                      <a:tailEnd type="none" w="med" len="med"/>
+                    </a:lnT>
+                    <a:lnB w="12700" cap="flat" cmpd="sng" algn="ctr">
+                      <a:solidFill>
+                        <a:schemeClr val="bg2">
+                          <a:lumMod val="75000"/>
+                        </a:schemeClr>
+                      </a:solidFill>
+                      <a:prstDash val="solid"/>
+                      <a:round/>
+                      <a:headEnd type="none" w="med" len="med"/>
+                      <a:tailEnd type="none" w="med" len="med"/>
+                    </a:lnB>
+                  </a:tcPr>
+                </a:tc>
+                <a:tc>
+                  <a:txBody>
+                    <a:bodyPr/>
+                    <a:lstStyle/>
+                    <a:p>
+                      <a:pPr marL="0" marR="0" lvl="0" indent="0" algn="ctr" defTabSz="914400" rtl="0" eaLnBrk="1" fontAlgn="auto" latinLnBrk="0" hangingPunct="1">
+                        <a:lnSpc>
+                          <a:spcPct val="100000"/>
+                        </a:lnSpc>
+                        <a:spcBef>
+                          <a:spcPts val="0"/>
+                        </a:spcBef>
+                        <a:spcAft>
+                          <a:spcPts val="0"/>
+                        </a:spcAft>
+                        <a:buClrTx/>
+                        <a:buSzTx/>
+                        <a:buFontTx/>
+                        <a:buNone/>
+                        <a:tabLst/>
+                        <a:defRPr/>
+                      </a:pPr>
+                      <a:r>
+                        <a:rPr kumimoji="0" lang="de-DE" sz="1200" b="0" i="0" u="none" strike="noStrike" kern="1200" cap="none" spc="0" normalizeH="0" baseline="0" noProof="0">
+                          <a:ln>
+                            <a:noFill/>
+                          </a:ln>
+                          <a:solidFill>
+                            <a:prstClr val="black"/>
+                          </a:solidFill>
+                          <a:effectLst/>
+                          <a:uLnTx/>
+                          <a:uFillTx/>
+                          <a:latin typeface="Calibri" panose="020F0502020204030204"/>
+                          <a:ea typeface="+mn-ea"/>
+                          <a:cs typeface="+mn-cs"/>
+                        </a:rPr>
+                        <a:t>Footer3</a:t>
+                      </a:r>
+                      <a:endParaRPr lang="de-DE" sz="1200"/>
+                    </a:p>
+                  </a:txBody>
+                  <a:tcPr>
+                    <a:lnL w="38100" cap="flat" cmpd="sng" algn="ctr">
+                      <a:solidFill>
+                        <a:schemeClr val="bg1">
+                          <a:lumMod val="85000"/>
+                        </a:schemeClr>
+                      </a:solidFill>
+                      <a:prstDash val="solid"/>
+                      <a:round/>
+                      <a:headEnd type="none" w="med" len="med"/>
+                      <a:tailEnd type="none" w="med" len="med"/>
+                    </a:lnL>
+                    <a:lnR w="38100" cap="flat" cmpd="sng" algn="ctr">
+                      <a:solidFill>
+                        <a:schemeClr val="bg1">
+                          <a:lumMod val="85000"/>
+                        </a:schemeClr>
+                      </a:solidFill>
+                      <a:prstDash val="solid"/>
+                      <a:round/>
+                      <a:headEnd type="none" w="med" len="med"/>
+                      <a:tailEnd type="none" w="med" len="med"/>
+                    </a:lnR>
+                    <a:lnT w="12700" cap="flat" cmpd="sng" algn="ctr">
+                      <a:solidFill>
+                        <a:schemeClr val="bg2">
+                          <a:lumMod val="75000"/>
+                        </a:schemeClr>
+                      </a:solidFill>
+                      <a:prstDash val="solid"/>
+                      <a:round/>
+                      <a:headEnd type="none" w="med" len="med"/>
+                      <a:tailEnd type="none" w="med" len="med"/>
+                    </a:lnT>
+                    <a:lnB w="12700" cap="flat" cmpd="sng" algn="ctr">
+                      <a:solidFill>
+                        <a:schemeClr val="bg2">
+                          <a:lumMod val="75000"/>
+                        </a:schemeClr>
+                      </a:solidFill>
+                      <a:prstDash val="solid"/>
+                      <a:round/>
+                      <a:headEnd type="none" w="med" len="med"/>
+                      <a:tailEnd type="none" w="med" len="med"/>
+                    </a:lnB>
+                    <a:solidFill>
+                      <a:schemeClr val="bg1">
+                        <a:lumMod val="95000"/>
+                      </a:schemeClr>
+                    </a:solidFill>
+                  </a:tcPr>
+                </a:tc>
+                <a:tc>
+                  <a:txBody>
+                    <a:bodyPr/>
+                    <a:lstStyle/>
+                    <a:p>
+                      <a:pPr algn="ctr"/>
+                      <a:r>
+                        <a:rPr kumimoji="0" lang="de-DE" sz="1000" b="0" i="0" u="none" strike="noStrike" kern="1200" cap="none" spc="0" normalizeH="0" baseline="0" noProof="0">
+                          <a:ln>
+                            <a:noFill/>
+                          </a:ln>
+                          <a:solidFill>
+                            <a:prstClr val="black"/>
+                          </a:solidFill>
+                          <a:effectLst/>
+                          <a:uLnTx/>
+                          <a:uFillTx/>
+                          <a:latin typeface="Calibri" panose="020F0502020204030204"/>
+                          <a:ea typeface="+mn-ea"/>
+                          <a:cs typeface="+mn-cs"/>
+                        </a:rPr>
+                        <a:t>-</a:t>
+                      </a:r>
+                      <a:endParaRPr lang="de-DE" sz="1000"/>
+                    </a:p>
+                  </a:txBody>
+                  <a:tcPr>
+                    <a:lnL w="38100" cap="flat" cmpd="sng" algn="ctr">
+                      <a:solidFill>
+                        <a:schemeClr val="bg1">
+                          <a:lumMod val="85000"/>
+                        </a:schemeClr>
+                      </a:solidFill>
+                      <a:prstDash val="solid"/>
+                      <a:round/>
+                      <a:headEnd type="none" w="med" len="med"/>
+                      <a:tailEnd type="none" w="med" len="med"/>
+                    </a:lnL>
+                    <a:lnR w="12700" cap="flat" cmpd="sng" algn="ctr">
+                      <a:solidFill>
+                        <a:schemeClr val="bg2">
+                          <a:lumMod val="75000"/>
+                        </a:schemeClr>
+                      </a:solidFill>
+                      <a:prstDash val="solid"/>
+                      <a:round/>
+                      <a:headEnd type="none" w="med" len="med"/>
+                      <a:tailEnd type="none" w="med" len="med"/>
+                    </a:lnR>
+                    <a:lnT w="12700" cap="flat" cmpd="sng" algn="ctr">
+                      <a:solidFill>
+                        <a:schemeClr val="bg2">
+                          <a:lumMod val="75000"/>
+                        </a:schemeClr>
+                      </a:solidFill>
+                      <a:prstDash val="solid"/>
+                      <a:round/>
+                      <a:headEnd type="none" w="med" len="med"/>
+                      <a:tailEnd type="none" w="med" len="med"/>
+                    </a:lnT>
+                    <a:lnB w="12700" cap="flat" cmpd="sng" algn="ctr">
+                      <a:solidFill>
+                        <a:schemeClr val="bg2">
+                          <a:lumMod val="75000"/>
+                        </a:schemeClr>
+                      </a:solidFill>
+                      <a:prstDash val="solid"/>
+                      <a:round/>
+                      <a:headEnd type="none" w="med" len="med"/>
+                      <a:tailEnd type="none" w="med" len="med"/>
+                    </a:lnB>
+                  </a:tcPr>
+                </a:tc>
+                <a:extLst>
+                  <a:ext uri="{0D108BD9-81ED-4DB2-BD59-A6C34878D82A}">
+                    <a16:rowId xmlns:a16="http://schemas.microsoft.com/office/drawing/2014/main" val="3395256489"/>
+                  </a:ext>
+                </a:extLst>
+              </a:tr>
+            </a:tbl>
+          </a:graphicData>
+        </a:graphic>
+      </p:graphicFrame>
+    </p:spTree>
+    <p:extLst>
+      <p:ext uri="{BB962C8B-B14F-4D97-AF65-F5344CB8AC3E}">
+        <p14:creationId xmlns:p14="http://schemas.microsoft.com/office/powerpoint/2010/main" val="849820453"/>
       </p:ext>
     </p:extLst>
   </p:cSld>

</xml_diff>